<commit_message>
update section 4: add Edit distance, Hamming distance, Comparison table
</commit_message>
<xml_diff>
--- a/images/kd-draw.pptx
+++ b/images/kd-draw.pptx
@@ -7,6 +7,8 @@
   <p:sldIdLst>
     <p:sldId id="256" r:id="rId2"/>
     <p:sldId id="258" r:id="rId3"/>
+    <p:sldId id="259" r:id="rId4"/>
+    <p:sldId id="260" r:id="rId5"/>
   </p:sldIdLst>
   <p:sldSz cx="12192000" cy="6858000"/>
   <p:notesSz cx="6858000" cy="9144000"/>
@@ -124,6 +126,242 @@
 </p:presentation>
 </file>
 
+<file path=ppt/revisionInfo.xml><?xml version="1.0" encoding="utf-8"?>
+<p1510:revInfo xmlns:a="http://schemas.openxmlformats.org/drawingml/2006/main" xmlns:r="http://schemas.openxmlformats.org/officeDocument/2006/relationships" xmlns:p1510="http://schemas.microsoft.com/office/powerpoint/2015/10/main">
+  <p1510:revLst>
+    <p1510:client id="{9403B015-2769-46C7-9465-E136DCA63CCF}" v="33" dt="2025-12-17T09:38:38.033"/>
+  </p1510:revLst>
+</p1510:revInfo>
+</file>
+
+<file path=ppt/changesInfos/changesInfo1.xml><?xml version="1.0" encoding="utf-8"?>
+<pc:chgInfo xmlns:a="http://schemas.openxmlformats.org/drawingml/2006/main" xmlns:r="http://schemas.openxmlformats.org/officeDocument/2006/relationships" xmlns:ac="http://schemas.microsoft.com/office/drawing/2013/main/command" xmlns:pc="http://schemas.microsoft.com/office/powerpoint/2013/main/command">
+  <pc:docChgLst>
+    <pc:chgData name="Phạm Thông" userId="cb1de41f-d0a9-4c8b-9095-fa88b5d4678f" providerId="ADAL" clId="{E2A0B859-04CE-4714-8C81-52AA70A7C49E}"/>
+    <pc:docChg chg="undo custSel addSld modSld">
+      <pc:chgData name="Phạm Thông" userId="cb1de41f-d0a9-4c8b-9095-fa88b5d4678f" providerId="ADAL" clId="{E2A0B859-04CE-4714-8C81-52AA70A7C49E}" dt="2025-12-17T09:38:47.895" v="437" actId="1037"/>
+      <pc:docMkLst>
+        <pc:docMk/>
+      </pc:docMkLst>
+      <pc:sldChg chg="addSp delSp modSp new mod">
+        <pc:chgData name="Phạm Thông" userId="cb1de41f-d0a9-4c8b-9095-fa88b5d4678f" providerId="ADAL" clId="{E2A0B859-04CE-4714-8C81-52AA70A7C49E}" dt="2025-12-17T08:09:02.471" v="350" actId="1076"/>
+        <pc:sldMkLst>
+          <pc:docMk/>
+          <pc:sldMk cId="1982739507" sldId="259"/>
+        </pc:sldMkLst>
+        <pc:spChg chg="del">
+          <ac:chgData name="Phạm Thông" userId="cb1de41f-d0a9-4c8b-9095-fa88b5d4678f" providerId="ADAL" clId="{E2A0B859-04CE-4714-8C81-52AA70A7C49E}" dt="2025-12-16T17:52:56.351" v="1" actId="478"/>
+          <ac:spMkLst>
+            <pc:docMk/>
+            <pc:sldMk cId="1982739507" sldId="259"/>
+            <ac:spMk id="2" creationId="{76A4C110-80C5-A607-A7C2-3D1F74B34C5F}"/>
+          </ac:spMkLst>
+        </pc:spChg>
+        <pc:spChg chg="del">
+          <ac:chgData name="Phạm Thông" userId="cb1de41f-d0a9-4c8b-9095-fa88b5d4678f" providerId="ADAL" clId="{E2A0B859-04CE-4714-8C81-52AA70A7C49E}" dt="2025-12-16T17:52:56.351" v="1" actId="478"/>
+          <ac:spMkLst>
+            <pc:docMk/>
+            <pc:sldMk cId="1982739507" sldId="259"/>
+            <ac:spMk id="3" creationId="{32A548C5-D65F-D741-6FAB-0E0D7AD9A59C}"/>
+          </ac:spMkLst>
+        </pc:spChg>
+        <pc:spChg chg="add mod">
+          <ac:chgData name="Phạm Thông" userId="cb1de41f-d0a9-4c8b-9095-fa88b5d4678f" providerId="ADAL" clId="{E2A0B859-04CE-4714-8C81-52AA70A7C49E}" dt="2025-12-17T08:09:02.471" v="350" actId="1076"/>
+          <ac:spMkLst>
+            <pc:docMk/>
+            <pc:sldMk cId="1982739507" sldId="259"/>
+            <ac:spMk id="5" creationId="{BB2666C0-A672-84C8-E163-BC31F78754CC}"/>
+          </ac:spMkLst>
+        </pc:spChg>
+        <pc:spChg chg="add mod">
+          <ac:chgData name="Phạm Thông" userId="cb1de41f-d0a9-4c8b-9095-fa88b5d4678f" providerId="ADAL" clId="{E2A0B859-04CE-4714-8C81-52AA70A7C49E}" dt="2025-12-17T08:09:02.471" v="350" actId="1076"/>
+          <ac:spMkLst>
+            <pc:docMk/>
+            <pc:sldMk cId="1982739507" sldId="259"/>
+            <ac:spMk id="6" creationId="{2CFB5071-3481-210D-66BB-9ECB03B17FFF}"/>
+          </ac:spMkLst>
+        </pc:spChg>
+        <pc:spChg chg="add mod">
+          <ac:chgData name="Phạm Thông" userId="cb1de41f-d0a9-4c8b-9095-fa88b5d4678f" providerId="ADAL" clId="{E2A0B859-04CE-4714-8C81-52AA70A7C49E}" dt="2025-12-17T08:09:02.471" v="350" actId="1076"/>
+          <ac:spMkLst>
+            <pc:docMk/>
+            <pc:sldMk cId="1982739507" sldId="259"/>
+            <ac:spMk id="7" creationId="{3FF7B088-2672-4DBA-4014-684B633AF162}"/>
+          </ac:spMkLst>
+        </pc:spChg>
+        <pc:spChg chg="add mod">
+          <ac:chgData name="Phạm Thông" userId="cb1de41f-d0a9-4c8b-9095-fa88b5d4678f" providerId="ADAL" clId="{E2A0B859-04CE-4714-8C81-52AA70A7C49E}" dt="2025-12-17T08:09:02.471" v="350" actId="1076"/>
+          <ac:spMkLst>
+            <pc:docMk/>
+            <pc:sldMk cId="1982739507" sldId="259"/>
+            <ac:spMk id="8" creationId="{8D06E57F-793A-7D3F-FD92-D01A9CC5D175}"/>
+          </ac:spMkLst>
+        </pc:spChg>
+        <pc:spChg chg="add mod">
+          <ac:chgData name="Phạm Thông" userId="cb1de41f-d0a9-4c8b-9095-fa88b5d4678f" providerId="ADAL" clId="{E2A0B859-04CE-4714-8C81-52AA70A7C49E}" dt="2025-12-17T08:09:02.471" v="350" actId="1076"/>
+          <ac:spMkLst>
+            <pc:docMk/>
+            <pc:sldMk cId="1982739507" sldId="259"/>
+            <ac:spMk id="9" creationId="{13CA4451-23AA-A1B3-276E-88C22E383155}"/>
+          </ac:spMkLst>
+        </pc:spChg>
+        <pc:spChg chg="add del">
+          <ac:chgData name="Phạm Thông" userId="cb1de41f-d0a9-4c8b-9095-fa88b5d4678f" providerId="ADAL" clId="{E2A0B859-04CE-4714-8C81-52AA70A7C49E}" dt="2025-12-16T18:04:27.974" v="267" actId="22"/>
+          <ac:spMkLst>
+            <pc:docMk/>
+            <pc:sldMk cId="1982739507" sldId="259"/>
+            <ac:spMk id="15" creationId="{11B961F8-F39A-1F54-71DE-CF1FE28A4615}"/>
+          </ac:spMkLst>
+        </pc:spChg>
+        <pc:spChg chg="add mod">
+          <ac:chgData name="Phạm Thông" userId="cb1de41f-d0a9-4c8b-9095-fa88b5d4678f" providerId="ADAL" clId="{E2A0B859-04CE-4714-8C81-52AA70A7C49E}" dt="2025-12-17T08:09:02.471" v="350" actId="1076"/>
+          <ac:spMkLst>
+            <pc:docMk/>
+            <pc:sldMk cId="1982739507" sldId="259"/>
+            <ac:spMk id="16" creationId="{A9FC8192-3985-30F0-2892-750CDDE8E02B}"/>
+          </ac:spMkLst>
+        </pc:spChg>
+        <pc:graphicFrameChg chg="add mod modGraphic">
+          <ac:chgData name="Phạm Thông" userId="cb1de41f-d0a9-4c8b-9095-fa88b5d4678f" providerId="ADAL" clId="{E2A0B859-04CE-4714-8C81-52AA70A7C49E}" dt="2025-12-17T08:09:02.471" v="350" actId="1076"/>
+          <ac:graphicFrameMkLst>
+            <pc:docMk/>
+            <pc:sldMk cId="1982739507" sldId="259"/>
+            <ac:graphicFrameMk id="4" creationId="{796A3EDF-2948-6450-8FB7-1A31F3A1D096}"/>
+          </ac:graphicFrameMkLst>
+        </pc:graphicFrameChg>
+        <pc:cxnChg chg="add mod">
+          <ac:chgData name="Phạm Thông" userId="cb1de41f-d0a9-4c8b-9095-fa88b5d4678f" providerId="ADAL" clId="{E2A0B859-04CE-4714-8C81-52AA70A7C49E}" dt="2025-12-17T08:09:02.471" v="350" actId="1076"/>
+          <ac:cxnSpMkLst>
+            <pc:docMk/>
+            <pc:sldMk cId="1982739507" sldId="259"/>
+            <ac:cxnSpMk id="11" creationId="{5A86706F-5368-EB6E-4012-4509FE4CADDE}"/>
+          </ac:cxnSpMkLst>
+        </pc:cxnChg>
+        <pc:cxnChg chg="add mod">
+          <ac:chgData name="Phạm Thông" userId="cb1de41f-d0a9-4c8b-9095-fa88b5d4678f" providerId="ADAL" clId="{E2A0B859-04CE-4714-8C81-52AA70A7C49E}" dt="2025-12-17T08:09:02.471" v="350" actId="1076"/>
+          <ac:cxnSpMkLst>
+            <pc:docMk/>
+            <pc:sldMk cId="1982739507" sldId="259"/>
+            <ac:cxnSpMk id="12" creationId="{E79F5465-4852-9EAE-DF5F-FDE60C52C463}"/>
+          </ac:cxnSpMkLst>
+        </pc:cxnChg>
+        <pc:cxnChg chg="add del">
+          <ac:chgData name="Phạm Thông" userId="cb1de41f-d0a9-4c8b-9095-fa88b5d4678f" providerId="ADAL" clId="{E2A0B859-04CE-4714-8C81-52AA70A7C49E}" dt="2025-12-16T18:05:02.129" v="278" actId="11529"/>
+          <ac:cxnSpMkLst>
+            <pc:docMk/>
+            <pc:sldMk cId="1982739507" sldId="259"/>
+            <ac:cxnSpMk id="18" creationId="{8F8E8038-003F-1752-9393-2264BAD0426A}"/>
+          </ac:cxnSpMkLst>
+        </pc:cxnChg>
+        <pc:cxnChg chg="add mod">
+          <ac:chgData name="Phạm Thông" userId="cb1de41f-d0a9-4c8b-9095-fa88b5d4678f" providerId="ADAL" clId="{E2A0B859-04CE-4714-8C81-52AA70A7C49E}" dt="2025-12-17T08:09:02.471" v="350" actId="1076"/>
+          <ac:cxnSpMkLst>
+            <pc:docMk/>
+            <pc:sldMk cId="1982739507" sldId="259"/>
+            <ac:cxnSpMk id="20" creationId="{D1F3BBAD-DC0D-0092-ADAA-0645CD01CACF}"/>
+          </ac:cxnSpMkLst>
+        </pc:cxnChg>
+      </pc:sldChg>
+      <pc:sldChg chg="addSp modSp new mod">
+        <pc:chgData name="Phạm Thông" userId="cb1de41f-d0a9-4c8b-9095-fa88b5d4678f" providerId="ADAL" clId="{E2A0B859-04CE-4714-8C81-52AA70A7C49E}" dt="2025-12-17T09:38:47.895" v="437" actId="1037"/>
+        <pc:sldMkLst>
+          <pc:docMk/>
+          <pc:sldMk cId="3124328060" sldId="260"/>
+        </pc:sldMkLst>
+        <pc:spChg chg="add mod">
+          <ac:chgData name="Phạm Thông" userId="cb1de41f-d0a9-4c8b-9095-fa88b5d4678f" providerId="ADAL" clId="{E2A0B859-04CE-4714-8C81-52AA70A7C49E}" dt="2025-12-17T09:33:58.053" v="414" actId="1076"/>
+          <ac:spMkLst>
+            <pc:docMk/>
+            <pc:sldMk cId="3124328060" sldId="260"/>
+            <ac:spMk id="5" creationId="{102A74F7-19F6-42D2-B829-D097D6436099}"/>
+          </ac:spMkLst>
+        </pc:spChg>
+        <pc:spChg chg="add mod">
+          <ac:chgData name="Phạm Thông" userId="cb1de41f-d0a9-4c8b-9095-fa88b5d4678f" providerId="ADAL" clId="{E2A0B859-04CE-4714-8C81-52AA70A7C49E}" dt="2025-12-17T09:33:55.788" v="413" actId="1076"/>
+          <ac:spMkLst>
+            <pc:docMk/>
+            <pc:sldMk cId="3124328060" sldId="260"/>
+            <ac:spMk id="6" creationId="{87033B32-854D-DB90-0FEC-75CE19139E8A}"/>
+          </ac:spMkLst>
+        </pc:spChg>
+        <pc:spChg chg="add mod">
+          <ac:chgData name="Phạm Thông" userId="cb1de41f-d0a9-4c8b-9095-fa88b5d4678f" providerId="ADAL" clId="{E2A0B859-04CE-4714-8C81-52AA70A7C49E}" dt="2025-12-17T09:38:29.641" v="428" actId="14100"/>
+          <ac:spMkLst>
+            <pc:docMk/>
+            <pc:sldMk cId="3124328060" sldId="260"/>
+            <ac:spMk id="11" creationId="{27202676-4A4C-BCC5-F094-0CFE21B4B157}"/>
+          </ac:spMkLst>
+        </pc:spChg>
+        <pc:spChg chg="add mod">
+          <ac:chgData name="Phạm Thông" userId="cb1de41f-d0a9-4c8b-9095-fa88b5d4678f" providerId="ADAL" clId="{E2A0B859-04CE-4714-8C81-52AA70A7C49E}" dt="2025-12-17T09:38:37.519" v="430" actId="1076"/>
+          <ac:spMkLst>
+            <pc:docMk/>
+            <pc:sldMk cId="3124328060" sldId="260"/>
+            <ac:spMk id="12" creationId="{D432C202-057C-80DD-A1E8-4479BAE67DED}"/>
+          </ac:spMkLst>
+        </pc:spChg>
+        <pc:spChg chg="add mod">
+          <ac:chgData name="Phạm Thông" userId="cb1de41f-d0a9-4c8b-9095-fa88b5d4678f" providerId="ADAL" clId="{E2A0B859-04CE-4714-8C81-52AA70A7C49E}" dt="2025-12-17T09:38:47.895" v="437" actId="1037"/>
+          <ac:spMkLst>
+            <pc:docMk/>
+            <pc:sldMk cId="3124328060" sldId="260"/>
+            <ac:spMk id="13" creationId="{20104AD8-2D74-F3F7-22CB-760DE816A47E}"/>
+          </ac:spMkLst>
+        </pc:spChg>
+        <pc:graphicFrameChg chg="add mod modGraphic">
+          <ac:chgData name="Phạm Thông" userId="cb1de41f-d0a9-4c8b-9095-fa88b5d4678f" providerId="ADAL" clId="{E2A0B859-04CE-4714-8C81-52AA70A7C49E}" dt="2025-12-17T09:32:37.657" v="380" actId="1076"/>
+          <ac:graphicFrameMkLst>
+            <pc:docMk/>
+            <pc:sldMk cId="3124328060" sldId="260"/>
+            <ac:graphicFrameMk id="2" creationId="{083D4EB6-0D7E-3B89-F33D-30EA238837A0}"/>
+          </ac:graphicFrameMkLst>
+        </pc:graphicFrameChg>
+        <pc:graphicFrameChg chg="add mod">
+          <ac:chgData name="Phạm Thông" userId="cb1de41f-d0a9-4c8b-9095-fa88b5d4678f" providerId="ADAL" clId="{E2A0B859-04CE-4714-8C81-52AA70A7C49E}" dt="2025-12-17T09:32:06.871" v="370"/>
+          <ac:graphicFrameMkLst>
+            <pc:docMk/>
+            <pc:sldMk cId="3124328060" sldId="260"/>
+            <ac:graphicFrameMk id="3" creationId="{648FBAF4-5C32-17C3-7125-1062F3B78DBF}"/>
+          </ac:graphicFrameMkLst>
+        </pc:graphicFrameChg>
+        <pc:graphicFrameChg chg="add mod modGraphic">
+          <ac:chgData name="Phạm Thông" userId="cb1de41f-d0a9-4c8b-9095-fa88b5d4678f" providerId="ADAL" clId="{E2A0B859-04CE-4714-8C81-52AA70A7C49E}" dt="2025-12-17T09:32:57.286" v="387" actId="20577"/>
+          <ac:graphicFrameMkLst>
+            <pc:docMk/>
+            <pc:sldMk cId="3124328060" sldId="260"/>
+            <ac:graphicFrameMk id="4" creationId="{9F872D3E-AE22-8BCA-44E5-6B9D05199019}"/>
+          </ac:graphicFrameMkLst>
+        </pc:graphicFrameChg>
+        <pc:cxnChg chg="add mod">
+          <ac:chgData name="Phạm Thông" userId="cb1de41f-d0a9-4c8b-9095-fa88b5d4678f" providerId="ADAL" clId="{E2A0B859-04CE-4714-8C81-52AA70A7C49E}" dt="2025-12-17T09:34:21.379" v="418" actId="208"/>
+          <ac:cxnSpMkLst>
+            <pc:docMk/>
+            <pc:sldMk cId="3124328060" sldId="260"/>
+            <ac:cxnSpMk id="8" creationId="{D12D209C-01FA-D21F-9F8B-6FE345B04CFC}"/>
+          </ac:cxnSpMkLst>
+        </pc:cxnChg>
+        <pc:cxnChg chg="add mod">
+          <ac:chgData name="Phạm Thông" userId="cb1de41f-d0a9-4c8b-9095-fa88b5d4678f" providerId="ADAL" clId="{E2A0B859-04CE-4714-8C81-52AA70A7C49E}" dt="2025-12-17T09:34:30.815" v="420" actId="1076"/>
+          <ac:cxnSpMkLst>
+            <pc:docMk/>
+            <pc:sldMk cId="3124328060" sldId="260"/>
+            <ac:cxnSpMk id="9" creationId="{6B28568B-B40D-1765-AE63-888AEDC45CB7}"/>
+          </ac:cxnSpMkLst>
+        </pc:cxnChg>
+        <pc:cxnChg chg="add mod">
+          <ac:chgData name="Phạm Thông" userId="cb1de41f-d0a9-4c8b-9095-fa88b5d4678f" providerId="ADAL" clId="{E2A0B859-04CE-4714-8C81-52AA70A7C49E}" dt="2025-12-17T09:34:34.517" v="422" actId="1076"/>
+          <ac:cxnSpMkLst>
+            <pc:docMk/>
+            <pc:sldMk cId="3124328060" sldId="260"/>
+            <ac:cxnSpMk id="10" creationId="{699349DD-74A4-EDF6-B90B-52CA518BD680}"/>
+          </ac:cxnSpMkLst>
+        </pc:cxnChg>
+      </pc:sldChg>
+    </pc:docChg>
+  </pc:docChgLst>
+</pc:chgInfo>
+</file>
+
 <file path=ppt/slideLayouts/slideLayout1.xml><?xml version="1.0" encoding="utf-8"?>
 <p:sldLayout xmlns:a="http://schemas.openxmlformats.org/drawingml/2006/main" xmlns:r="http://schemas.openxmlformats.org/officeDocument/2006/relationships" xmlns:p="http://schemas.openxmlformats.org/presentationml/2006/main" type="title" preserve="1">
   <p:cSld name="Title Slide">
@@ -271,7 +509,7 @@
           <a:p>
             <a:fld id="{6EB22DFD-DB99-45C6-9F20-54734D4D55A2}" type="datetimeFigureOut">
               <a:rPr lang="en-US" smtClean="0"/>
-              <a:t>12/1/2025</a:t>
+              <a:t>12/17/2025</a:t>
             </a:fld>
             <a:endParaRPr lang="en-US"/>
           </a:p>
@@ -469,7 +707,7 @@
           <a:p>
             <a:fld id="{6EB22DFD-DB99-45C6-9F20-54734D4D55A2}" type="datetimeFigureOut">
               <a:rPr lang="en-US" smtClean="0"/>
-              <a:t>12/1/2025</a:t>
+              <a:t>12/17/2025</a:t>
             </a:fld>
             <a:endParaRPr lang="en-US"/>
           </a:p>
@@ -677,7 +915,7 @@
           <a:p>
             <a:fld id="{6EB22DFD-DB99-45C6-9F20-54734D4D55A2}" type="datetimeFigureOut">
               <a:rPr lang="en-US" smtClean="0"/>
-              <a:t>12/1/2025</a:t>
+              <a:t>12/17/2025</a:t>
             </a:fld>
             <a:endParaRPr lang="en-US"/>
           </a:p>
@@ -875,7 +1113,7 @@
           <a:p>
             <a:fld id="{6EB22DFD-DB99-45C6-9F20-54734D4D55A2}" type="datetimeFigureOut">
               <a:rPr lang="en-US" smtClean="0"/>
-              <a:t>12/1/2025</a:t>
+              <a:t>12/17/2025</a:t>
             </a:fld>
             <a:endParaRPr lang="en-US"/>
           </a:p>
@@ -1150,7 +1388,7 @@
           <a:p>
             <a:fld id="{6EB22DFD-DB99-45C6-9F20-54734D4D55A2}" type="datetimeFigureOut">
               <a:rPr lang="en-US" smtClean="0"/>
-              <a:t>12/1/2025</a:t>
+              <a:t>12/17/2025</a:t>
             </a:fld>
             <a:endParaRPr lang="en-US"/>
           </a:p>
@@ -1415,7 +1653,7 @@
           <a:p>
             <a:fld id="{6EB22DFD-DB99-45C6-9F20-54734D4D55A2}" type="datetimeFigureOut">
               <a:rPr lang="en-US" smtClean="0"/>
-              <a:t>12/1/2025</a:t>
+              <a:t>12/17/2025</a:t>
             </a:fld>
             <a:endParaRPr lang="en-US"/>
           </a:p>
@@ -1827,7 +2065,7 @@
           <a:p>
             <a:fld id="{6EB22DFD-DB99-45C6-9F20-54734D4D55A2}" type="datetimeFigureOut">
               <a:rPr lang="en-US" smtClean="0"/>
-              <a:t>12/1/2025</a:t>
+              <a:t>12/17/2025</a:t>
             </a:fld>
             <a:endParaRPr lang="en-US"/>
           </a:p>
@@ -1968,7 +2206,7 @@
           <a:p>
             <a:fld id="{6EB22DFD-DB99-45C6-9F20-54734D4D55A2}" type="datetimeFigureOut">
               <a:rPr lang="en-US" smtClean="0"/>
-              <a:t>12/1/2025</a:t>
+              <a:t>12/17/2025</a:t>
             </a:fld>
             <a:endParaRPr lang="en-US"/>
           </a:p>
@@ -2081,7 +2319,7 @@
           <a:p>
             <a:fld id="{6EB22DFD-DB99-45C6-9F20-54734D4D55A2}" type="datetimeFigureOut">
               <a:rPr lang="en-US" smtClean="0"/>
-              <a:t>12/1/2025</a:t>
+              <a:t>12/17/2025</a:t>
             </a:fld>
             <a:endParaRPr lang="en-US"/>
           </a:p>
@@ -2392,7 +2630,7 @@
           <a:p>
             <a:fld id="{6EB22DFD-DB99-45C6-9F20-54734D4D55A2}" type="datetimeFigureOut">
               <a:rPr lang="en-US" smtClean="0"/>
-              <a:t>12/1/2025</a:t>
+              <a:t>12/17/2025</a:t>
             </a:fld>
             <a:endParaRPr lang="en-US"/>
           </a:p>
@@ -2680,7 +2918,7 @@
           <a:p>
             <a:fld id="{6EB22DFD-DB99-45C6-9F20-54734D4D55A2}" type="datetimeFigureOut">
               <a:rPr lang="en-US" smtClean="0"/>
-              <a:t>12/1/2025</a:t>
+              <a:t>12/17/2025</a:t>
             </a:fld>
             <a:endParaRPr lang="en-US"/>
           </a:p>
@@ -2921,7 +3159,7 @@
           <a:p>
             <a:fld id="{6EB22DFD-DB99-45C6-9F20-54734D4D55A2}" type="datetimeFigureOut">
               <a:rPr lang="en-US" smtClean="0"/>
-              <a:t>12/1/2025</a:t>
+              <a:t>12/17/2025</a:t>
             </a:fld>
             <a:endParaRPr lang="en-US"/>
           </a:p>
@@ -4396,6 +4634,3222 @@
     <p:extLst>
       <p:ext uri="{BB962C8B-B14F-4D97-AF65-F5344CB8AC3E}">
         <p14:creationId xmlns:p14="http://schemas.microsoft.com/office/powerpoint/2010/main" val="127622980"/>
+      </p:ext>
+    </p:extLst>
+  </p:cSld>
+  <p:clrMapOvr>
+    <a:masterClrMapping/>
+  </p:clrMapOvr>
+</p:sld>
+</file>
+
+<file path=ppt/slides/slide3.xml><?xml version="1.0" encoding="utf-8"?>
+<p:sld xmlns:a="http://schemas.openxmlformats.org/drawingml/2006/main" xmlns:r="http://schemas.openxmlformats.org/officeDocument/2006/relationships" xmlns:p="http://schemas.openxmlformats.org/presentationml/2006/main">
+  <p:cSld>
+    <p:spTree>
+      <p:nvGrpSpPr>
+        <p:cNvPr id="1" name=""/>
+        <p:cNvGrpSpPr/>
+        <p:nvPr/>
+      </p:nvGrpSpPr>
+      <p:grpSpPr>
+        <a:xfrm>
+          <a:off x="0" y="0"/>
+          <a:ext cx="0" cy="0"/>
+          <a:chOff x="0" y="0"/>
+          <a:chExt cx="0" cy="0"/>
+        </a:xfrm>
+      </p:grpSpPr>
+      <p:graphicFrame>
+        <p:nvGraphicFramePr>
+          <p:cNvPr id="4" name="Table 3">
+            <a:extLst>
+              <a:ext uri="{FF2B5EF4-FFF2-40B4-BE49-F238E27FC236}">
+                <a16:creationId xmlns:a16="http://schemas.microsoft.com/office/drawing/2014/main" id="{796A3EDF-2948-6450-8FB7-1A31F3A1D096}"/>
+              </a:ext>
+            </a:extLst>
+          </p:cNvPr>
+          <p:cNvGraphicFramePr>
+            <a:graphicFrameLocks noGrp="1"/>
+          </p:cNvGraphicFramePr>
+          <p:nvPr>
+            <p:extLst>
+              <p:ext uri="{D42A27DB-BD31-4B8C-83A1-F6EECF244321}">
+                <p14:modId xmlns:p14="http://schemas.microsoft.com/office/powerpoint/2010/main" val="2464787661"/>
+              </p:ext>
+            </p:extLst>
+          </p:nvPr>
+        </p:nvGraphicFramePr>
+        <p:xfrm>
+          <a:off x="997913" y="1574800"/>
+          <a:ext cx="4622500" cy="3708400"/>
+        </p:xfrm>
+        <a:graphic>
+          <a:graphicData uri="http://schemas.openxmlformats.org/drawingml/2006/table">
+            <a:tbl>
+              <a:tblPr firstRow="1" bandRow="1">
+                <a:tableStyleId>{5940675A-B579-460E-94D1-54222C63F5DA}</a:tableStyleId>
+              </a:tblPr>
+              <a:tblGrid>
+                <a:gridCol w="462250">
+                  <a:extLst>
+                    <a:ext uri="{9D8B030D-6E8A-4147-A177-3AD203B41FA5}">
+                      <a16:colId xmlns:a16="http://schemas.microsoft.com/office/drawing/2014/main" val="422131534"/>
+                    </a:ext>
+                  </a:extLst>
+                </a:gridCol>
+                <a:gridCol w="462250">
+                  <a:extLst>
+                    <a:ext uri="{9D8B030D-6E8A-4147-A177-3AD203B41FA5}">
+                      <a16:colId xmlns:a16="http://schemas.microsoft.com/office/drawing/2014/main" val="629250132"/>
+                    </a:ext>
+                  </a:extLst>
+                </a:gridCol>
+                <a:gridCol w="462250">
+                  <a:extLst>
+                    <a:ext uri="{9D8B030D-6E8A-4147-A177-3AD203B41FA5}">
+                      <a16:colId xmlns:a16="http://schemas.microsoft.com/office/drawing/2014/main" val="502619958"/>
+                    </a:ext>
+                  </a:extLst>
+                </a:gridCol>
+                <a:gridCol w="462250">
+                  <a:extLst>
+                    <a:ext uri="{9D8B030D-6E8A-4147-A177-3AD203B41FA5}">
+                      <a16:colId xmlns:a16="http://schemas.microsoft.com/office/drawing/2014/main" val="1380321012"/>
+                    </a:ext>
+                  </a:extLst>
+                </a:gridCol>
+                <a:gridCol w="462250">
+                  <a:extLst>
+                    <a:ext uri="{9D8B030D-6E8A-4147-A177-3AD203B41FA5}">
+                      <a16:colId xmlns:a16="http://schemas.microsoft.com/office/drawing/2014/main" val="659905740"/>
+                    </a:ext>
+                  </a:extLst>
+                </a:gridCol>
+                <a:gridCol w="462250">
+                  <a:extLst>
+                    <a:ext uri="{9D8B030D-6E8A-4147-A177-3AD203B41FA5}">
+                      <a16:colId xmlns:a16="http://schemas.microsoft.com/office/drawing/2014/main" val="2924599126"/>
+                    </a:ext>
+                  </a:extLst>
+                </a:gridCol>
+                <a:gridCol w="462250">
+                  <a:extLst>
+                    <a:ext uri="{9D8B030D-6E8A-4147-A177-3AD203B41FA5}">
+                      <a16:colId xmlns:a16="http://schemas.microsoft.com/office/drawing/2014/main" val="3075818111"/>
+                    </a:ext>
+                  </a:extLst>
+                </a:gridCol>
+                <a:gridCol w="462250">
+                  <a:extLst>
+                    <a:ext uri="{9D8B030D-6E8A-4147-A177-3AD203B41FA5}">
+                      <a16:colId xmlns:a16="http://schemas.microsoft.com/office/drawing/2014/main" val="3125537976"/>
+                    </a:ext>
+                  </a:extLst>
+                </a:gridCol>
+                <a:gridCol w="462250">
+                  <a:extLst>
+                    <a:ext uri="{9D8B030D-6E8A-4147-A177-3AD203B41FA5}">
+                      <a16:colId xmlns:a16="http://schemas.microsoft.com/office/drawing/2014/main" val="3213295594"/>
+                    </a:ext>
+                  </a:extLst>
+                </a:gridCol>
+                <a:gridCol w="462250">
+                  <a:extLst>
+                    <a:ext uri="{9D8B030D-6E8A-4147-A177-3AD203B41FA5}">
+                      <a16:colId xmlns:a16="http://schemas.microsoft.com/office/drawing/2014/main" val="2135092256"/>
+                    </a:ext>
+                  </a:extLst>
+                </a:gridCol>
+              </a:tblGrid>
+              <a:tr h="370840">
+                <a:tc>
+                  <a:txBody>
+                    <a:bodyPr/>
+                    <a:lstStyle/>
+                    <a:p>
+                      <a:pPr algn="ctr"/>
+                      <a:endParaRPr lang="en-US"/>
+                    </a:p>
+                  </a:txBody>
+                  <a:tcPr anchor="ctr">
+                    <a:solidFill>
+                      <a:schemeClr val="tx2">
+                        <a:lumMod val="25000"/>
+                        <a:lumOff val="75000"/>
+                      </a:schemeClr>
+                    </a:solidFill>
+                  </a:tcPr>
+                </a:tc>
+                <a:tc>
+                  <a:txBody>
+                    <a:bodyPr/>
+                    <a:lstStyle/>
+                    <a:p>
+                      <a:pPr algn="ctr"/>
+                      <a:endParaRPr lang="en-US"/>
+                    </a:p>
+                  </a:txBody>
+                  <a:tcPr anchor="ctr">
+                    <a:solidFill>
+                      <a:schemeClr val="tx2">
+                        <a:lumMod val="25000"/>
+                        <a:lumOff val="75000"/>
+                      </a:schemeClr>
+                    </a:solidFill>
+                  </a:tcPr>
+                </a:tc>
+                <a:tc>
+                  <a:txBody>
+                    <a:bodyPr/>
+                    <a:lstStyle/>
+                    <a:p>
+                      <a:pPr algn="ctr"/>
+                      <a:r>
+                        <a:rPr lang="en-US"/>
+                        <a:t>E</a:t>
+                      </a:r>
+                    </a:p>
+                  </a:txBody>
+                  <a:tcPr anchor="ctr">
+                    <a:solidFill>
+                      <a:schemeClr val="tx2">
+                        <a:lumMod val="25000"/>
+                        <a:lumOff val="75000"/>
+                      </a:schemeClr>
+                    </a:solidFill>
+                  </a:tcPr>
+                </a:tc>
+                <a:tc>
+                  <a:txBody>
+                    <a:bodyPr/>
+                    <a:lstStyle/>
+                    <a:p>
+                      <a:pPr algn="ctr"/>
+                      <a:r>
+                        <a:rPr lang="en-US"/>
+                        <a:t>L</a:t>
+                      </a:r>
+                    </a:p>
+                  </a:txBody>
+                  <a:tcPr anchor="ctr">
+                    <a:solidFill>
+                      <a:schemeClr val="tx2">
+                        <a:lumMod val="25000"/>
+                        <a:lumOff val="75000"/>
+                      </a:schemeClr>
+                    </a:solidFill>
+                  </a:tcPr>
+                </a:tc>
+                <a:tc>
+                  <a:txBody>
+                    <a:bodyPr/>
+                    <a:lstStyle/>
+                    <a:p>
+                      <a:pPr algn="ctr"/>
+                      <a:r>
+                        <a:rPr lang="en-US"/>
+                        <a:t>E</a:t>
+                      </a:r>
+                    </a:p>
+                  </a:txBody>
+                  <a:tcPr anchor="ctr">
+                    <a:solidFill>
+                      <a:schemeClr val="tx2">
+                        <a:lumMod val="25000"/>
+                        <a:lumOff val="75000"/>
+                      </a:schemeClr>
+                    </a:solidFill>
+                  </a:tcPr>
+                </a:tc>
+                <a:tc>
+                  <a:txBody>
+                    <a:bodyPr/>
+                    <a:lstStyle/>
+                    <a:p>
+                      <a:pPr algn="ctr"/>
+                      <a:r>
+                        <a:rPr lang="en-US"/>
+                        <a:t>P</a:t>
+                      </a:r>
+                    </a:p>
+                  </a:txBody>
+                  <a:tcPr anchor="ctr">
+                    <a:solidFill>
+                      <a:schemeClr val="tx2">
+                        <a:lumMod val="25000"/>
+                        <a:lumOff val="75000"/>
+                      </a:schemeClr>
+                    </a:solidFill>
+                  </a:tcPr>
+                </a:tc>
+                <a:tc>
+                  <a:txBody>
+                    <a:bodyPr/>
+                    <a:lstStyle/>
+                    <a:p>
+                      <a:pPr algn="ctr"/>
+                      <a:r>
+                        <a:rPr lang="en-US"/>
+                        <a:t>H</a:t>
+                      </a:r>
+                    </a:p>
+                  </a:txBody>
+                  <a:tcPr anchor="ctr">
+                    <a:solidFill>
+                      <a:schemeClr val="tx2">
+                        <a:lumMod val="25000"/>
+                        <a:lumOff val="75000"/>
+                      </a:schemeClr>
+                    </a:solidFill>
+                  </a:tcPr>
+                </a:tc>
+                <a:tc>
+                  <a:txBody>
+                    <a:bodyPr/>
+                    <a:lstStyle/>
+                    <a:p>
+                      <a:pPr algn="ctr"/>
+                      <a:r>
+                        <a:rPr lang="en-US"/>
+                        <a:t>A</a:t>
+                      </a:r>
+                    </a:p>
+                  </a:txBody>
+                  <a:tcPr anchor="ctr">
+                    <a:solidFill>
+                      <a:schemeClr val="tx2">
+                        <a:lumMod val="25000"/>
+                        <a:lumOff val="75000"/>
+                      </a:schemeClr>
+                    </a:solidFill>
+                  </a:tcPr>
+                </a:tc>
+                <a:tc>
+                  <a:txBody>
+                    <a:bodyPr/>
+                    <a:lstStyle/>
+                    <a:p>
+                      <a:pPr algn="ctr"/>
+                      <a:r>
+                        <a:rPr lang="en-US"/>
+                        <a:t>N</a:t>
+                      </a:r>
+                    </a:p>
+                  </a:txBody>
+                  <a:tcPr anchor="ctr">
+                    <a:solidFill>
+                      <a:schemeClr val="tx2">
+                        <a:lumMod val="25000"/>
+                        <a:lumOff val="75000"/>
+                      </a:schemeClr>
+                    </a:solidFill>
+                  </a:tcPr>
+                </a:tc>
+                <a:tc>
+                  <a:txBody>
+                    <a:bodyPr/>
+                    <a:lstStyle/>
+                    <a:p>
+                      <a:pPr algn="ctr"/>
+                      <a:r>
+                        <a:rPr lang="en-US"/>
+                        <a:t>T</a:t>
+                      </a:r>
+                    </a:p>
+                  </a:txBody>
+                  <a:tcPr anchor="ctr">
+                    <a:solidFill>
+                      <a:schemeClr val="tx2">
+                        <a:lumMod val="25000"/>
+                        <a:lumOff val="75000"/>
+                      </a:schemeClr>
+                    </a:solidFill>
+                  </a:tcPr>
+                </a:tc>
+                <a:extLst>
+                  <a:ext uri="{0D108BD9-81ED-4DB2-BD59-A6C34878D82A}">
+                    <a16:rowId xmlns:a16="http://schemas.microsoft.com/office/drawing/2014/main" val="391458514"/>
+                  </a:ext>
+                </a:extLst>
+              </a:tr>
+              <a:tr h="370840">
+                <a:tc>
+                  <a:txBody>
+                    <a:bodyPr/>
+                    <a:lstStyle/>
+                    <a:p>
+                      <a:pPr algn="ctr"/>
+                      <a:endParaRPr lang="en-US"/>
+                    </a:p>
+                  </a:txBody>
+                  <a:tcPr anchor="ctr">
+                    <a:solidFill>
+                      <a:schemeClr val="tx2">
+                        <a:lumMod val="25000"/>
+                        <a:lumOff val="75000"/>
+                      </a:schemeClr>
+                    </a:solidFill>
+                  </a:tcPr>
+                </a:tc>
+                <a:tc>
+                  <a:txBody>
+                    <a:bodyPr/>
+                    <a:lstStyle/>
+                    <a:p>
+                      <a:pPr algn="ctr"/>
+                      <a:r>
+                        <a:rPr lang="en-US"/>
+                        <a:t>0</a:t>
+                      </a:r>
+                    </a:p>
+                  </a:txBody>
+                  <a:tcPr anchor="ctr">
+                    <a:solidFill>
+                      <a:schemeClr val="accent2">
+                        <a:lumMod val="40000"/>
+                        <a:lumOff val="60000"/>
+                      </a:schemeClr>
+                    </a:solidFill>
+                  </a:tcPr>
+                </a:tc>
+                <a:tc>
+                  <a:txBody>
+                    <a:bodyPr/>
+                    <a:lstStyle/>
+                    <a:p>
+                      <a:pPr algn="ctr"/>
+                      <a:r>
+                        <a:rPr lang="en-US"/>
+                        <a:t>1</a:t>
+                      </a:r>
+                    </a:p>
+                  </a:txBody>
+                  <a:tcPr anchor="ctr"/>
+                </a:tc>
+                <a:tc>
+                  <a:txBody>
+                    <a:bodyPr/>
+                    <a:lstStyle/>
+                    <a:p>
+                      <a:pPr algn="ctr"/>
+                      <a:r>
+                        <a:rPr lang="en-US"/>
+                        <a:t>2</a:t>
+                      </a:r>
+                    </a:p>
+                  </a:txBody>
+                  <a:tcPr anchor="ctr"/>
+                </a:tc>
+                <a:tc>
+                  <a:txBody>
+                    <a:bodyPr/>
+                    <a:lstStyle/>
+                    <a:p>
+                      <a:pPr algn="ctr"/>
+                      <a:r>
+                        <a:rPr lang="en-US"/>
+                        <a:t>3</a:t>
+                      </a:r>
+                    </a:p>
+                  </a:txBody>
+                  <a:tcPr anchor="ctr"/>
+                </a:tc>
+                <a:tc>
+                  <a:txBody>
+                    <a:bodyPr/>
+                    <a:lstStyle/>
+                    <a:p>
+                      <a:pPr algn="ctr"/>
+                      <a:r>
+                        <a:rPr lang="en-US"/>
+                        <a:t>4</a:t>
+                      </a:r>
+                    </a:p>
+                  </a:txBody>
+                  <a:tcPr anchor="ctr"/>
+                </a:tc>
+                <a:tc>
+                  <a:txBody>
+                    <a:bodyPr/>
+                    <a:lstStyle/>
+                    <a:p>
+                      <a:pPr algn="ctr"/>
+                      <a:r>
+                        <a:rPr lang="en-US"/>
+                        <a:t>5</a:t>
+                      </a:r>
+                    </a:p>
+                  </a:txBody>
+                  <a:tcPr anchor="ctr"/>
+                </a:tc>
+                <a:tc>
+                  <a:txBody>
+                    <a:bodyPr/>
+                    <a:lstStyle/>
+                    <a:p>
+                      <a:pPr algn="ctr"/>
+                      <a:r>
+                        <a:rPr lang="en-US"/>
+                        <a:t>6</a:t>
+                      </a:r>
+                    </a:p>
+                  </a:txBody>
+                  <a:tcPr anchor="ctr"/>
+                </a:tc>
+                <a:tc>
+                  <a:txBody>
+                    <a:bodyPr/>
+                    <a:lstStyle/>
+                    <a:p>
+                      <a:pPr algn="ctr"/>
+                      <a:r>
+                        <a:rPr lang="en-US"/>
+                        <a:t>7</a:t>
+                      </a:r>
+                    </a:p>
+                  </a:txBody>
+                  <a:tcPr anchor="ctr"/>
+                </a:tc>
+                <a:tc>
+                  <a:txBody>
+                    <a:bodyPr/>
+                    <a:lstStyle/>
+                    <a:p>
+                      <a:pPr algn="ctr"/>
+                      <a:r>
+                        <a:rPr lang="en-US"/>
+                        <a:t>8</a:t>
+                      </a:r>
+                    </a:p>
+                  </a:txBody>
+                  <a:tcPr anchor="ctr"/>
+                </a:tc>
+                <a:extLst>
+                  <a:ext uri="{0D108BD9-81ED-4DB2-BD59-A6C34878D82A}">
+                    <a16:rowId xmlns:a16="http://schemas.microsoft.com/office/drawing/2014/main" val="2262580134"/>
+                  </a:ext>
+                </a:extLst>
+              </a:tr>
+              <a:tr h="370840">
+                <a:tc>
+                  <a:txBody>
+                    <a:bodyPr/>
+                    <a:lstStyle/>
+                    <a:p>
+                      <a:pPr algn="ctr"/>
+                      <a:r>
+                        <a:rPr lang="en-US"/>
+                        <a:t>R</a:t>
+                      </a:r>
+                    </a:p>
+                  </a:txBody>
+                  <a:tcPr anchor="ctr">
+                    <a:solidFill>
+                      <a:schemeClr val="tx2">
+                        <a:lumMod val="25000"/>
+                        <a:lumOff val="75000"/>
+                      </a:schemeClr>
+                    </a:solidFill>
+                  </a:tcPr>
+                </a:tc>
+                <a:tc>
+                  <a:txBody>
+                    <a:bodyPr/>
+                    <a:lstStyle/>
+                    <a:p>
+                      <a:pPr algn="ctr"/>
+                      <a:r>
+                        <a:rPr lang="en-US"/>
+                        <a:t>1</a:t>
+                      </a:r>
+                    </a:p>
+                  </a:txBody>
+                  <a:tcPr anchor="ctr">
+                    <a:solidFill>
+                      <a:schemeClr val="accent2">
+                        <a:lumMod val="40000"/>
+                        <a:lumOff val="60000"/>
+                      </a:schemeClr>
+                    </a:solidFill>
+                  </a:tcPr>
+                </a:tc>
+                <a:tc>
+                  <a:txBody>
+                    <a:bodyPr/>
+                    <a:lstStyle/>
+                    <a:p>
+                      <a:pPr algn="ctr"/>
+                      <a:r>
+                        <a:rPr lang="en-US"/>
+                        <a:t>1</a:t>
+                      </a:r>
+                    </a:p>
+                  </a:txBody>
+                  <a:tcPr anchor="ctr"/>
+                </a:tc>
+                <a:tc>
+                  <a:txBody>
+                    <a:bodyPr/>
+                    <a:lstStyle/>
+                    <a:p>
+                      <a:pPr algn="ctr"/>
+                      <a:r>
+                        <a:rPr lang="en-US"/>
+                        <a:t>2</a:t>
+                      </a:r>
+                    </a:p>
+                  </a:txBody>
+                  <a:tcPr anchor="ctr"/>
+                </a:tc>
+                <a:tc>
+                  <a:txBody>
+                    <a:bodyPr/>
+                    <a:lstStyle/>
+                    <a:p>
+                      <a:pPr algn="ctr"/>
+                      <a:r>
+                        <a:rPr lang="en-US"/>
+                        <a:t>3</a:t>
+                      </a:r>
+                    </a:p>
+                  </a:txBody>
+                  <a:tcPr anchor="ctr"/>
+                </a:tc>
+                <a:tc>
+                  <a:txBody>
+                    <a:bodyPr/>
+                    <a:lstStyle/>
+                    <a:p>
+                      <a:pPr algn="ctr"/>
+                      <a:r>
+                        <a:rPr lang="en-US"/>
+                        <a:t>4</a:t>
+                      </a:r>
+                    </a:p>
+                  </a:txBody>
+                  <a:tcPr anchor="ctr"/>
+                </a:tc>
+                <a:tc>
+                  <a:txBody>
+                    <a:bodyPr/>
+                    <a:lstStyle/>
+                    <a:p>
+                      <a:pPr algn="ctr"/>
+                      <a:r>
+                        <a:rPr lang="en-US"/>
+                        <a:t>5</a:t>
+                      </a:r>
+                    </a:p>
+                  </a:txBody>
+                  <a:tcPr anchor="ctr"/>
+                </a:tc>
+                <a:tc>
+                  <a:txBody>
+                    <a:bodyPr/>
+                    <a:lstStyle/>
+                    <a:p>
+                      <a:pPr algn="ctr"/>
+                      <a:r>
+                        <a:rPr lang="en-US"/>
+                        <a:t>6</a:t>
+                      </a:r>
+                    </a:p>
+                  </a:txBody>
+                  <a:tcPr anchor="ctr"/>
+                </a:tc>
+                <a:tc>
+                  <a:txBody>
+                    <a:bodyPr/>
+                    <a:lstStyle/>
+                    <a:p>
+                      <a:pPr algn="ctr"/>
+                      <a:r>
+                        <a:rPr lang="en-US"/>
+                        <a:t>7</a:t>
+                      </a:r>
+                    </a:p>
+                  </a:txBody>
+                  <a:tcPr anchor="ctr"/>
+                </a:tc>
+                <a:tc>
+                  <a:txBody>
+                    <a:bodyPr/>
+                    <a:lstStyle/>
+                    <a:p>
+                      <a:pPr algn="ctr"/>
+                      <a:r>
+                        <a:rPr lang="en-US"/>
+                        <a:t>8</a:t>
+                      </a:r>
+                    </a:p>
+                  </a:txBody>
+                  <a:tcPr anchor="ctr"/>
+                </a:tc>
+                <a:extLst>
+                  <a:ext uri="{0D108BD9-81ED-4DB2-BD59-A6C34878D82A}">
+                    <a16:rowId xmlns:a16="http://schemas.microsoft.com/office/drawing/2014/main" val="3095288255"/>
+                  </a:ext>
+                </a:extLst>
+              </a:tr>
+              <a:tr h="370840">
+                <a:tc>
+                  <a:txBody>
+                    <a:bodyPr/>
+                    <a:lstStyle/>
+                    <a:p>
+                      <a:pPr algn="ctr"/>
+                      <a:r>
+                        <a:rPr lang="en-US"/>
+                        <a:t>E</a:t>
+                      </a:r>
+                    </a:p>
+                  </a:txBody>
+                  <a:tcPr anchor="ctr">
+                    <a:solidFill>
+                      <a:schemeClr val="tx2">
+                        <a:lumMod val="25000"/>
+                        <a:lumOff val="75000"/>
+                      </a:schemeClr>
+                    </a:solidFill>
+                  </a:tcPr>
+                </a:tc>
+                <a:tc>
+                  <a:txBody>
+                    <a:bodyPr/>
+                    <a:lstStyle/>
+                    <a:p>
+                      <a:pPr algn="ctr"/>
+                      <a:r>
+                        <a:rPr lang="en-US"/>
+                        <a:t>2</a:t>
+                      </a:r>
+                    </a:p>
+                  </a:txBody>
+                  <a:tcPr anchor="ctr"/>
+                </a:tc>
+                <a:tc>
+                  <a:txBody>
+                    <a:bodyPr/>
+                    <a:lstStyle/>
+                    <a:p>
+                      <a:pPr algn="ctr"/>
+                      <a:r>
+                        <a:rPr lang="en-US"/>
+                        <a:t>1</a:t>
+                      </a:r>
+                    </a:p>
+                  </a:txBody>
+                  <a:tcPr anchor="ctr">
+                    <a:solidFill>
+                      <a:schemeClr val="accent2">
+                        <a:lumMod val="40000"/>
+                        <a:lumOff val="60000"/>
+                      </a:schemeClr>
+                    </a:solidFill>
+                  </a:tcPr>
+                </a:tc>
+                <a:tc>
+                  <a:txBody>
+                    <a:bodyPr/>
+                    <a:lstStyle/>
+                    <a:p>
+                      <a:pPr algn="ctr"/>
+                      <a:r>
+                        <a:rPr lang="en-US"/>
+                        <a:t>2</a:t>
+                      </a:r>
+                    </a:p>
+                  </a:txBody>
+                  <a:tcPr anchor="ctr"/>
+                </a:tc>
+                <a:tc>
+                  <a:txBody>
+                    <a:bodyPr/>
+                    <a:lstStyle/>
+                    <a:p>
+                      <a:pPr algn="ctr"/>
+                      <a:r>
+                        <a:rPr lang="en-US"/>
+                        <a:t>2</a:t>
+                      </a:r>
+                    </a:p>
+                  </a:txBody>
+                  <a:tcPr anchor="ctr"/>
+                </a:tc>
+                <a:tc>
+                  <a:txBody>
+                    <a:bodyPr/>
+                    <a:lstStyle/>
+                    <a:p>
+                      <a:pPr algn="ctr"/>
+                      <a:r>
+                        <a:rPr lang="en-US"/>
+                        <a:t>3</a:t>
+                      </a:r>
+                    </a:p>
+                  </a:txBody>
+                  <a:tcPr anchor="ctr"/>
+                </a:tc>
+                <a:tc>
+                  <a:txBody>
+                    <a:bodyPr/>
+                    <a:lstStyle/>
+                    <a:p>
+                      <a:pPr algn="ctr"/>
+                      <a:r>
+                        <a:rPr lang="en-US"/>
+                        <a:t>4</a:t>
+                      </a:r>
+                    </a:p>
+                  </a:txBody>
+                  <a:tcPr anchor="ctr"/>
+                </a:tc>
+                <a:tc>
+                  <a:txBody>
+                    <a:bodyPr/>
+                    <a:lstStyle/>
+                    <a:p>
+                      <a:pPr algn="ctr"/>
+                      <a:r>
+                        <a:rPr lang="en-US"/>
+                        <a:t>5</a:t>
+                      </a:r>
+                    </a:p>
+                  </a:txBody>
+                  <a:tcPr anchor="ctr"/>
+                </a:tc>
+                <a:tc>
+                  <a:txBody>
+                    <a:bodyPr/>
+                    <a:lstStyle/>
+                    <a:p>
+                      <a:pPr algn="ctr"/>
+                      <a:r>
+                        <a:rPr lang="en-US"/>
+                        <a:t>6</a:t>
+                      </a:r>
+                    </a:p>
+                  </a:txBody>
+                  <a:tcPr anchor="ctr"/>
+                </a:tc>
+                <a:tc>
+                  <a:txBody>
+                    <a:bodyPr/>
+                    <a:lstStyle/>
+                    <a:p>
+                      <a:pPr algn="ctr"/>
+                      <a:r>
+                        <a:rPr lang="en-US"/>
+                        <a:t>7</a:t>
+                      </a:r>
+                    </a:p>
+                  </a:txBody>
+                  <a:tcPr anchor="ctr"/>
+                </a:tc>
+                <a:extLst>
+                  <a:ext uri="{0D108BD9-81ED-4DB2-BD59-A6C34878D82A}">
+                    <a16:rowId xmlns:a16="http://schemas.microsoft.com/office/drawing/2014/main" val="3183104422"/>
+                  </a:ext>
+                </a:extLst>
+              </a:tr>
+              <a:tr h="370840">
+                <a:tc>
+                  <a:txBody>
+                    <a:bodyPr/>
+                    <a:lstStyle/>
+                    <a:p>
+                      <a:pPr algn="ctr"/>
+                      <a:r>
+                        <a:rPr lang="en-US"/>
+                        <a:t>L</a:t>
+                      </a:r>
+                    </a:p>
+                  </a:txBody>
+                  <a:tcPr anchor="ctr">
+                    <a:solidFill>
+                      <a:schemeClr val="tx2">
+                        <a:lumMod val="25000"/>
+                        <a:lumOff val="75000"/>
+                      </a:schemeClr>
+                    </a:solidFill>
+                  </a:tcPr>
+                </a:tc>
+                <a:tc>
+                  <a:txBody>
+                    <a:bodyPr/>
+                    <a:lstStyle/>
+                    <a:p>
+                      <a:pPr algn="ctr"/>
+                      <a:r>
+                        <a:rPr lang="en-US"/>
+                        <a:t>3</a:t>
+                      </a:r>
+                    </a:p>
+                  </a:txBody>
+                  <a:tcPr anchor="ctr"/>
+                </a:tc>
+                <a:tc>
+                  <a:txBody>
+                    <a:bodyPr/>
+                    <a:lstStyle/>
+                    <a:p>
+                      <a:pPr algn="ctr"/>
+                      <a:r>
+                        <a:rPr lang="en-US"/>
+                        <a:t>2</a:t>
+                      </a:r>
+                    </a:p>
+                  </a:txBody>
+                  <a:tcPr anchor="ctr"/>
+                </a:tc>
+                <a:tc>
+                  <a:txBody>
+                    <a:bodyPr/>
+                    <a:lstStyle/>
+                    <a:p>
+                      <a:pPr algn="ctr"/>
+                      <a:r>
+                        <a:rPr lang="en-US"/>
+                        <a:t>1</a:t>
+                      </a:r>
+                    </a:p>
+                  </a:txBody>
+                  <a:tcPr anchor="ctr">
+                    <a:solidFill>
+                      <a:schemeClr val="accent2">
+                        <a:lumMod val="40000"/>
+                        <a:lumOff val="60000"/>
+                      </a:schemeClr>
+                    </a:solidFill>
+                  </a:tcPr>
+                </a:tc>
+                <a:tc>
+                  <a:txBody>
+                    <a:bodyPr/>
+                    <a:lstStyle/>
+                    <a:p>
+                      <a:pPr algn="ctr"/>
+                      <a:r>
+                        <a:rPr lang="en-US"/>
+                        <a:t>2</a:t>
+                      </a:r>
+                    </a:p>
+                  </a:txBody>
+                  <a:tcPr anchor="ctr"/>
+                </a:tc>
+                <a:tc>
+                  <a:txBody>
+                    <a:bodyPr/>
+                    <a:lstStyle/>
+                    <a:p>
+                      <a:pPr algn="ctr"/>
+                      <a:r>
+                        <a:rPr lang="en-US"/>
+                        <a:t>3</a:t>
+                      </a:r>
+                    </a:p>
+                  </a:txBody>
+                  <a:tcPr anchor="ctr"/>
+                </a:tc>
+                <a:tc>
+                  <a:txBody>
+                    <a:bodyPr/>
+                    <a:lstStyle/>
+                    <a:p>
+                      <a:pPr algn="ctr"/>
+                      <a:r>
+                        <a:rPr lang="en-US"/>
+                        <a:t>4</a:t>
+                      </a:r>
+                    </a:p>
+                  </a:txBody>
+                  <a:tcPr anchor="ctr"/>
+                </a:tc>
+                <a:tc>
+                  <a:txBody>
+                    <a:bodyPr/>
+                    <a:lstStyle/>
+                    <a:p>
+                      <a:pPr algn="ctr"/>
+                      <a:r>
+                        <a:rPr lang="en-US"/>
+                        <a:t>5</a:t>
+                      </a:r>
+                    </a:p>
+                  </a:txBody>
+                  <a:tcPr anchor="ctr"/>
+                </a:tc>
+                <a:tc>
+                  <a:txBody>
+                    <a:bodyPr/>
+                    <a:lstStyle/>
+                    <a:p>
+                      <a:pPr algn="ctr"/>
+                      <a:r>
+                        <a:rPr lang="en-US"/>
+                        <a:t>6</a:t>
+                      </a:r>
+                    </a:p>
+                  </a:txBody>
+                  <a:tcPr anchor="ctr"/>
+                </a:tc>
+                <a:tc>
+                  <a:txBody>
+                    <a:bodyPr/>
+                    <a:lstStyle/>
+                    <a:p>
+                      <a:pPr algn="ctr"/>
+                      <a:r>
+                        <a:rPr lang="en-US"/>
+                        <a:t>7</a:t>
+                      </a:r>
+                    </a:p>
+                  </a:txBody>
+                  <a:tcPr anchor="ctr"/>
+                </a:tc>
+                <a:extLst>
+                  <a:ext uri="{0D108BD9-81ED-4DB2-BD59-A6C34878D82A}">
+                    <a16:rowId xmlns:a16="http://schemas.microsoft.com/office/drawing/2014/main" val="2776570998"/>
+                  </a:ext>
+                </a:extLst>
+              </a:tr>
+              <a:tr h="370840">
+                <a:tc>
+                  <a:txBody>
+                    <a:bodyPr/>
+                    <a:lstStyle/>
+                    <a:p>
+                      <a:pPr algn="ctr"/>
+                      <a:r>
+                        <a:rPr lang="en-US"/>
+                        <a:t>E</a:t>
+                      </a:r>
+                    </a:p>
+                  </a:txBody>
+                  <a:tcPr anchor="ctr">
+                    <a:solidFill>
+                      <a:schemeClr val="tx2">
+                        <a:lumMod val="25000"/>
+                        <a:lumOff val="75000"/>
+                      </a:schemeClr>
+                    </a:solidFill>
+                  </a:tcPr>
+                </a:tc>
+                <a:tc>
+                  <a:txBody>
+                    <a:bodyPr/>
+                    <a:lstStyle/>
+                    <a:p>
+                      <a:pPr algn="ctr"/>
+                      <a:r>
+                        <a:rPr lang="en-US"/>
+                        <a:t>4</a:t>
+                      </a:r>
+                    </a:p>
+                  </a:txBody>
+                  <a:tcPr anchor="ctr"/>
+                </a:tc>
+                <a:tc>
+                  <a:txBody>
+                    <a:bodyPr/>
+                    <a:lstStyle/>
+                    <a:p>
+                      <a:pPr algn="ctr"/>
+                      <a:r>
+                        <a:rPr lang="en-US"/>
+                        <a:t>3</a:t>
+                      </a:r>
+                    </a:p>
+                  </a:txBody>
+                  <a:tcPr anchor="ctr"/>
+                </a:tc>
+                <a:tc>
+                  <a:txBody>
+                    <a:bodyPr/>
+                    <a:lstStyle/>
+                    <a:p>
+                      <a:pPr algn="ctr"/>
+                      <a:r>
+                        <a:rPr lang="en-US"/>
+                        <a:t>2</a:t>
+                      </a:r>
+                    </a:p>
+                  </a:txBody>
+                  <a:tcPr anchor="ctr"/>
+                </a:tc>
+                <a:tc>
+                  <a:txBody>
+                    <a:bodyPr/>
+                    <a:lstStyle/>
+                    <a:p>
+                      <a:pPr algn="ctr"/>
+                      <a:r>
+                        <a:rPr lang="en-US"/>
+                        <a:t>1</a:t>
+                      </a:r>
+                    </a:p>
+                  </a:txBody>
+                  <a:tcPr anchor="ctr">
+                    <a:solidFill>
+                      <a:schemeClr val="accent2">
+                        <a:lumMod val="40000"/>
+                        <a:lumOff val="60000"/>
+                      </a:schemeClr>
+                    </a:solidFill>
+                  </a:tcPr>
+                </a:tc>
+                <a:tc>
+                  <a:txBody>
+                    <a:bodyPr/>
+                    <a:lstStyle/>
+                    <a:p>
+                      <a:pPr algn="ctr"/>
+                      <a:r>
+                        <a:rPr lang="en-US"/>
+                        <a:t>2</a:t>
+                      </a:r>
+                    </a:p>
+                  </a:txBody>
+                  <a:tcPr anchor="ctr">
+                    <a:solidFill>
+                      <a:schemeClr val="accent2">
+                        <a:lumMod val="40000"/>
+                        <a:lumOff val="60000"/>
+                      </a:schemeClr>
+                    </a:solidFill>
+                  </a:tcPr>
+                </a:tc>
+                <a:tc>
+                  <a:txBody>
+                    <a:bodyPr/>
+                    <a:lstStyle/>
+                    <a:p>
+                      <a:pPr algn="ctr"/>
+                      <a:r>
+                        <a:rPr lang="en-US"/>
+                        <a:t>3</a:t>
+                      </a:r>
+                    </a:p>
+                  </a:txBody>
+                  <a:tcPr anchor="ctr"/>
+                </a:tc>
+                <a:tc>
+                  <a:txBody>
+                    <a:bodyPr/>
+                    <a:lstStyle/>
+                    <a:p>
+                      <a:pPr algn="ctr"/>
+                      <a:r>
+                        <a:rPr lang="en-US"/>
+                        <a:t>4</a:t>
+                      </a:r>
+                    </a:p>
+                  </a:txBody>
+                  <a:tcPr anchor="ctr"/>
+                </a:tc>
+                <a:tc>
+                  <a:txBody>
+                    <a:bodyPr/>
+                    <a:lstStyle/>
+                    <a:p>
+                      <a:pPr algn="ctr"/>
+                      <a:r>
+                        <a:rPr lang="en-US"/>
+                        <a:t>5</a:t>
+                      </a:r>
+                    </a:p>
+                  </a:txBody>
+                  <a:tcPr anchor="ctr"/>
+                </a:tc>
+                <a:tc>
+                  <a:txBody>
+                    <a:bodyPr/>
+                    <a:lstStyle/>
+                    <a:p>
+                      <a:pPr algn="ctr"/>
+                      <a:r>
+                        <a:rPr lang="en-US"/>
+                        <a:t>6</a:t>
+                      </a:r>
+                    </a:p>
+                  </a:txBody>
+                  <a:tcPr anchor="ctr"/>
+                </a:tc>
+                <a:extLst>
+                  <a:ext uri="{0D108BD9-81ED-4DB2-BD59-A6C34878D82A}">
+                    <a16:rowId xmlns:a16="http://schemas.microsoft.com/office/drawing/2014/main" val="4272089998"/>
+                  </a:ext>
+                </a:extLst>
+              </a:tr>
+              <a:tr h="370840">
+                <a:tc>
+                  <a:txBody>
+                    <a:bodyPr/>
+                    <a:lstStyle/>
+                    <a:p>
+                      <a:pPr algn="ctr"/>
+                      <a:r>
+                        <a:rPr lang="en-US"/>
+                        <a:t>V</a:t>
+                      </a:r>
+                    </a:p>
+                  </a:txBody>
+                  <a:tcPr anchor="ctr">
+                    <a:solidFill>
+                      <a:schemeClr val="tx2">
+                        <a:lumMod val="25000"/>
+                        <a:lumOff val="75000"/>
+                      </a:schemeClr>
+                    </a:solidFill>
+                  </a:tcPr>
+                </a:tc>
+                <a:tc>
+                  <a:txBody>
+                    <a:bodyPr/>
+                    <a:lstStyle/>
+                    <a:p>
+                      <a:pPr algn="ctr"/>
+                      <a:r>
+                        <a:rPr lang="en-US"/>
+                        <a:t>5</a:t>
+                      </a:r>
+                    </a:p>
+                  </a:txBody>
+                  <a:tcPr anchor="ctr"/>
+                </a:tc>
+                <a:tc>
+                  <a:txBody>
+                    <a:bodyPr/>
+                    <a:lstStyle/>
+                    <a:p>
+                      <a:pPr algn="ctr"/>
+                      <a:r>
+                        <a:rPr lang="en-US"/>
+                        <a:t>4</a:t>
+                      </a:r>
+                    </a:p>
+                  </a:txBody>
+                  <a:tcPr anchor="ctr"/>
+                </a:tc>
+                <a:tc>
+                  <a:txBody>
+                    <a:bodyPr/>
+                    <a:lstStyle/>
+                    <a:p>
+                      <a:pPr algn="ctr"/>
+                      <a:r>
+                        <a:rPr lang="en-US"/>
+                        <a:t>3</a:t>
+                      </a:r>
+                    </a:p>
+                  </a:txBody>
+                  <a:tcPr anchor="ctr"/>
+                </a:tc>
+                <a:tc>
+                  <a:txBody>
+                    <a:bodyPr/>
+                    <a:lstStyle/>
+                    <a:p>
+                      <a:pPr algn="ctr"/>
+                      <a:r>
+                        <a:rPr lang="en-US"/>
+                        <a:t>2</a:t>
+                      </a:r>
+                    </a:p>
+                  </a:txBody>
+                  <a:tcPr anchor="ctr"/>
+                </a:tc>
+                <a:tc>
+                  <a:txBody>
+                    <a:bodyPr/>
+                    <a:lstStyle/>
+                    <a:p>
+                      <a:pPr algn="ctr"/>
+                      <a:r>
+                        <a:rPr lang="en-US"/>
+                        <a:t>2</a:t>
+                      </a:r>
+                    </a:p>
+                  </a:txBody>
+                  <a:tcPr anchor="ctr"/>
+                </a:tc>
+                <a:tc>
+                  <a:txBody>
+                    <a:bodyPr/>
+                    <a:lstStyle/>
+                    <a:p>
+                      <a:pPr algn="ctr"/>
+                      <a:r>
+                        <a:rPr lang="en-US"/>
+                        <a:t>3</a:t>
+                      </a:r>
+                    </a:p>
+                  </a:txBody>
+                  <a:tcPr anchor="ctr">
+                    <a:solidFill>
+                      <a:schemeClr val="accent2">
+                        <a:lumMod val="40000"/>
+                        <a:lumOff val="60000"/>
+                      </a:schemeClr>
+                    </a:solidFill>
+                  </a:tcPr>
+                </a:tc>
+                <a:tc>
+                  <a:txBody>
+                    <a:bodyPr/>
+                    <a:lstStyle/>
+                    <a:p>
+                      <a:pPr algn="ctr"/>
+                      <a:r>
+                        <a:rPr lang="en-US"/>
+                        <a:t>4</a:t>
+                      </a:r>
+                    </a:p>
+                  </a:txBody>
+                  <a:tcPr anchor="ctr"/>
+                </a:tc>
+                <a:tc>
+                  <a:txBody>
+                    <a:bodyPr/>
+                    <a:lstStyle/>
+                    <a:p>
+                      <a:pPr algn="ctr"/>
+                      <a:r>
+                        <a:rPr lang="en-US"/>
+                        <a:t>5</a:t>
+                      </a:r>
+                    </a:p>
+                  </a:txBody>
+                  <a:tcPr anchor="ctr"/>
+                </a:tc>
+                <a:tc>
+                  <a:txBody>
+                    <a:bodyPr/>
+                    <a:lstStyle/>
+                    <a:p>
+                      <a:pPr algn="ctr"/>
+                      <a:r>
+                        <a:rPr lang="en-US"/>
+                        <a:t>6</a:t>
+                      </a:r>
+                    </a:p>
+                  </a:txBody>
+                  <a:tcPr anchor="ctr"/>
+                </a:tc>
+                <a:extLst>
+                  <a:ext uri="{0D108BD9-81ED-4DB2-BD59-A6C34878D82A}">
+                    <a16:rowId xmlns:a16="http://schemas.microsoft.com/office/drawing/2014/main" val="2060323657"/>
+                  </a:ext>
+                </a:extLst>
+              </a:tr>
+              <a:tr h="370840">
+                <a:tc>
+                  <a:txBody>
+                    <a:bodyPr/>
+                    <a:lstStyle/>
+                    <a:p>
+                      <a:pPr algn="ctr"/>
+                      <a:r>
+                        <a:rPr lang="en-US"/>
+                        <a:t>A</a:t>
+                      </a:r>
+                    </a:p>
+                  </a:txBody>
+                  <a:tcPr anchor="ctr">
+                    <a:solidFill>
+                      <a:schemeClr val="tx2">
+                        <a:lumMod val="25000"/>
+                        <a:lumOff val="75000"/>
+                      </a:schemeClr>
+                    </a:solidFill>
+                  </a:tcPr>
+                </a:tc>
+                <a:tc>
+                  <a:txBody>
+                    <a:bodyPr/>
+                    <a:lstStyle/>
+                    <a:p>
+                      <a:pPr algn="ctr"/>
+                      <a:r>
+                        <a:rPr lang="en-US"/>
+                        <a:t>6</a:t>
+                      </a:r>
+                    </a:p>
+                  </a:txBody>
+                  <a:tcPr anchor="ctr"/>
+                </a:tc>
+                <a:tc>
+                  <a:txBody>
+                    <a:bodyPr/>
+                    <a:lstStyle/>
+                    <a:p>
+                      <a:pPr algn="ctr"/>
+                      <a:r>
+                        <a:rPr lang="en-US"/>
+                        <a:t>5</a:t>
+                      </a:r>
+                    </a:p>
+                  </a:txBody>
+                  <a:tcPr anchor="ctr"/>
+                </a:tc>
+                <a:tc>
+                  <a:txBody>
+                    <a:bodyPr/>
+                    <a:lstStyle/>
+                    <a:p>
+                      <a:pPr algn="ctr"/>
+                      <a:r>
+                        <a:rPr lang="en-US"/>
+                        <a:t>4</a:t>
+                      </a:r>
+                    </a:p>
+                  </a:txBody>
+                  <a:tcPr anchor="ctr"/>
+                </a:tc>
+                <a:tc>
+                  <a:txBody>
+                    <a:bodyPr/>
+                    <a:lstStyle/>
+                    <a:p>
+                      <a:pPr algn="ctr"/>
+                      <a:r>
+                        <a:rPr lang="en-US"/>
+                        <a:t>3</a:t>
+                      </a:r>
+                    </a:p>
+                  </a:txBody>
+                  <a:tcPr anchor="ctr"/>
+                </a:tc>
+                <a:tc>
+                  <a:txBody>
+                    <a:bodyPr/>
+                    <a:lstStyle/>
+                    <a:p>
+                      <a:pPr algn="ctr"/>
+                      <a:r>
+                        <a:rPr lang="en-US"/>
+                        <a:t>3</a:t>
+                      </a:r>
+                    </a:p>
+                  </a:txBody>
+                  <a:tcPr anchor="ctr"/>
+                </a:tc>
+                <a:tc>
+                  <a:txBody>
+                    <a:bodyPr/>
+                    <a:lstStyle/>
+                    <a:p>
+                      <a:pPr algn="ctr"/>
+                      <a:r>
+                        <a:rPr lang="en-US"/>
+                        <a:t>3</a:t>
+                      </a:r>
+                    </a:p>
+                  </a:txBody>
+                  <a:tcPr anchor="ctr"/>
+                </a:tc>
+                <a:tc>
+                  <a:txBody>
+                    <a:bodyPr/>
+                    <a:lstStyle/>
+                    <a:p>
+                      <a:pPr algn="ctr"/>
+                      <a:r>
+                        <a:rPr lang="en-US"/>
+                        <a:t>3</a:t>
+                      </a:r>
+                    </a:p>
+                  </a:txBody>
+                  <a:tcPr anchor="ctr">
+                    <a:solidFill>
+                      <a:schemeClr val="accent2">
+                        <a:lumMod val="40000"/>
+                        <a:lumOff val="60000"/>
+                      </a:schemeClr>
+                    </a:solidFill>
+                  </a:tcPr>
+                </a:tc>
+                <a:tc>
+                  <a:txBody>
+                    <a:bodyPr/>
+                    <a:lstStyle/>
+                    <a:p>
+                      <a:pPr algn="ctr"/>
+                      <a:r>
+                        <a:rPr lang="en-US"/>
+                        <a:t>4</a:t>
+                      </a:r>
+                    </a:p>
+                  </a:txBody>
+                  <a:tcPr anchor="ctr"/>
+                </a:tc>
+                <a:tc>
+                  <a:txBody>
+                    <a:bodyPr/>
+                    <a:lstStyle/>
+                    <a:p>
+                      <a:pPr algn="ctr"/>
+                      <a:r>
+                        <a:rPr lang="en-US"/>
+                        <a:t>5</a:t>
+                      </a:r>
+                    </a:p>
+                  </a:txBody>
+                  <a:tcPr anchor="ctr"/>
+                </a:tc>
+                <a:extLst>
+                  <a:ext uri="{0D108BD9-81ED-4DB2-BD59-A6C34878D82A}">
+                    <a16:rowId xmlns:a16="http://schemas.microsoft.com/office/drawing/2014/main" val="3030508028"/>
+                  </a:ext>
+                </a:extLst>
+              </a:tr>
+              <a:tr h="370840">
+                <a:tc>
+                  <a:txBody>
+                    <a:bodyPr/>
+                    <a:lstStyle/>
+                    <a:p>
+                      <a:pPr algn="ctr"/>
+                      <a:r>
+                        <a:rPr lang="en-US"/>
+                        <a:t>N</a:t>
+                      </a:r>
+                    </a:p>
+                  </a:txBody>
+                  <a:tcPr anchor="ctr">
+                    <a:solidFill>
+                      <a:schemeClr val="tx2">
+                        <a:lumMod val="25000"/>
+                        <a:lumOff val="75000"/>
+                      </a:schemeClr>
+                    </a:solidFill>
+                  </a:tcPr>
+                </a:tc>
+                <a:tc>
+                  <a:txBody>
+                    <a:bodyPr/>
+                    <a:lstStyle/>
+                    <a:p>
+                      <a:pPr algn="ctr"/>
+                      <a:r>
+                        <a:rPr lang="en-US"/>
+                        <a:t>7</a:t>
+                      </a:r>
+                    </a:p>
+                  </a:txBody>
+                  <a:tcPr anchor="ctr"/>
+                </a:tc>
+                <a:tc>
+                  <a:txBody>
+                    <a:bodyPr/>
+                    <a:lstStyle/>
+                    <a:p>
+                      <a:pPr algn="ctr"/>
+                      <a:r>
+                        <a:rPr lang="en-US"/>
+                        <a:t>6</a:t>
+                      </a:r>
+                    </a:p>
+                  </a:txBody>
+                  <a:tcPr anchor="ctr"/>
+                </a:tc>
+                <a:tc>
+                  <a:txBody>
+                    <a:bodyPr/>
+                    <a:lstStyle/>
+                    <a:p>
+                      <a:pPr algn="ctr"/>
+                      <a:r>
+                        <a:rPr lang="en-US"/>
+                        <a:t>5</a:t>
+                      </a:r>
+                    </a:p>
+                  </a:txBody>
+                  <a:tcPr anchor="ctr"/>
+                </a:tc>
+                <a:tc>
+                  <a:txBody>
+                    <a:bodyPr/>
+                    <a:lstStyle/>
+                    <a:p>
+                      <a:pPr algn="ctr"/>
+                      <a:r>
+                        <a:rPr lang="en-US"/>
+                        <a:t>4</a:t>
+                      </a:r>
+                    </a:p>
+                  </a:txBody>
+                  <a:tcPr anchor="ctr"/>
+                </a:tc>
+                <a:tc>
+                  <a:txBody>
+                    <a:bodyPr/>
+                    <a:lstStyle/>
+                    <a:p>
+                      <a:pPr algn="ctr"/>
+                      <a:r>
+                        <a:rPr lang="en-US"/>
+                        <a:t>4</a:t>
+                      </a:r>
+                    </a:p>
+                  </a:txBody>
+                  <a:tcPr anchor="ctr"/>
+                </a:tc>
+                <a:tc>
+                  <a:txBody>
+                    <a:bodyPr/>
+                    <a:lstStyle/>
+                    <a:p>
+                      <a:pPr algn="ctr"/>
+                      <a:r>
+                        <a:rPr lang="en-US"/>
+                        <a:t>4</a:t>
+                      </a:r>
+                    </a:p>
+                  </a:txBody>
+                  <a:tcPr anchor="ctr"/>
+                </a:tc>
+                <a:tc>
+                  <a:txBody>
+                    <a:bodyPr/>
+                    <a:lstStyle/>
+                    <a:p>
+                      <a:pPr algn="ctr"/>
+                      <a:r>
+                        <a:rPr lang="en-US"/>
+                        <a:t>4</a:t>
+                      </a:r>
+                    </a:p>
+                  </a:txBody>
+                  <a:tcPr anchor="ctr"/>
+                </a:tc>
+                <a:tc>
+                  <a:txBody>
+                    <a:bodyPr/>
+                    <a:lstStyle/>
+                    <a:p>
+                      <a:pPr algn="ctr"/>
+                      <a:r>
+                        <a:rPr lang="en-US"/>
+                        <a:t>3</a:t>
+                      </a:r>
+                    </a:p>
+                  </a:txBody>
+                  <a:tcPr anchor="ctr">
+                    <a:solidFill>
+                      <a:schemeClr val="accent2">
+                        <a:lumMod val="40000"/>
+                        <a:lumOff val="60000"/>
+                      </a:schemeClr>
+                    </a:solidFill>
+                  </a:tcPr>
+                </a:tc>
+                <a:tc>
+                  <a:txBody>
+                    <a:bodyPr/>
+                    <a:lstStyle/>
+                    <a:p>
+                      <a:pPr algn="ctr"/>
+                      <a:r>
+                        <a:rPr lang="en-US"/>
+                        <a:t>4</a:t>
+                      </a:r>
+                    </a:p>
+                  </a:txBody>
+                  <a:tcPr anchor="ctr"/>
+                </a:tc>
+                <a:extLst>
+                  <a:ext uri="{0D108BD9-81ED-4DB2-BD59-A6C34878D82A}">
+                    <a16:rowId xmlns:a16="http://schemas.microsoft.com/office/drawing/2014/main" val="2577924057"/>
+                  </a:ext>
+                </a:extLst>
+              </a:tr>
+              <a:tr h="370840">
+                <a:tc>
+                  <a:txBody>
+                    <a:bodyPr/>
+                    <a:lstStyle/>
+                    <a:p>
+                      <a:pPr algn="ctr"/>
+                      <a:r>
+                        <a:rPr lang="en-US"/>
+                        <a:t>T</a:t>
+                      </a:r>
+                    </a:p>
+                  </a:txBody>
+                  <a:tcPr anchor="ctr">
+                    <a:solidFill>
+                      <a:schemeClr val="tx2">
+                        <a:lumMod val="25000"/>
+                        <a:lumOff val="75000"/>
+                      </a:schemeClr>
+                    </a:solidFill>
+                  </a:tcPr>
+                </a:tc>
+                <a:tc>
+                  <a:txBody>
+                    <a:bodyPr/>
+                    <a:lstStyle/>
+                    <a:p>
+                      <a:pPr algn="ctr"/>
+                      <a:r>
+                        <a:rPr lang="en-US"/>
+                        <a:t>8</a:t>
+                      </a:r>
+                    </a:p>
+                  </a:txBody>
+                  <a:tcPr anchor="ctr"/>
+                </a:tc>
+                <a:tc>
+                  <a:txBody>
+                    <a:bodyPr/>
+                    <a:lstStyle/>
+                    <a:p>
+                      <a:pPr algn="ctr"/>
+                      <a:r>
+                        <a:rPr lang="en-US"/>
+                        <a:t>7</a:t>
+                      </a:r>
+                    </a:p>
+                  </a:txBody>
+                  <a:tcPr anchor="ctr"/>
+                </a:tc>
+                <a:tc>
+                  <a:txBody>
+                    <a:bodyPr/>
+                    <a:lstStyle/>
+                    <a:p>
+                      <a:pPr algn="ctr"/>
+                      <a:r>
+                        <a:rPr lang="en-US"/>
+                        <a:t>6</a:t>
+                      </a:r>
+                    </a:p>
+                  </a:txBody>
+                  <a:tcPr anchor="ctr"/>
+                </a:tc>
+                <a:tc>
+                  <a:txBody>
+                    <a:bodyPr/>
+                    <a:lstStyle/>
+                    <a:p>
+                      <a:pPr algn="ctr"/>
+                      <a:r>
+                        <a:rPr lang="en-US"/>
+                        <a:t>5</a:t>
+                      </a:r>
+                    </a:p>
+                  </a:txBody>
+                  <a:tcPr anchor="ctr"/>
+                </a:tc>
+                <a:tc>
+                  <a:txBody>
+                    <a:bodyPr/>
+                    <a:lstStyle/>
+                    <a:p>
+                      <a:pPr algn="ctr"/>
+                      <a:r>
+                        <a:rPr lang="en-US"/>
+                        <a:t>5</a:t>
+                      </a:r>
+                    </a:p>
+                  </a:txBody>
+                  <a:tcPr anchor="ctr"/>
+                </a:tc>
+                <a:tc>
+                  <a:txBody>
+                    <a:bodyPr/>
+                    <a:lstStyle/>
+                    <a:p>
+                      <a:pPr algn="ctr"/>
+                      <a:r>
+                        <a:rPr lang="en-US"/>
+                        <a:t>5</a:t>
+                      </a:r>
+                    </a:p>
+                  </a:txBody>
+                  <a:tcPr anchor="ctr"/>
+                </a:tc>
+                <a:tc>
+                  <a:txBody>
+                    <a:bodyPr/>
+                    <a:lstStyle/>
+                    <a:p>
+                      <a:pPr algn="ctr"/>
+                      <a:r>
+                        <a:rPr lang="en-US"/>
+                        <a:t>5</a:t>
+                      </a:r>
+                    </a:p>
+                  </a:txBody>
+                  <a:tcPr anchor="ctr"/>
+                </a:tc>
+                <a:tc>
+                  <a:txBody>
+                    <a:bodyPr/>
+                    <a:lstStyle/>
+                    <a:p>
+                      <a:pPr algn="ctr"/>
+                      <a:r>
+                        <a:rPr lang="en-US"/>
+                        <a:t>4</a:t>
+                      </a:r>
+                    </a:p>
+                  </a:txBody>
+                  <a:tcPr anchor="ctr"/>
+                </a:tc>
+                <a:tc>
+                  <a:txBody>
+                    <a:bodyPr/>
+                    <a:lstStyle/>
+                    <a:p>
+                      <a:pPr algn="ctr"/>
+                      <a:r>
+                        <a:rPr lang="en-US"/>
+                        <a:t>3</a:t>
+                      </a:r>
+                    </a:p>
+                  </a:txBody>
+                  <a:tcPr anchor="ctr">
+                    <a:solidFill>
+                      <a:schemeClr val="accent2">
+                        <a:lumMod val="40000"/>
+                        <a:lumOff val="60000"/>
+                      </a:schemeClr>
+                    </a:solidFill>
+                  </a:tcPr>
+                </a:tc>
+                <a:extLst>
+                  <a:ext uri="{0D108BD9-81ED-4DB2-BD59-A6C34878D82A}">
+                    <a16:rowId xmlns:a16="http://schemas.microsoft.com/office/drawing/2014/main" val="2020531070"/>
+                  </a:ext>
+                </a:extLst>
+              </a:tr>
+            </a:tbl>
+          </a:graphicData>
+        </a:graphic>
+      </p:graphicFrame>
+      <p:sp>
+        <p:nvSpPr>
+          <p:cNvPr id="5" name="TextBox 4">
+            <a:extLst>
+              <a:ext uri="{FF2B5EF4-FFF2-40B4-BE49-F238E27FC236}">
+                <a16:creationId xmlns:a16="http://schemas.microsoft.com/office/drawing/2014/main" id="{BB2666C0-A672-84C8-E163-BC31F78754CC}"/>
+              </a:ext>
+            </a:extLst>
+          </p:cNvPr>
+          <p:cNvSpPr txBox="1"/>
+          <p:nvPr/>
+        </p:nvSpPr>
+        <p:spPr>
+          <a:xfrm>
+            <a:off x="6292560" y="2416160"/>
+            <a:ext cx="4039888" cy="707886"/>
+          </a:xfrm>
+          <a:prstGeom prst="rect">
+            <a:avLst/>
+          </a:prstGeom>
+          <a:noFill/>
+        </p:spPr>
+        <p:txBody>
+          <a:bodyPr wrap="square" rtlCol="0">
+            <a:spAutoFit/>
+          </a:bodyPr>
+          <a:lstStyle/>
+          <a:p>
+            <a:r>
+              <a:rPr lang="en-US" sz="4000"/>
+              <a:t>E  L  E  P  H  A  N  T</a:t>
+            </a:r>
+          </a:p>
+        </p:txBody>
+      </p:sp>
+      <p:sp>
+        <p:nvSpPr>
+          <p:cNvPr id="6" name="TextBox 5">
+            <a:extLst>
+              <a:ext uri="{FF2B5EF4-FFF2-40B4-BE49-F238E27FC236}">
+                <a16:creationId xmlns:a16="http://schemas.microsoft.com/office/drawing/2014/main" id="{2CFB5071-3481-210D-66BB-9ECB03B17FFF}"/>
+              </a:ext>
+            </a:extLst>
+          </p:cNvPr>
+          <p:cNvSpPr txBox="1"/>
+          <p:nvPr/>
+        </p:nvSpPr>
+        <p:spPr>
+          <a:xfrm>
+            <a:off x="6349828" y="3647452"/>
+            <a:ext cx="4075155" cy="707886"/>
+          </a:xfrm>
+          <a:prstGeom prst="rect">
+            <a:avLst/>
+          </a:prstGeom>
+          <a:noFill/>
+        </p:spPr>
+        <p:txBody>
+          <a:bodyPr wrap="square" rtlCol="0">
+            <a:spAutoFit/>
+          </a:bodyPr>
+          <a:lstStyle/>
+          <a:p>
+            <a:r>
+              <a:rPr lang="en-US" sz="4000">
+                <a:solidFill>
+                  <a:schemeClr val="bg2">
+                    <a:lumMod val="90000"/>
+                  </a:schemeClr>
+                </a:solidFill>
+              </a:rPr>
+              <a:t>R  </a:t>
+            </a:r>
+            <a:r>
+              <a:rPr lang="en-US" sz="4000"/>
+              <a:t>E  L  E	 V  A  N  T</a:t>
+            </a:r>
+          </a:p>
+        </p:txBody>
+      </p:sp>
+      <p:sp>
+        <p:nvSpPr>
+          <p:cNvPr id="7" name="TextBox 6">
+            <a:extLst>
+              <a:ext uri="{FF2B5EF4-FFF2-40B4-BE49-F238E27FC236}">
+                <a16:creationId xmlns:a16="http://schemas.microsoft.com/office/drawing/2014/main" id="{3FF7B088-2672-4DBA-4014-684B633AF162}"/>
+              </a:ext>
+            </a:extLst>
+          </p:cNvPr>
+          <p:cNvSpPr txBox="1"/>
+          <p:nvPr/>
+        </p:nvSpPr>
+        <p:spPr>
+          <a:xfrm>
+            <a:off x="6201088" y="4265653"/>
+            <a:ext cx="813492" cy="369332"/>
+          </a:xfrm>
+          <a:prstGeom prst="rect">
+            <a:avLst/>
+          </a:prstGeom>
+          <a:noFill/>
+        </p:spPr>
+        <p:txBody>
+          <a:bodyPr wrap="square" rtlCol="0">
+            <a:spAutoFit/>
+          </a:bodyPr>
+          <a:lstStyle/>
+          <a:p>
+            <a:r>
+              <a:rPr lang="en-US">
+                <a:solidFill>
+                  <a:schemeClr val="tx2">
+                    <a:lumMod val="50000"/>
+                    <a:lumOff val="50000"/>
+                  </a:schemeClr>
+                </a:solidFill>
+              </a:rPr>
+              <a:t>delete</a:t>
+            </a:r>
+          </a:p>
+        </p:txBody>
+      </p:sp>
+      <p:sp>
+        <p:nvSpPr>
+          <p:cNvPr id="8" name="TextBox 7">
+            <a:extLst>
+              <a:ext uri="{FF2B5EF4-FFF2-40B4-BE49-F238E27FC236}">
+                <a16:creationId xmlns:a16="http://schemas.microsoft.com/office/drawing/2014/main" id="{8D06E57F-793A-7D3F-FD92-D01A9CC5D175}"/>
+              </a:ext>
+            </a:extLst>
+          </p:cNvPr>
+          <p:cNvSpPr txBox="1"/>
+          <p:nvPr/>
+        </p:nvSpPr>
+        <p:spPr>
+          <a:xfrm>
+            <a:off x="8331935" y="4283870"/>
+            <a:ext cx="752129" cy="369332"/>
+          </a:xfrm>
+          <a:prstGeom prst="rect">
+            <a:avLst/>
+          </a:prstGeom>
+          <a:noFill/>
+        </p:spPr>
+        <p:txBody>
+          <a:bodyPr wrap="square" rtlCol="0">
+            <a:spAutoFit/>
+          </a:bodyPr>
+          <a:lstStyle/>
+          <a:p>
+            <a:r>
+              <a:rPr lang="en-US">
+                <a:solidFill>
+                  <a:schemeClr val="tx2">
+                    <a:lumMod val="50000"/>
+                    <a:lumOff val="50000"/>
+                  </a:schemeClr>
+                </a:solidFill>
+              </a:rPr>
+              <a:t>insert</a:t>
+            </a:r>
+          </a:p>
+        </p:txBody>
+      </p:sp>
+      <p:sp>
+        <p:nvSpPr>
+          <p:cNvPr id="9" name="TextBox 8">
+            <a:extLst>
+              <a:ext uri="{FF2B5EF4-FFF2-40B4-BE49-F238E27FC236}">
+                <a16:creationId xmlns:a16="http://schemas.microsoft.com/office/drawing/2014/main" id="{13CA4451-23AA-A1B3-276E-88C22E383155}"/>
+              </a:ext>
+            </a:extLst>
+          </p:cNvPr>
+          <p:cNvSpPr txBox="1"/>
+          <p:nvPr/>
+        </p:nvSpPr>
+        <p:spPr>
+          <a:xfrm>
+            <a:off x="8504283" y="3201083"/>
+            <a:ext cx="936538" cy="369332"/>
+          </a:xfrm>
+          <a:prstGeom prst="rect">
+            <a:avLst/>
+          </a:prstGeom>
+          <a:noFill/>
+        </p:spPr>
+        <p:txBody>
+          <a:bodyPr wrap="square" rtlCol="0">
+            <a:spAutoFit/>
+          </a:bodyPr>
+          <a:lstStyle/>
+          <a:p>
+            <a:r>
+              <a:rPr lang="en-US">
+                <a:solidFill>
+                  <a:schemeClr val="tx2">
+                    <a:lumMod val="50000"/>
+                    <a:lumOff val="50000"/>
+                  </a:schemeClr>
+                </a:solidFill>
+              </a:rPr>
+              <a:t>replace</a:t>
+            </a:r>
+          </a:p>
+        </p:txBody>
+      </p:sp>
+      <p:cxnSp>
+        <p:nvCxnSpPr>
+          <p:cNvPr id="11" name="Straight Connector 10">
+            <a:extLst>
+              <a:ext uri="{FF2B5EF4-FFF2-40B4-BE49-F238E27FC236}">
+                <a16:creationId xmlns:a16="http://schemas.microsoft.com/office/drawing/2014/main" id="{5A86706F-5368-EB6E-4012-4509FE4CADDE}"/>
+              </a:ext>
+            </a:extLst>
+          </p:cNvPr>
+          <p:cNvCxnSpPr>
+            <a:cxnSpLocks/>
+          </p:cNvCxnSpPr>
+          <p:nvPr/>
+        </p:nvCxnSpPr>
+        <p:spPr>
+          <a:xfrm>
+            <a:off x="8504283" y="3021697"/>
+            <a:ext cx="0" cy="738019"/>
+          </a:xfrm>
+          <a:prstGeom prst="line">
+            <a:avLst/>
+          </a:prstGeom>
+          <a:ln>
+            <a:solidFill>
+              <a:schemeClr val="tx2">
+                <a:lumMod val="50000"/>
+                <a:lumOff val="50000"/>
+              </a:schemeClr>
+            </a:solidFill>
+          </a:ln>
+        </p:spPr>
+        <p:style>
+          <a:lnRef idx="2">
+            <a:schemeClr val="accent1"/>
+          </a:lnRef>
+          <a:fillRef idx="0">
+            <a:schemeClr val="accent1"/>
+          </a:fillRef>
+          <a:effectRef idx="1">
+            <a:schemeClr val="accent1"/>
+          </a:effectRef>
+          <a:fontRef idx="minor">
+            <a:schemeClr val="tx1"/>
+          </a:fontRef>
+        </p:style>
+      </p:cxnSp>
+      <p:cxnSp>
+        <p:nvCxnSpPr>
+          <p:cNvPr id="12" name="Straight Connector 11">
+            <a:extLst>
+              <a:ext uri="{FF2B5EF4-FFF2-40B4-BE49-F238E27FC236}">
+                <a16:creationId xmlns:a16="http://schemas.microsoft.com/office/drawing/2014/main" id="{E79F5465-4852-9EAE-DF5F-FDE60C52C463}"/>
+              </a:ext>
+            </a:extLst>
+          </p:cNvPr>
+          <p:cNvCxnSpPr>
+            <a:cxnSpLocks/>
+          </p:cNvCxnSpPr>
+          <p:nvPr/>
+        </p:nvCxnSpPr>
+        <p:spPr>
+          <a:xfrm flipH="1">
+            <a:off x="6292560" y="3759716"/>
+            <a:ext cx="553714" cy="505937"/>
+          </a:xfrm>
+          <a:prstGeom prst="line">
+            <a:avLst/>
+          </a:prstGeom>
+          <a:ln>
+            <a:solidFill>
+              <a:schemeClr val="tx2">
+                <a:lumMod val="50000"/>
+                <a:lumOff val="50000"/>
+              </a:schemeClr>
+            </a:solidFill>
+          </a:ln>
+        </p:spPr>
+        <p:style>
+          <a:lnRef idx="2">
+            <a:schemeClr val="accent1"/>
+          </a:lnRef>
+          <a:fillRef idx="0">
+            <a:schemeClr val="accent1"/>
+          </a:fillRef>
+          <a:effectRef idx="1">
+            <a:schemeClr val="accent1"/>
+          </a:effectRef>
+          <a:fontRef idx="minor">
+            <a:schemeClr val="tx1"/>
+          </a:fontRef>
+        </p:style>
+      </p:cxnSp>
+      <p:sp>
+        <p:nvSpPr>
+          <p:cNvPr id="16" name="TextBox 15">
+            <a:extLst>
+              <a:ext uri="{FF2B5EF4-FFF2-40B4-BE49-F238E27FC236}">
+                <a16:creationId xmlns:a16="http://schemas.microsoft.com/office/drawing/2014/main" id="{A9FC8192-3985-30F0-2892-750CDDE8E02B}"/>
+              </a:ext>
+            </a:extLst>
+          </p:cNvPr>
+          <p:cNvSpPr txBox="1"/>
+          <p:nvPr/>
+        </p:nvSpPr>
+        <p:spPr>
+          <a:xfrm>
+            <a:off x="8078492" y="4760772"/>
+            <a:ext cx="442750" cy="707886"/>
+          </a:xfrm>
+          <a:prstGeom prst="rect">
+            <a:avLst/>
+          </a:prstGeom>
+          <a:noFill/>
+        </p:spPr>
+        <p:txBody>
+          <a:bodyPr wrap="square" rtlCol="0">
+            <a:spAutoFit/>
+          </a:bodyPr>
+          <a:lstStyle/>
+          <a:p>
+            <a:r>
+              <a:rPr lang="en-US" sz="4000" spc="-300">
+                <a:solidFill>
+                  <a:schemeClr val="tx2">
+                    <a:lumMod val="50000"/>
+                    <a:lumOff val="50000"/>
+                  </a:schemeClr>
+                </a:solidFill>
+              </a:rPr>
+              <a:t>P</a:t>
+            </a:r>
+          </a:p>
+        </p:txBody>
+      </p:sp>
+      <p:cxnSp>
+        <p:nvCxnSpPr>
+          <p:cNvPr id="20" name="Straight Arrow Connector 19">
+            <a:extLst>
+              <a:ext uri="{FF2B5EF4-FFF2-40B4-BE49-F238E27FC236}">
+                <a16:creationId xmlns:a16="http://schemas.microsoft.com/office/drawing/2014/main" id="{D1F3BBAD-DC0D-0092-ADAA-0645CD01CACF}"/>
+              </a:ext>
+            </a:extLst>
+          </p:cNvPr>
+          <p:cNvCxnSpPr>
+            <a:cxnSpLocks/>
+          </p:cNvCxnSpPr>
+          <p:nvPr/>
+        </p:nvCxnSpPr>
+        <p:spPr>
+          <a:xfrm flipV="1">
+            <a:off x="8299867" y="4052886"/>
+            <a:ext cx="0" cy="725314"/>
+          </a:xfrm>
+          <a:prstGeom prst="straightConnector1">
+            <a:avLst/>
+          </a:prstGeom>
+          <a:ln>
+            <a:solidFill>
+              <a:schemeClr val="tx2">
+                <a:lumMod val="50000"/>
+                <a:lumOff val="50000"/>
+              </a:schemeClr>
+            </a:solidFill>
+            <a:tailEnd type="triangle"/>
+          </a:ln>
+        </p:spPr>
+        <p:style>
+          <a:lnRef idx="2">
+            <a:schemeClr val="accent1"/>
+          </a:lnRef>
+          <a:fillRef idx="0">
+            <a:schemeClr val="accent1"/>
+          </a:fillRef>
+          <a:effectRef idx="1">
+            <a:schemeClr val="accent1"/>
+          </a:effectRef>
+          <a:fontRef idx="minor">
+            <a:schemeClr val="tx1"/>
+          </a:fontRef>
+        </p:style>
+      </p:cxnSp>
+    </p:spTree>
+    <p:extLst>
+      <p:ext uri="{BB962C8B-B14F-4D97-AF65-F5344CB8AC3E}">
+        <p14:creationId xmlns:p14="http://schemas.microsoft.com/office/powerpoint/2010/main" val="1982739507"/>
+      </p:ext>
+    </p:extLst>
+  </p:cSld>
+  <p:clrMapOvr>
+    <a:masterClrMapping/>
+  </p:clrMapOvr>
+</p:sld>
+</file>
+
+<file path=ppt/slides/slide4.xml><?xml version="1.0" encoding="utf-8"?>
+<p:sld xmlns:a="http://schemas.openxmlformats.org/drawingml/2006/main" xmlns:r="http://schemas.openxmlformats.org/officeDocument/2006/relationships" xmlns:p="http://schemas.openxmlformats.org/presentationml/2006/main">
+  <p:cSld>
+    <p:spTree>
+      <p:nvGrpSpPr>
+        <p:cNvPr id="1" name=""/>
+        <p:cNvGrpSpPr/>
+        <p:nvPr/>
+      </p:nvGrpSpPr>
+      <p:grpSpPr>
+        <a:xfrm>
+          <a:off x="0" y="0"/>
+          <a:ext cx="0" cy="0"/>
+          <a:chOff x="0" y="0"/>
+          <a:chExt cx="0" cy="0"/>
+        </a:xfrm>
+      </p:grpSpPr>
+      <p:graphicFrame>
+        <p:nvGraphicFramePr>
+          <p:cNvPr id="2" name="Table 1">
+            <a:extLst>
+              <a:ext uri="{FF2B5EF4-FFF2-40B4-BE49-F238E27FC236}">
+                <a16:creationId xmlns:a16="http://schemas.microsoft.com/office/drawing/2014/main" id="{083D4EB6-0D7E-3B89-F33D-30EA238837A0}"/>
+              </a:ext>
+            </a:extLst>
+          </p:cNvPr>
+          <p:cNvGraphicFramePr>
+            <a:graphicFrameLocks noGrp="1"/>
+          </p:cNvGraphicFramePr>
+          <p:nvPr>
+            <p:extLst>
+              <p:ext uri="{D42A27DB-BD31-4B8C-83A1-F6EECF244321}">
+                <p14:modId xmlns:p14="http://schemas.microsoft.com/office/powerpoint/2010/main" val="3730468607"/>
+              </p:ext>
+            </p:extLst>
+          </p:nvPr>
+        </p:nvGraphicFramePr>
+        <p:xfrm>
+          <a:off x="3798564" y="1303733"/>
+          <a:ext cx="4459760" cy="370840"/>
+        </p:xfrm>
+        <a:graphic>
+          <a:graphicData uri="http://schemas.openxmlformats.org/drawingml/2006/table">
+            <a:tbl>
+              <a:tblPr firstRow="1" bandRow="1">
+                <a:tableStyleId>{5940675A-B579-460E-94D1-54222C63F5DA}</a:tableStyleId>
+              </a:tblPr>
+              <a:tblGrid>
+                <a:gridCol w="445976">
+                  <a:extLst>
+                    <a:ext uri="{9D8B030D-6E8A-4147-A177-3AD203B41FA5}">
+                      <a16:colId xmlns:a16="http://schemas.microsoft.com/office/drawing/2014/main" val="1485278154"/>
+                    </a:ext>
+                  </a:extLst>
+                </a:gridCol>
+                <a:gridCol w="445976">
+                  <a:extLst>
+                    <a:ext uri="{9D8B030D-6E8A-4147-A177-3AD203B41FA5}">
+                      <a16:colId xmlns:a16="http://schemas.microsoft.com/office/drawing/2014/main" val="2881787232"/>
+                    </a:ext>
+                  </a:extLst>
+                </a:gridCol>
+                <a:gridCol w="445976">
+                  <a:extLst>
+                    <a:ext uri="{9D8B030D-6E8A-4147-A177-3AD203B41FA5}">
+                      <a16:colId xmlns:a16="http://schemas.microsoft.com/office/drawing/2014/main" val="3000371429"/>
+                    </a:ext>
+                  </a:extLst>
+                </a:gridCol>
+                <a:gridCol w="445976">
+                  <a:extLst>
+                    <a:ext uri="{9D8B030D-6E8A-4147-A177-3AD203B41FA5}">
+                      <a16:colId xmlns:a16="http://schemas.microsoft.com/office/drawing/2014/main" val="2998613425"/>
+                    </a:ext>
+                  </a:extLst>
+                </a:gridCol>
+                <a:gridCol w="445976">
+                  <a:extLst>
+                    <a:ext uri="{9D8B030D-6E8A-4147-A177-3AD203B41FA5}">
+                      <a16:colId xmlns:a16="http://schemas.microsoft.com/office/drawing/2014/main" val="2374108893"/>
+                    </a:ext>
+                  </a:extLst>
+                </a:gridCol>
+                <a:gridCol w="445976">
+                  <a:extLst>
+                    <a:ext uri="{9D8B030D-6E8A-4147-A177-3AD203B41FA5}">
+                      <a16:colId xmlns:a16="http://schemas.microsoft.com/office/drawing/2014/main" val="4071556999"/>
+                    </a:ext>
+                  </a:extLst>
+                </a:gridCol>
+                <a:gridCol w="445976">
+                  <a:extLst>
+                    <a:ext uri="{9D8B030D-6E8A-4147-A177-3AD203B41FA5}">
+                      <a16:colId xmlns:a16="http://schemas.microsoft.com/office/drawing/2014/main" val="80334061"/>
+                    </a:ext>
+                  </a:extLst>
+                </a:gridCol>
+                <a:gridCol w="445976">
+                  <a:extLst>
+                    <a:ext uri="{9D8B030D-6E8A-4147-A177-3AD203B41FA5}">
+                      <a16:colId xmlns:a16="http://schemas.microsoft.com/office/drawing/2014/main" val="523278044"/>
+                    </a:ext>
+                  </a:extLst>
+                </a:gridCol>
+                <a:gridCol w="445976">
+                  <a:extLst>
+                    <a:ext uri="{9D8B030D-6E8A-4147-A177-3AD203B41FA5}">
+                      <a16:colId xmlns:a16="http://schemas.microsoft.com/office/drawing/2014/main" val="662703729"/>
+                    </a:ext>
+                  </a:extLst>
+                </a:gridCol>
+                <a:gridCol w="445976">
+                  <a:extLst>
+                    <a:ext uri="{9D8B030D-6E8A-4147-A177-3AD203B41FA5}">
+                      <a16:colId xmlns:a16="http://schemas.microsoft.com/office/drawing/2014/main" val="1774477568"/>
+                    </a:ext>
+                  </a:extLst>
+                </a:gridCol>
+              </a:tblGrid>
+              <a:tr h="370840">
+                <a:tc>
+                  <a:txBody>
+                    <a:bodyPr/>
+                    <a:lstStyle/>
+                    <a:p>
+                      <a:pPr algn="ctr"/>
+                      <a:r>
+                        <a:rPr lang="en-US"/>
+                        <a:t>1</a:t>
+                      </a:r>
+                    </a:p>
+                  </a:txBody>
+                  <a:tcPr anchor="ctr"/>
+                </a:tc>
+                <a:tc>
+                  <a:txBody>
+                    <a:bodyPr/>
+                    <a:lstStyle/>
+                    <a:p>
+                      <a:pPr algn="ctr"/>
+                      <a:r>
+                        <a:rPr lang="en-US"/>
+                        <a:t>0</a:t>
+                      </a:r>
+                    </a:p>
+                  </a:txBody>
+                  <a:tcPr anchor="ctr"/>
+                </a:tc>
+                <a:tc>
+                  <a:txBody>
+                    <a:bodyPr/>
+                    <a:lstStyle/>
+                    <a:p>
+                      <a:pPr algn="ctr"/>
+                      <a:r>
+                        <a:rPr lang="en-US"/>
+                        <a:t>1</a:t>
+                      </a:r>
+                    </a:p>
+                  </a:txBody>
+                  <a:tcPr anchor="ctr"/>
+                </a:tc>
+                <a:tc>
+                  <a:txBody>
+                    <a:bodyPr/>
+                    <a:lstStyle/>
+                    <a:p>
+                      <a:pPr algn="ctr"/>
+                      <a:r>
+                        <a:rPr lang="en-US"/>
+                        <a:t>1</a:t>
+                      </a:r>
+                    </a:p>
+                  </a:txBody>
+                  <a:tcPr anchor="ctr"/>
+                </a:tc>
+                <a:tc>
+                  <a:txBody>
+                    <a:bodyPr/>
+                    <a:lstStyle/>
+                    <a:p>
+                      <a:pPr algn="ctr"/>
+                      <a:r>
+                        <a:rPr lang="en-US"/>
+                        <a:t>0</a:t>
+                      </a:r>
+                    </a:p>
+                  </a:txBody>
+                  <a:tcPr anchor="ctr"/>
+                </a:tc>
+                <a:tc>
+                  <a:txBody>
+                    <a:bodyPr/>
+                    <a:lstStyle/>
+                    <a:p>
+                      <a:pPr algn="ctr"/>
+                      <a:r>
+                        <a:rPr lang="en-US"/>
+                        <a:t>0</a:t>
+                      </a:r>
+                    </a:p>
+                  </a:txBody>
+                  <a:tcPr anchor="ctr"/>
+                </a:tc>
+                <a:tc>
+                  <a:txBody>
+                    <a:bodyPr/>
+                    <a:lstStyle/>
+                    <a:p>
+                      <a:pPr algn="ctr"/>
+                      <a:r>
+                        <a:rPr lang="en-US"/>
+                        <a:t>1</a:t>
+                      </a:r>
+                    </a:p>
+                  </a:txBody>
+                  <a:tcPr anchor="ctr"/>
+                </a:tc>
+                <a:tc>
+                  <a:txBody>
+                    <a:bodyPr/>
+                    <a:lstStyle/>
+                    <a:p>
+                      <a:pPr algn="ctr"/>
+                      <a:r>
+                        <a:rPr lang="en-US"/>
+                        <a:t>0</a:t>
+                      </a:r>
+                    </a:p>
+                  </a:txBody>
+                  <a:tcPr anchor="ctr"/>
+                </a:tc>
+                <a:tc>
+                  <a:txBody>
+                    <a:bodyPr/>
+                    <a:lstStyle/>
+                    <a:p>
+                      <a:pPr algn="ctr"/>
+                      <a:r>
+                        <a:rPr lang="en-US"/>
+                        <a:t>0</a:t>
+                      </a:r>
+                    </a:p>
+                  </a:txBody>
+                  <a:tcPr anchor="ctr"/>
+                </a:tc>
+                <a:tc>
+                  <a:txBody>
+                    <a:bodyPr/>
+                    <a:lstStyle/>
+                    <a:p>
+                      <a:pPr algn="ctr"/>
+                      <a:r>
+                        <a:rPr lang="en-US"/>
+                        <a:t>1</a:t>
+                      </a:r>
+                    </a:p>
+                  </a:txBody>
+                  <a:tcPr anchor="ctr"/>
+                </a:tc>
+                <a:extLst>
+                  <a:ext uri="{0D108BD9-81ED-4DB2-BD59-A6C34878D82A}">
+                    <a16:rowId xmlns:a16="http://schemas.microsoft.com/office/drawing/2014/main" val="799017895"/>
+                  </a:ext>
+                </a:extLst>
+              </a:tr>
+            </a:tbl>
+          </a:graphicData>
+        </a:graphic>
+      </p:graphicFrame>
+      <p:graphicFrame>
+        <p:nvGraphicFramePr>
+          <p:cNvPr id="4" name="Table 3">
+            <a:extLst>
+              <a:ext uri="{FF2B5EF4-FFF2-40B4-BE49-F238E27FC236}">
+                <a16:creationId xmlns:a16="http://schemas.microsoft.com/office/drawing/2014/main" id="{9F872D3E-AE22-8BCA-44E5-6B9D05199019}"/>
+              </a:ext>
+            </a:extLst>
+          </p:cNvPr>
+          <p:cNvGraphicFramePr>
+            <a:graphicFrameLocks noGrp="1"/>
+          </p:cNvGraphicFramePr>
+          <p:nvPr>
+            <p:extLst>
+              <p:ext uri="{D42A27DB-BD31-4B8C-83A1-F6EECF244321}">
+                <p14:modId xmlns:p14="http://schemas.microsoft.com/office/powerpoint/2010/main" val="2729297590"/>
+              </p:ext>
+            </p:extLst>
+          </p:nvPr>
+        </p:nvGraphicFramePr>
+        <p:xfrm>
+          <a:off x="3798564" y="1915727"/>
+          <a:ext cx="4459760" cy="370840"/>
+        </p:xfrm>
+        <a:graphic>
+          <a:graphicData uri="http://schemas.openxmlformats.org/drawingml/2006/table">
+            <a:tbl>
+              <a:tblPr firstRow="1" bandRow="1">
+                <a:tableStyleId>{5940675A-B579-460E-94D1-54222C63F5DA}</a:tableStyleId>
+              </a:tblPr>
+              <a:tblGrid>
+                <a:gridCol w="445976">
+                  <a:extLst>
+                    <a:ext uri="{9D8B030D-6E8A-4147-A177-3AD203B41FA5}">
+                      <a16:colId xmlns:a16="http://schemas.microsoft.com/office/drawing/2014/main" val="1485278154"/>
+                    </a:ext>
+                  </a:extLst>
+                </a:gridCol>
+                <a:gridCol w="445976">
+                  <a:extLst>
+                    <a:ext uri="{9D8B030D-6E8A-4147-A177-3AD203B41FA5}">
+                      <a16:colId xmlns:a16="http://schemas.microsoft.com/office/drawing/2014/main" val="2881787232"/>
+                    </a:ext>
+                  </a:extLst>
+                </a:gridCol>
+                <a:gridCol w="445976">
+                  <a:extLst>
+                    <a:ext uri="{9D8B030D-6E8A-4147-A177-3AD203B41FA5}">
+                      <a16:colId xmlns:a16="http://schemas.microsoft.com/office/drawing/2014/main" val="3000371429"/>
+                    </a:ext>
+                  </a:extLst>
+                </a:gridCol>
+                <a:gridCol w="445976">
+                  <a:extLst>
+                    <a:ext uri="{9D8B030D-6E8A-4147-A177-3AD203B41FA5}">
+                      <a16:colId xmlns:a16="http://schemas.microsoft.com/office/drawing/2014/main" val="2998613425"/>
+                    </a:ext>
+                  </a:extLst>
+                </a:gridCol>
+                <a:gridCol w="445976">
+                  <a:extLst>
+                    <a:ext uri="{9D8B030D-6E8A-4147-A177-3AD203B41FA5}">
+                      <a16:colId xmlns:a16="http://schemas.microsoft.com/office/drawing/2014/main" val="2374108893"/>
+                    </a:ext>
+                  </a:extLst>
+                </a:gridCol>
+                <a:gridCol w="445976">
+                  <a:extLst>
+                    <a:ext uri="{9D8B030D-6E8A-4147-A177-3AD203B41FA5}">
+                      <a16:colId xmlns:a16="http://schemas.microsoft.com/office/drawing/2014/main" val="4071556999"/>
+                    </a:ext>
+                  </a:extLst>
+                </a:gridCol>
+                <a:gridCol w="445976">
+                  <a:extLst>
+                    <a:ext uri="{9D8B030D-6E8A-4147-A177-3AD203B41FA5}">
+                      <a16:colId xmlns:a16="http://schemas.microsoft.com/office/drawing/2014/main" val="80334061"/>
+                    </a:ext>
+                  </a:extLst>
+                </a:gridCol>
+                <a:gridCol w="445976">
+                  <a:extLst>
+                    <a:ext uri="{9D8B030D-6E8A-4147-A177-3AD203B41FA5}">
+                      <a16:colId xmlns:a16="http://schemas.microsoft.com/office/drawing/2014/main" val="523278044"/>
+                    </a:ext>
+                  </a:extLst>
+                </a:gridCol>
+                <a:gridCol w="445976">
+                  <a:extLst>
+                    <a:ext uri="{9D8B030D-6E8A-4147-A177-3AD203B41FA5}">
+                      <a16:colId xmlns:a16="http://schemas.microsoft.com/office/drawing/2014/main" val="662703729"/>
+                    </a:ext>
+                  </a:extLst>
+                </a:gridCol>
+                <a:gridCol w="445976">
+                  <a:extLst>
+                    <a:ext uri="{9D8B030D-6E8A-4147-A177-3AD203B41FA5}">
+                      <a16:colId xmlns:a16="http://schemas.microsoft.com/office/drawing/2014/main" val="1774477568"/>
+                    </a:ext>
+                  </a:extLst>
+                </a:gridCol>
+              </a:tblGrid>
+              <a:tr h="370840">
+                <a:tc>
+                  <a:txBody>
+                    <a:bodyPr/>
+                    <a:lstStyle/>
+                    <a:p>
+                      <a:pPr algn="ctr"/>
+                      <a:r>
+                        <a:rPr lang="en-US"/>
+                        <a:t>1</a:t>
+                      </a:r>
+                    </a:p>
+                  </a:txBody>
+                  <a:tcPr anchor="ctr"/>
+                </a:tc>
+                <a:tc>
+                  <a:txBody>
+                    <a:bodyPr/>
+                    <a:lstStyle/>
+                    <a:p>
+                      <a:pPr algn="ctr"/>
+                      <a:r>
+                        <a:rPr lang="en-US"/>
+                        <a:t>0</a:t>
+                      </a:r>
+                    </a:p>
+                  </a:txBody>
+                  <a:tcPr anchor="ctr"/>
+                </a:tc>
+                <a:tc>
+                  <a:txBody>
+                    <a:bodyPr/>
+                    <a:lstStyle/>
+                    <a:p>
+                      <a:pPr algn="ctr"/>
+                      <a:r>
+                        <a:rPr lang="en-US"/>
+                        <a:t>0</a:t>
+                      </a:r>
+                    </a:p>
+                  </a:txBody>
+                  <a:tcPr anchor="ctr"/>
+                </a:tc>
+                <a:tc>
+                  <a:txBody>
+                    <a:bodyPr/>
+                    <a:lstStyle/>
+                    <a:p>
+                      <a:pPr algn="ctr"/>
+                      <a:r>
+                        <a:rPr lang="en-US"/>
+                        <a:t>1</a:t>
+                      </a:r>
+                    </a:p>
+                  </a:txBody>
+                  <a:tcPr anchor="ctr"/>
+                </a:tc>
+                <a:tc>
+                  <a:txBody>
+                    <a:bodyPr/>
+                    <a:lstStyle/>
+                    <a:p>
+                      <a:pPr algn="ctr"/>
+                      <a:r>
+                        <a:rPr lang="en-US"/>
+                        <a:t>0</a:t>
+                      </a:r>
+                    </a:p>
+                  </a:txBody>
+                  <a:tcPr anchor="ctr"/>
+                </a:tc>
+                <a:tc>
+                  <a:txBody>
+                    <a:bodyPr/>
+                    <a:lstStyle/>
+                    <a:p>
+                      <a:pPr algn="ctr"/>
+                      <a:r>
+                        <a:rPr lang="en-US"/>
+                        <a:t>0</a:t>
+                      </a:r>
+                    </a:p>
+                  </a:txBody>
+                  <a:tcPr anchor="ctr"/>
+                </a:tc>
+                <a:tc>
+                  <a:txBody>
+                    <a:bodyPr/>
+                    <a:lstStyle/>
+                    <a:p>
+                      <a:pPr algn="ctr"/>
+                      <a:r>
+                        <a:rPr lang="en-US"/>
+                        <a:t>0</a:t>
+                      </a:r>
+                    </a:p>
+                  </a:txBody>
+                  <a:tcPr anchor="ctr"/>
+                </a:tc>
+                <a:tc>
+                  <a:txBody>
+                    <a:bodyPr/>
+                    <a:lstStyle/>
+                    <a:p>
+                      <a:pPr algn="ctr"/>
+                      <a:r>
+                        <a:rPr lang="en-US"/>
+                        <a:t>0</a:t>
+                      </a:r>
+                    </a:p>
+                  </a:txBody>
+                  <a:tcPr anchor="ctr"/>
+                </a:tc>
+                <a:tc>
+                  <a:txBody>
+                    <a:bodyPr/>
+                    <a:lstStyle/>
+                    <a:p>
+                      <a:pPr algn="ctr"/>
+                      <a:r>
+                        <a:rPr lang="en-US"/>
+                        <a:t>1</a:t>
+                      </a:r>
+                    </a:p>
+                  </a:txBody>
+                  <a:tcPr anchor="ctr"/>
+                </a:tc>
+                <a:tc>
+                  <a:txBody>
+                    <a:bodyPr/>
+                    <a:lstStyle/>
+                    <a:p>
+                      <a:pPr algn="ctr"/>
+                      <a:r>
+                        <a:rPr lang="en-US"/>
+                        <a:t>1</a:t>
+                      </a:r>
+                    </a:p>
+                  </a:txBody>
+                  <a:tcPr anchor="ctr"/>
+                </a:tc>
+                <a:extLst>
+                  <a:ext uri="{0D108BD9-81ED-4DB2-BD59-A6C34878D82A}">
+                    <a16:rowId xmlns:a16="http://schemas.microsoft.com/office/drawing/2014/main" val="799017895"/>
+                  </a:ext>
+                </a:extLst>
+              </a:tr>
+            </a:tbl>
+          </a:graphicData>
+        </a:graphic>
+      </p:graphicFrame>
+      <mc:AlternateContent xmlns:mc="http://schemas.openxmlformats.org/markup-compatibility/2006">
+        <mc:Choice xmlns:a14="http://schemas.microsoft.com/office/drawing/2010/main" Requires="a14">
+          <p:sp>
+            <p:nvSpPr>
+              <p:cNvPr id="5" name="TextBox 4">
+                <a:extLst>
+                  <a:ext uri="{FF2B5EF4-FFF2-40B4-BE49-F238E27FC236}">
+                    <a16:creationId xmlns:a16="http://schemas.microsoft.com/office/drawing/2014/main" id="{102A74F7-19F6-42D2-B829-D097D6436099}"/>
+                  </a:ext>
+                </a:extLst>
+              </p:cNvPr>
+              <p:cNvSpPr txBox="1"/>
+              <p:nvPr/>
+            </p:nvSpPr>
+            <p:spPr>
+              <a:xfrm>
+                <a:off x="3322743" y="1243686"/>
+                <a:ext cx="425818" cy="430887"/>
+              </a:xfrm>
+              <a:prstGeom prst="rect">
+                <a:avLst/>
+              </a:prstGeom>
+              <a:noFill/>
+            </p:spPr>
+            <p:txBody>
+              <a:bodyPr wrap="square" lIns="0" tIns="0" rIns="0" bIns="0" rtlCol="0">
+                <a:spAutoFit/>
+              </a:bodyPr>
+              <a:lstStyle/>
+              <a:p>
+                <a14:m>
+                  <m:oMathPara xmlns:m="http://schemas.openxmlformats.org/officeDocument/2006/math">
+                    <m:oMathParaPr>
+                      <m:jc m:val="centerGroup"/>
+                    </m:oMathParaPr>
+                    <m:oMath xmlns:m="http://schemas.openxmlformats.org/officeDocument/2006/math">
+                      <m:r>
+                        <a:rPr lang="en-US" sz="2800" i="1" smtClean="0">
+                          <a:latin typeface="Cambria Math" panose="02040503050406030204" pitchFamily="18" charset="0"/>
+                        </a:rPr>
+                        <m:t>𝑥</m:t>
+                      </m:r>
+                    </m:oMath>
+                  </m:oMathPara>
+                </a14:m>
+                <a:endParaRPr lang="en-US" sz="3200"/>
+              </a:p>
+            </p:txBody>
+          </p:sp>
+        </mc:Choice>
+        <mc:Fallback>
+          <p:sp>
+            <p:nvSpPr>
+              <p:cNvPr id="5" name="TextBox 4">
+                <a:extLst>
+                  <a:ext uri="{FF2B5EF4-FFF2-40B4-BE49-F238E27FC236}">
+                    <a16:creationId xmlns:a16="http://schemas.microsoft.com/office/drawing/2014/main" id="{102A74F7-19F6-42D2-B829-D097D6436099}"/>
+                  </a:ext>
+                </a:extLst>
+              </p:cNvPr>
+              <p:cNvSpPr txBox="1">
+                <a:spLocks noRot="1" noChangeAspect="1" noMove="1" noResize="1" noEditPoints="1" noAdjustHandles="1" noChangeArrowheads="1" noChangeShapeType="1" noTextEdit="1"/>
+              </p:cNvSpPr>
+              <p:nvPr/>
+            </p:nvSpPr>
+            <p:spPr>
+              <a:xfrm>
+                <a:off x="3322743" y="1243686"/>
+                <a:ext cx="425818" cy="430887"/>
+              </a:xfrm>
+              <a:prstGeom prst="rect">
+                <a:avLst/>
+              </a:prstGeom>
+              <a:blipFill>
+                <a:blip r:embed="rId2"/>
+                <a:stretch>
+                  <a:fillRect/>
+                </a:stretch>
+              </a:blipFill>
+            </p:spPr>
+            <p:txBody>
+              <a:bodyPr/>
+              <a:lstStyle/>
+              <a:p>
+                <a:r>
+                  <a:rPr lang="en-US">
+                    <a:noFill/>
+                  </a:rPr>
+                  <a:t> </a:t>
+                </a:r>
+              </a:p>
+            </p:txBody>
+          </p:sp>
+        </mc:Fallback>
+      </mc:AlternateContent>
+      <mc:AlternateContent xmlns:mc="http://schemas.openxmlformats.org/markup-compatibility/2006">
+        <mc:Choice xmlns:a14="http://schemas.microsoft.com/office/drawing/2010/main" Requires="a14">
+          <p:sp>
+            <p:nvSpPr>
+              <p:cNvPr id="6" name="TextBox 5">
+                <a:extLst>
+                  <a:ext uri="{FF2B5EF4-FFF2-40B4-BE49-F238E27FC236}">
+                    <a16:creationId xmlns:a16="http://schemas.microsoft.com/office/drawing/2014/main" id="{87033B32-854D-DB90-0FEC-75CE19139E8A}"/>
+                  </a:ext>
+                </a:extLst>
+              </p:cNvPr>
+              <p:cNvSpPr txBox="1"/>
+              <p:nvPr/>
+            </p:nvSpPr>
+            <p:spPr>
+              <a:xfrm>
+                <a:off x="3322743" y="1844959"/>
+                <a:ext cx="425818" cy="430887"/>
+              </a:xfrm>
+              <a:prstGeom prst="rect">
+                <a:avLst/>
+              </a:prstGeom>
+              <a:noFill/>
+            </p:spPr>
+            <p:txBody>
+              <a:bodyPr wrap="square" lIns="0" tIns="0" rIns="0" bIns="0" rtlCol="0">
+                <a:spAutoFit/>
+              </a:bodyPr>
+              <a:lstStyle/>
+              <a:p>
+                <a14:m>
+                  <m:oMathPara xmlns:m="http://schemas.openxmlformats.org/officeDocument/2006/math">
+                    <m:oMathParaPr>
+                      <m:jc m:val="centerGroup"/>
+                    </m:oMathParaPr>
+                    <m:oMath xmlns:m="http://schemas.openxmlformats.org/officeDocument/2006/math">
+                      <m:r>
+                        <a:rPr lang="en-US" sz="2800" b="0" i="1" smtClean="0">
+                          <a:latin typeface="Cambria Math" panose="02040503050406030204" pitchFamily="18" charset="0"/>
+                        </a:rPr>
+                        <m:t>𝑦</m:t>
+                      </m:r>
+                    </m:oMath>
+                  </m:oMathPara>
+                </a14:m>
+                <a:endParaRPr lang="en-US" sz="2800"/>
+              </a:p>
+            </p:txBody>
+          </p:sp>
+        </mc:Choice>
+        <mc:Fallback>
+          <p:sp>
+            <p:nvSpPr>
+              <p:cNvPr id="6" name="TextBox 5">
+                <a:extLst>
+                  <a:ext uri="{FF2B5EF4-FFF2-40B4-BE49-F238E27FC236}">
+                    <a16:creationId xmlns:a16="http://schemas.microsoft.com/office/drawing/2014/main" id="{87033B32-854D-DB90-0FEC-75CE19139E8A}"/>
+                  </a:ext>
+                </a:extLst>
+              </p:cNvPr>
+              <p:cNvSpPr txBox="1">
+                <a:spLocks noRot="1" noChangeAspect="1" noMove="1" noResize="1" noEditPoints="1" noAdjustHandles="1" noChangeArrowheads="1" noChangeShapeType="1" noTextEdit="1"/>
+              </p:cNvSpPr>
+              <p:nvPr/>
+            </p:nvSpPr>
+            <p:spPr>
+              <a:xfrm>
+                <a:off x="3322743" y="1844959"/>
+                <a:ext cx="425818" cy="430887"/>
+              </a:xfrm>
+              <a:prstGeom prst="rect">
+                <a:avLst/>
+              </a:prstGeom>
+              <a:blipFill>
+                <a:blip r:embed="rId3"/>
+                <a:stretch>
+                  <a:fillRect/>
+                </a:stretch>
+              </a:blipFill>
+            </p:spPr>
+            <p:txBody>
+              <a:bodyPr/>
+              <a:lstStyle/>
+              <a:p>
+                <a:r>
+                  <a:rPr lang="en-US">
+                    <a:noFill/>
+                  </a:rPr>
+                  <a:t> </a:t>
+                </a:r>
+              </a:p>
+            </p:txBody>
+          </p:sp>
+        </mc:Fallback>
+      </mc:AlternateContent>
+      <p:cxnSp>
+        <p:nvCxnSpPr>
+          <p:cNvPr id="8" name="Straight Arrow Connector 7">
+            <a:extLst>
+              <a:ext uri="{FF2B5EF4-FFF2-40B4-BE49-F238E27FC236}">
+                <a16:creationId xmlns:a16="http://schemas.microsoft.com/office/drawing/2014/main" id="{D12D209C-01FA-D21F-9F8B-6FE345B04CFC}"/>
+              </a:ext>
+            </a:extLst>
+          </p:cNvPr>
+          <p:cNvCxnSpPr/>
+          <p:nvPr/>
+        </p:nvCxnSpPr>
+        <p:spPr>
+          <a:xfrm>
+            <a:off x="4922134" y="1674573"/>
+            <a:ext cx="0" cy="241154"/>
+          </a:xfrm>
+          <a:prstGeom prst="straightConnector1">
+            <a:avLst/>
+          </a:prstGeom>
+          <a:ln>
+            <a:solidFill>
+              <a:schemeClr val="tx2">
+                <a:lumMod val="50000"/>
+                <a:lumOff val="50000"/>
+              </a:schemeClr>
+            </a:solidFill>
+            <a:headEnd type="triangle"/>
+            <a:tailEnd type="triangle"/>
+          </a:ln>
+        </p:spPr>
+        <p:style>
+          <a:lnRef idx="2">
+            <a:schemeClr val="accent1"/>
+          </a:lnRef>
+          <a:fillRef idx="0">
+            <a:schemeClr val="accent1"/>
+          </a:fillRef>
+          <a:effectRef idx="1">
+            <a:schemeClr val="accent1"/>
+          </a:effectRef>
+          <a:fontRef idx="minor">
+            <a:schemeClr val="tx1"/>
+          </a:fontRef>
+        </p:style>
+      </p:cxnSp>
+      <p:cxnSp>
+        <p:nvCxnSpPr>
+          <p:cNvPr id="9" name="Straight Arrow Connector 8">
+            <a:extLst>
+              <a:ext uri="{FF2B5EF4-FFF2-40B4-BE49-F238E27FC236}">
+                <a16:creationId xmlns:a16="http://schemas.microsoft.com/office/drawing/2014/main" id="{6B28568B-B40D-1765-AE63-888AEDC45CB7}"/>
+              </a:ext>
+            </a:extLst>
+          </p:cNvPr>
+          <p:cNvCxnSpPr/>
+          <p:nvPr/>
+        </p:nvCxnSpPr>
+        <p:spPr>
+          <a:xfrm>
+            <a:off x="6694990" y="1674573"/>
+            <a:ext cx="0" cy="241154"/>
+          </a:xfrm>
+          <a:prstGeom prst="straightConnector1">
+            <a:avLst/>
+          </a:prstGeom>
+          <a:ln>
+            <a:solidFill>
+              <a:schemeClr val="tx2">
+                <a:lumMod val="50000"/>
+                <a:lumOff val="50000"/>
+              </a:schemeClr>
+            </a:solidFill>
+            <a:headEnd type="triangle"/>
+            <a:tailEnd type="triangle"/>
+          </a:ln>
+        </p:spPr>
+        <p:style>
+          <a:lnRef idx="2">
+            <a:schemeClr val="accent1"/>
+          </a:lnRef>
+          <a:fillRef idx="0">
+            <a:schemeClr val="accent1"/>
+          </a:fillRef>
+          <a:effectRef idx="1">
+            <a:schemeClr val="accent1"/>
+          </a:effectRef>
+          <a:fontRef idx="minor">
+            <a:schemeClr val="tx1"/>
+          </a:fontRef>
+        </p:style>
+      </p:cxnSp>
+      <p:cxnSp>
+        <p:nvCxnSpPr>
+          <p:cNvPr id="10" name="Straight Arrow Connector 9">
+            <a:extLst>
+              <a:ext uri="{FF2B5EF4-FFF2-40B4-BE49-F238E27FC236}">
+                <a16:creationId xmlns:a16="http://schemas.microsoft.com/office/drawing/2014/main" id="{699349DD-74A4-EDF6-B90B-52CA518BD680}"/>
+              </a:ext>
+            </a:extLst>
+          </p:cNvPr>
+          <p:cNvCxnSpPr/>
+          <p:nvPr/>
+        </p:nvCxnSpPr>
+        <p:spPr>
+          <a:xfrm>
+            <a:off x="7593958" y="1674573"/>
+            <a:ext cx="0" cy="241154"/>
+          </a:xfrm>
+          <a:prstGeom prst="straightConnector1">
+            <a:avLst/>
+          </a:prstGeom>
+          <a:ln>
+            <a:solidFill>
+              <a:schemeClr val="tx2">
+                <a:lumMod val="50000"/>
+                <a:lumOff val="50000"/>
+              </a:schemeClr>
+            </a:solidFill>
+            <a:headEnd type="triangle"/>
+            <a:tailEnd type="triangle"/>
+          </a:ln>
+        </p:spPr>
+        <p:style>
+          <a:lnRef idx="2">
+            <a:schemeClr val="accent1"/>
+          </a:lnRef>
+          <a:fillRef idx="0">
+            <a:schemeClr val="accent1"/>
+          </a:fillRef>
+          <a:effectRef idx="1">
+            <a:schemeClr val="accent1"/>
+          </a:effectRef>
+          <a:fontRef idx="minor">
+            <a:schemeClr val="tx1"/>
+          </a:fontRef>
+        </p:style>
+      </p:cxnSp>
+      <p:sp>
+        <p:nvSpPr>
+          <p:cNvPr id="11" name="Rectangle 10">
+            <a:extLst>
+              <a:ext uri="{FF2B5EF4-FFF2-40B4-BE49-F238E27FC236}">
+                <a16:creationId xmlns:a16="http://schemas.microsoft.com/office/drawing/2014/main" id="{27202676-4A4C-BCC5-F094-0CFE21B4B157}"/>
+              </a:ext>
+            </a:extLst>
+          </p:cNvPr>
+          <p:cNvSpPr/>
+          <p:nvPr/>
+        </p:nvSpPr>
+        <p:spPr>
+          <a:xfrm>
+            <a:off x="4692092" y="1183511"/>
+            <a:ext cx="442724" cy="1224023"/>
+          </a:xfrm>
+          <a:prstGeom prst="rect">
+            <a:avLst/>
+          </a:prstGeom>
+          <a:noFill/>
+          <a:ln>
+            <a:solidFill>
+              <a:schemeClr val="tx2">
+                <a:lumMod val="50000"/>
+                <a:lumOff val="50000"/>
+              </a:schemeClr>
+            </a:solidFill>
+          </a:ln>
+        </p:spPr>
+        <p:style>
+          <a:lnRef idx="2">
+            <a:schemeClr val="accent1">
+              <a:shade val="15000"/>
+            </a:schemeClr>
+          </a:lnRef>
+          <a:fillRef idx="1">
+            <a:schemeClr val="accent1"/>
+          </a:fillRef>
+          <a:effectRef idx="0">
+            <a:schemeClr val="accent1"/>
+          </a:effectRef>
+          <a:fontRef idx="minor">
+            <a:schemeClr val="lt1"/>
+          </a:fontRef>
+        </p:style>
+        <p:txBody>
+          <a:bodyPr rtlCol="0" anchor="ctr"/>
+          <a:lstStyle/>
+          <a:p>
+            <a:pPr algn="ctr"/>
+            <a:endParaRPr lang="en-US"/>
+          </a:p>
+        </p:txBody>
+      </p:sp>
+      <p:sp>
+        <p:nvSpPr>
+          <p:cNvPr id="12" name="Rectangle 11">
+            <a:extLst>
+              <a:ext uri="{FF2B5EF4-FFF2-40B4-BE49-F238E27FC236}">
+                <a16:creationId xmlns:a16="http://schemas.microsoft.com/office/drawing/2014/main" id="{D432C202-057C-80DD-A1E8-4479BAE67DED}"/>
+              </a:ext>
+            </a:extLst>
+          </p:cNvPr>
+          <p:cNvSpPr/>
+          <p:nvPr/>
+        </p:nvSpPr>
+        <p:spPr>
+          <a:xfrm>
+            <a:off x="6473628" y="1183138"/>
+            <a:ext cx="442724" cy="1224023"/>
+          </a:xfrm>
+          <a:prstGeom prst="rect">
+            <a:avLst/>
+          </a:prstGeom>
+          <a:noFill/>
+          <a:ln>
+            <a:solidFill>
+              <a:schemeClr val="tx2">
+                <a:lumMod val="50000"/>
+                <a:lumOff val="50000"/>
+              </a:schemeClr>
+            </a:solidFill>
+          </a:ln>
+        </p:spPr>
+        <p:style>
+          <a:lnRef idx="2">
+            <a:schemeClr val="accent1">
+              <a:shade val="15000"/>
+            </a:schemeClr>
+          </a:lnRef>
+          <a:fillRef idx="1">
+            <a:schemeClr val="accent1"/>
+          </a:fillRef>
+          <a:effectRef idx="0">
+            <a:schemeClr val="accent1"/>
+          </a:effectRef>
+          <a:fontRef idx="minor">
+            <a:schemeClr val="lt1"/>
+          </a:fontRef>
+        </p:style>
+        <p:txBody>
+          <a:bodyPr rtlCol="0" anchor="ctr"/>
+          <a:lstStyle/>
+          <a:p>
+            <a:pPr algn="ctr"/>
+            <a:endParaRPr lang="en-US"/>
+          </a:p>
+        </p:txBody>
+      </p:sp>
+      <p:sp>
+        <p:nvSpPr>
+          <p:cNvPr id="13" name="Rectangle 12">
+            <a:extLst>
+              <a:ext uri="{FF2B5EF4-FFF2-40B4-BE49-F238E27FC236}">
+                <a16:creationId xmlns:a16="http://schemas.microsoft.com/office/drawing/2014/main" id="{20104AD8-2D74-F3F7-22CB-760DE816A47E}"/>
+              </a:ext>
+            </a:extLst>
+          </p:cNvPr>
+          <p:cNvSpPr/>
+          <p:nvPr/>
+        </p:nvSpPr>
+        <p:spPr>
+          <a:xfrm>
+            <a:off x="7365361" y="1183138"/>
+            <a:ext cx="442724" cy="1224023"/>
+          </a:xfrm>
+          <a:prstGeom prst="rect">
+            <a:avLst/>
+          </a:prstGeom>
+          <a:noFill/>
+          <a:ln>
+            <a:solidFill>
+              <a:schemeClr val="tx2">
+                <a:lumMod val="50000"/>
+                <a:lumOff val="50000"/>
+              </a:schemeClr>
+            </a:solidFill>
+          </a:ln>
+        </p:spPr>
+        <p:style>
+          <a:lnRef idx="2">
+            <a:schemeClr val="accent1">
+              <a:shade val="15000"/>
+            </a:schemeClr>
+          </a:lnRef>
+          <a:fillRef idx="1">
+            <a:schemeClr val="accent1"/>
+          </a:fillRef>
+          <a:effectRef idx="0">
+            <a:schemeClr val="accent1"/>
+          </a:effectRef>
+          <a:fontRef idx="minor">
+            <a:schemeClr val="lt1"/>
+          </a:fontRef>
+        </p:style>
+        <p:txBody>
+          <a:bodyPr rtlCol="0" anchor="ctr"/>
+          <a:lstStyle/>
+          <a:p>
+            <a:pPr algn="ctr"/>
+            <a:endParaRPr lang="en-US"/>
+          </a:p>
+        </p:txBody>
+      </p:sp>
+    </p:spTree>
+    <p:extLst>
+      <p:ext uri="{BB962C8B-B14F-4D97-AF65-F5344CB8AC3E}">
+        <p14:creationId xmlns:p14="http://schemas.microsoft.com/office/powerpoint/2010/main" val="3124328060"/>
       </p:ext>
     </p:extLst>
   </p:cSld>

</xml_diff>

<commit_message>
feat: add "product quatization" section
</commit_message>
<xml_diff>
--- a/images/kd-draw.pptx
+++ b/images/kd-draw.pptx
@@ -9,6 +9,8 @@
     <p:sldId id="258" r:id="rId3"/>
     <p:sldId id="259" r:id="rId4"/>
     <p:sldId id="260" r:id="rId5"/>
+    <p:sldId id="261" r:id="rId6"/>
+    <p:sldId id="262" r:id="rId7"/>
   </p:sldIdLst>
   <p:sldSz cx="12192000" cy="6858000"/>
   <p:notesSz cx="6858000" cy="9144000"/>
@@ -129,7 +131,7 @@
 <file path=ppt/revisionInfo.xml><?xml version="1.0" encoding="utf-8"?>
 <p1510:revInfo xmlns:a="http://schemas.openxmlformats.org/drawingml/2006/main" xmlns:r="http://schemas.openxmlformats.org/officeDocument/2006/relationships" xmlns:p1510="http://schemas.microsoft.com/office/powerpoint/2015/10/main">
   <p1510:revLst>
-    <p1510:client id="{9403B015-2769-46C7-9465-E136DCA63CCF}" v="33" dt="2025-12-17T09:38:38.033"/>
+    <p1510:client id="{9403B015-2769-46C7-9465-E136DCA63CCF}" v="226" dt="2025-12-22T04:16:29.133"/>
   </p1510:revLst>
 </p1510:revInfo>
 </file>
@@ -139,7 +141,7 @@
   <pc:docChgLst>
     <pc:chgData name="Phạm Thông" userId="cb1de41f-d0a9-4c8b-9095-fa88b5d4678f" providerId="ADAL" clId="{E2A0B859-04CE-4714-8C81-52AA70A7C49E}"/>
     <pc:docChg chg="undo custSel addSld modSld">
-      <pc:chgData name="Phạm Thông" userId="cb1de41f-d0a9-4c8b-9095-fa88b5d4678f" providerId="ADAL" clId="{E2A0B859-04CE-4714-8C81-52AA70A7C49E}" dt="2025-12-17T09:38:47.895" v="437" actId="1037"/>
+      <pc:chgData name="Phạm Thông" userId="cb1de41f-d0a9-4c8b-9095-fa88b5d4678f" providerId="ADAL" clId="{E2A0B859-04CE-4714-8C81-52AA70A7C49E}" dt="2025-12-22T04:16:51.599" v="915" actId="1036"/>
       <pc:docMkLst>
         <pc:docMk/>
       </pc:docMkLst>
@@ -149,22 +151,6 @@
           <pc:docMk/>
           <pc:sldMk cId="1982739507" sldId="259"/>
         </pc:sldMkLst>
-        <pc:spChg chg="del">
-          <ac:chgData name="Phạm Thông" userId="cb1de41f-d0a9-4c8b-9095-fa88b5d4678f" providerId="ADAL" clId="{E2A0B859-04CE-4714-8C81-52AA70A7C49E}" dt="2025-12-16T17:52:56.351" v="1" actId="478"/>
-          <ac:spMkLst>
-            <pc:docMk/>
-            <pc:sldMk cId="1982739507" sldId="259"/>
-            <ac:spMk id="2" creationId="{76A4C110-80C5-A607-A7C2-3D1F74B34C5F}"/>
-          </ac:spMkLst>
-        </pc:spChg>
-        <pc:spChg chg="del">
-          <ac:chgData name="Phạm Thông" userId="cb1de41f-d0a9-4c8b-9095-fa88b5d4678f" providerId="ADAL" clId="{E2A0B859-04CE-4714-8C81-52AA70A7C49E}" dt="2025-12-16T17:52:56.351" v="1" actId="478"/>
-          <ac:spMkLst>
-            <pc:docMk/>
-            <pc:sldMk cId="1982739507" sldId="259"/>
-            <ac:spMk id="3" creationId="{32A548C5-D65F-D741-6FAB-0E0D7AD9A59C}"/>
-          </ac:spMkLst>
-        </pc:spChg>
         <pc:spChg chg="add mod">
           <ac:chgData name="Phạm Thông" userId="cb1de41f-d0a9-4c8b-9095-fa88b5d4678f" providerId="ADAL" clId="{E2A0B859-04CE-4714-8C81-52AA70A7C49E}" dt="2025-12-17T08:09:02.471" v="350" actId="1076"/>
           <ac:spMkLst>
@@ -205,14 +191,6 @@
             <ac:spMk id="9" creationId="{13CA4451-23AA-A1B3-276E-88C22E383155}"/>
           </ac:spMkLst>
         </pc:spChg>
-        <pc:spChg chg="add del">
-          <ac:chgData name="Phạm Thông" userId="cb1de41f-d0a9-4c8b-9095-fa88b5d4678f" providerId="ADAL" clId="{E2A0B859-04CE-4714-8C81-52AA70A7C49E}" dt="2025-12-16T18:04:27.974" v="267" actId="22"/>
-          <ac:spMkLst>
-            <pc:docMk/>
-            <pc:sldMk cId="1982739507" sldId="259"/>
-            <ac:spMk id="15" creationId="{11B961F8-F39A-1F54-71DE-CF1FE28A4615}"/>
-          </ac:spMkLst>
-        </pc:spChg>
         <pc:spChg chg="add mod">
           <ac:chgData name="Phạm Thông" userId="cb1de41f-d0a9-4c8b-9095-fa88b5d4678f" providerId="ADAL" clId="{E2A0B859-04CE-4714-8C81-52AA70A7C49E}" dt="2025-12-17T08:09:02.471" v="350" actId="1076"/>
           <ac:spMkLst>
@@ -243,14 +221,6 @@
             <pc:docMk/>
             <pc:sldMk cId="1982739507" sldId="259"/>
             <ac:cxnSpMk id="12" creationId="{E79F5465-4852-9EAE-DF5F-FDE60C52C463}"/>
-          </ac:cxnSpMkLst>
-        </pc:cxnChg>
-        <pc:cxnChg chg="add del">
-          <ac:chgData name="Phạm Thông" userId="cb1de41f-d0a9-4c8b-9095-fa88b5d4678f" providerId="ADAL" clId="{E2A0B859-04CE-4714-8C81-52AA70A7C49E}" dt="2025-12-16T18:05:02.129" v="278" actId="11529"/>
-          <ac:cxnSpMkLst>
-            <pc:docMk/>
-            <pc:sldMk cId="1982739507" sldId="259"/>
-            <ac:cxnSpMk id="18" creationId="{8F8E8038-003F-1752-9393-2264BAD0426A}"/>
           </ac:cxnSpMkLst>
         </pc:cxnChg>
         <pc:cxnChg chg="add mod">
@@ -316,14 +286,6 @@
             <ac:graphicFrameMk id="2" creationId="{083D4EB6-0D7E-3B89-F33D-30EA238837A0}"/>
           </ac:graphicFrameMkLst>
         </pc:graphicFrameChg>
-        <pc:graphicFrameChg chg="add mod">
-          <ac:chgData name="Phạm Thông" userId="cb1de41f-d0a9-4c8b-9095-fa88b5d4678f" providerId="ADAL" clId="{E2A0B859-04CE-4714-8C81-52AA70A7C49E}" dt="2025-12-17T09:32:06.871" v="370"/>
-          <ac:graphicFrameMkLst>
-            <pc:docMk/>
-            <pc:sldMk cId="3124328060" sldId="260"/>
-            <ac:graphicFrameMk id="3" creationId="{648FBAF4-5C32-17C3-7125-1062F3B78DBF}"/>
-          </ac:graphicFrameMkLst>
-        </pc:graphicFrameChg>
         <pc:graphicFrameChg chg="add mod modGraphic">
           <ac:chgData name="Phạm Thông" userId="cb1de41f-d0a9-4c8b-9095-fa88b5d4678f" providerId="ADAL" clId="{E2A0B859-04CE-4714-8C81-52AA70A7C49E}" dt="2025-12-17T09:32:57.286" v="387" actId="20577"/>
           <ac:graphicFrameMkLst>
@@ -356,6 +318,164 @@
             <ac:cxnSpMk id="10" creationId="{699349DD-74A4-EDF6-B90B-52CA518BD680}"/>
           </ac:cxnSpMkLst>
         </pc:cxnChg>
+      </pc:sldChg>
+      <pc:sldChg chg="addSp modSp new mod">
+        <pc:chgData name="Phạm Thông" userId="cb1de41f-d0a9-4c8b-9095-fa88b5d4678f" providerId="ADAL" clId="{E2A0B859-04CE-4714-8C81-52AA70A7C49E}" dt="2025-12-22T04:01:39.864" v="484" actId="1076"/>
+        <pc:sldMkLst>
+          <pc:docMk/>
+          <pc:sldMk cId="2157018924" sldId="261"/>
+        </pc:sldMkLst>
+        <pc:spChg chg="add mod">
+          <ac:chgData name="Phạm Thông" userId="cb1de41f-d0a9-4c8b-9095-fa88b5d4678f" providerId="ADAL" clId="{E2A0B859-04CE-4714-8C81-52AA70A7C49E}" dt="2025-12-22T04:01:31.805" v="483" actId="1076"/>
+          <ac:spMkLst>
+            <pc:docMk/>
+            <pc:sldMk cId="2157018924" sldId="261"/>
+            <ac:spMk id="4" creationId="{17CBBC60-B6DF-0658-5798-F732CD007897}"/>
+          </ac:spMkLst>
+        </pc:spChg>
+        <pc:spChg chg="add mod">
+          <ac:chgData name="Phạm Thông" userId="cb1de41f-d0a9-4c8b-9095-fa88b5d4678f" providerId="ADAL" clId="{E2A0B859-04CE-4714-8C81-52AA70A7C49E}" dt="2025-12-22T04:01:39.864" v="484" actId="1076"/>
+          <ac:spMkLst>
+            <pc:docMk/>
+            <pc:sldMk cId="2157018924" sldId="261"/>
+            <ac:spMk id="5" creationId="{7047CFA3-EE6F-5366-D92B-92BCB07E1B47}"/>
+          </ac:spMkLst>
+        </pc:spChg>
+        <pc:picChg chg="add mod">
+          <ac:chgData name="Phạm Thông" userId="cb1de41f-d0a9-4c8b-9095-fa88b5d4678f" providerId="ADAL" clId="{E2A0B859-04CE-4714-8C81-52AA70A7C49E}" dt="2025-12-22T04:01:25.363" v="482" actId="1076"/>
+          <ac:picMkLst>
+            <pc:docMk/>
+            <pc:sldMk cId="2157018924" sldId="261"/>
+            <ac:picMk id="3" creationId="{EE9099FA-FA64-5FA3-5CCD-EBF9B6AAD20F}"/>
+          </ac:picMkLst>
+        </pc:picChg>
+      </pc:sldChg>
+      <pc:sldChg chg="addSp modSp new mod">
+        <pc:chgData name="Phạm Thông" userId="cb1de41f-d0a9-4c8b-9095-fa88b5d4678f" providerId="ADAL" clId="{E2A0B859-04CE-4714-8C81-52AA70A7C49E}" dt="2025-12-22T04:16:51.599" v="915" actId="1036"/>
+        <pc:sldMkLst>
+          <pc:docMk/>
+          <pc:sldMk cId="1254439374" sldId="262"/>
+        </pc:sldMkLst>
+        <pc:spChg chg="add mod">
+          <ac:chgData name="Phạm Thông" userId="cb1de41f-d0a9-4c8b-9095-fa88b5d4678f" providerId="ADAL" clId="{E2A0B859-04CE-4714-8C81-52AA70A7C49E}" dt="2025-12-22T04:15:45.363" v="799" actId="1035"/>
+          <ac:spMkLst>
+            <pc:docMk/>
+            <pc:sldMk cId="1254439374" sldId="262"/>
+            <ac:spMk id="4" creationId="{0D9BDEA9-FC50-DDF8-97A3-1090599B86D4}"/>
+          </ac:spMkLst>
+        </pc:spChg>
+        <pc:spChg chg="add mod">
+          <ac:chgData name="Phạm Thông" userId="cb1de41f-d0a9-4c8b-9095-fa88b5d4678f" providerId="ADAL" clId="{E2A0B859-04CE-4714-8C81-52AA70A7C49E}" dt="2025-12-22T04:16:13.614" v="843" actId="1037"/>
+          <ac:spMkLst>
+            <pc:docMk/>
+            <pc:sldMk cId="1254439374" sldId="262"/>
+            <ac:spMk id="5" creationId="{0584EADF-9E7B-F41E-29AA-9043BD324EE5}"/>
+          </ac:spMkLst>
+        </pc:spChg>
+        <pc:spChg chg="add mod">
+          <ac:chgData name="Phạm Thông" userId="cb1de41f-d0a9-4c8b-9095-fa88b5d4678f" providerId="ADAL" clId="{E2A0B859-04CE-4714-8C81-52AA70A7C49E}" dt="2025-12-22T04:16:07.413" v="835" actId="1036"/>
+          <ac:spMkLst>
+            <pc:docMk/>
+            <pc:sldMk cId="1254439374" sldId="262"/>
+            <ac:spMk id="6" creationId="{8E971AE7-6F5D-9507-1F2B-1A927D5E88D0}"/>
+          </ac:spMkLst>
+        </pc:spChg>
+        <pc:spChg chg="add mod">
+          <ac:chgData name="Phạm Thông" userId="cb1de41f-d0a9-4c8b-9095-fa88b5d4678f" providerId="ADAL" clId="{E2A0B859-04CE-4714-8C81-52AA70A7C49E}" dt="2025-12-22T04:16:02.289" v="830" actId="1036"/>
+          <ac:spMkLst>
+            <pc:docMk/>
+            <pc:sldMk cId="1254439374" sldId="262"/>
+            <ac:spMk id="7" creationId="{047FA349-78C2-4032-4412-2C68CFD92713}"/>
+          </ac:spMkLst>
+        </pc:spChg>
+        <pc:spChg chg="add mod">
+          <ac:chgData name="Phạm Thông" userId="cb1de41f-d0a9-4c8b-9095-fa88b5d4678f" providerId="ADAL" clId="{E2A0B859-04CE-4714-8C81-52AA70A7C49E}" dt="2025-12-22T04:15:56.639" v="826" actId="1036"/>
+          <ac:spMkLst>
+            <pc:docMk/>
+            <pc:sldMk cId="1254439374" sldId="262"/>
+            <ac:spMk id="8" creationId="{3E59DC15-6224-7DF5-6157-150831AAFABE}"/>
+          </ac:spMkLst>
+        </pc:spChg>
+        <pc:spChg chg="add mod">
+          <ac:chgData name="Phạm Thông" userId="cb1de41f-d0a9-4c8b-9095-fa88b5d4678f" providerId="ADAL" clId="{E2A0B859-04CE-4714-8C81-52AA70A7C49E}" dt="2025-12-22T04:15:33.775" v="785" actId="1076"/>
+          <ac:spMkLst>
+            <pc:docMk/>
+            <pc:sldMk cId="1254439374" sldId="262"/>
+            <ac:spMk id="9" creationId="{31459236-C13C-F462-7E8C-1EC248865111}"/>
+          </ac:spMkLst>
+        </pc:spChg>
+        <pc:spChg chg="add mod">
+          <ac:chgData name="Phạm Thông" userId="cb1de41f-d0a9-4c8b-9095-fa88b5d4678f" providerId="ADAL" clId="{E2A0B859-04CE-4714-8C81-52AA70A7C49E}" dt="2025-12-22T04:16:22.878" v="853" actId="1036"/>
+          <ac:spMkLst>
+            <pc:docMk/>
+            <pc:sldMk cId="1254439374" sldId="262"/>
+            <ac:spMk id="10" creationId="{DDB9E504-415D-F6CF-3EEC-C1881488066A}"/>
+          </ac:spMkLst>
+        </pc:spChg>
+        <pc:spChg chg="add mod">
+          <ac:chgData name="Phạm Thông" userId="cb1de41f-d0a9-4c8b-9095-fa88b5d4678f" providerId="ADAL" clId="{E2A0B859-04CE-4714-8C81-52AA70A7C49E}" dt="2025-12-22T04:16:33.850" v="860" actId="1035"/>
+          <ac:spMkLst>
+            <pc:docMk/>
+            <pc:sldMk cId="1254439374" sldId="262"/>
+            <ac:spMk id="11" creationId="{5AD849E9-AA77-21A0-BBDB-E31E39CDB1DB}"/>
+          </ac:spMkLst>
+        </pc:spChg>
+        <pc:spChg chg="add mod">
+          <ac:chgData name="Phạm Thông" userId="cb1de41f-d0a9-4c8b-9095-fa88b5d4678f" providerId="ADAL" clId="{E2A0B859-04CE-4714-8C81-52AA70A7C49E}" dt="2025-12-22T04:16:41.678" v="884" actId="1036"/>
+          <ac:spMkLst>
+            <pc:docMk/>
+            <pc:sldMk cId="1254439374" sldId="262"/>
+            <ac:spMk id="12" creationId="{F6FDC299-5ED1-0534-4EC4-AD44F7F18F82}"/>
+          </ac:spMkLst>
+        </pc:spChg>
+        <pc:spChg chg="add mod">
+          <ac:chgData name="Phạm Thông" userId="cb1de41f-d0a9-4c8b-9095-fa88b5d4678f" providerId="ADAL" clId="{E2A0B859-04CE-4714-8C81-52AA70A7C49E}" dt="2025-12-22T04:16:46.040" v="903" actId="1038"/>
+          <ac:spMkLst>
+            <pc:docMk/>
+            <pc:sldMk cId="1254439374" sldId="262"/>
+            <ac:spMk id="13" creationId="{9CA381FA-6D84-A699-F542-5E46EAF1804E}"/>
+          </ac:spMkLst>
+        </pc:spChg>
+        <pc:spChg chg="add mod">
+          <ac:chgData name="Phạm Thông" userId="cb1de41f-d0a9-4c8b-9095-fa88b5d4678f" providerId="ADAL" clId="{E2A0B859-04CE-4714-8C81-52AA70A7C49E}" dt="2025-12-22T04:16:51.599" v="915" actId="1036"/>
+          <ac:spMkLst>
+            <pc:docMk/>
+            <pc:sldMk cId="1254439374" sldId="262"/>
+            <ac:spMk id="14" creationId="{950381AC-2A7F-3C72-5F68-7CFA62EFA367}"/>
+          </ac:spMkLst>
+        </pc:spChg>
+        <pc:spChg chg="add mod ord">
+          <ac:chgData name="Phạm Thông" userId="cb1de41f-d0a9-4c8b-9095-fa88b5d4678f" providerId="ADAL" clId="{E2A0B859-04CE-4714-8C81-52AA70A7C49E}" dt="2025-12-22T04:15:38.332" v="787" actId="1076"/>
+          <ac:spMkLst>
+            <pc:docMk/>
+            <pc:sldMk cId="1254439374" sldId="262"/>
+            <ac:spMk id="15" creationId="{68F657CB-7E90-9DC3-A742-E0F57E338D52}"/>
+          </ac:spMkLst>
+        </pc:spChg>
+        <pc:spChg chg="add mod ord">
+          <ac:chgData name="Phạm Thông" userId="cb1de41f-d0a9-4c8b-9095-fa88b5d4678f" providerId="ADAL" clId="{E2A0B859-04CE-4714-8C81-52AA70A7C49E}" dt="2025-12-22T04:13:17.017" v="768" actId="167"/>
+          <ac:spMkLst>
+            <pc:docMk/>
+            <pc:sldMk cId="1254439374" sldId="262"/>
+            <ac:spMk id="16" creationId="{43DA85D0-0269-8E9A-DAA9-3E053B95CA91}"/>
+          </ac:spMkLst>
+        </pc:spChg>
+        <pc:picChg chg="add mod ord modCrop">
+          <ac:chgData name="Phạm Thông" userId="cb1de41f-d0a9-4c8b-9095-fa88b5d4678f" providerId="ADAL" clId="{E2A0B859-04CE-4714-8C81-52AA70A7C49E}" dt="2025-12-22T04:15:07.007" v="780" actId="12788"/>
+          <ac:picMkLst>
+            <pc:docMk/>
+            <pc:sldMk cId="1254439374" sldId="262"/>
+            <ac:picMk id="3" creationId="{3EA9C69C-C618-5E5C-A1A5-C00B0EA4B2E8}"/>
+          </ac:picMkLst>
+        </pc:picChg>
+        <pc:picChg chg="add mod ord modCrop">
+          <ac:chgData name="Phạm Thông" userId="cb1de41f-d0a9-4c8b-9095-fa88b5d4678f" providerId="ADAL" clId="{E2A0B859-04CE-4714-8C81-52AA70A7C49E}" dt="2025-12-22T04:15:20.528" v="784" actId="171"/>
+          <ac:picMkLst>
+            <pc:docMk/>
+            <pc:sldMk cId="1254439374" sldId="262"/>
+            <ac:picMk id="18" creationId="{3F7D8D6B-91A0-3AEA-31F4-CE8487FC695B}"/>
+          </ac:picMkLst>
+        </pc:picChg>
       </pc:sldChg>
     </pc:docChg>
   </pc:docChgLst>
@@ -509,7 +629,7 @@
           <a:p>
             <a:fld id="{6EB22DFD-DB99-45C6-9F20-54734D4D55A2}" type="datetimeFigureOut">
               <a:rPr lang="en-US" smtClean="0"/>
-              <a:t>12/17/2025</a:t>
+              <a:t>12/22/2025</a:t>
             </a:fld>
             <a:endParaRPr lang="en-US"/>
           </a:p>
@@ -707,7 +827,7 @@
           <a:p>
             <a:fld id="{6EB22DFD-DB99-45C6-9F20-54734D4D55A2}" type="datetimeFigureOut">
               <a:rPr lang="en-US" smtClean="0"/>
-              <a:t>12/17/2025</a:t>
+              <a:t>12/22/2025</a:t>
             </a:fld>
             <a:endParaRPr lang="en-US"/>
           </a:p>
@@ -915,7 +1035,7 @@
           <a:p>
             <a:fld id="{6EB22DFD-DB99-45C6-9F20-54734D4D55A2}" type="datetimeFigureOut">
               <a:rPr lang="en-US" smtClean="0"/>
-              <a:t>12/17/2025</a:t>
+              <a:t>12/22/2025</a:t>
             </a:fld>
             <a:endParaRPr lang="en-US"/>
           </a:p>
@@ -1113,7 +1233,7 @@
           <a:p>
             <a:fld id="{6EB22DFD-DB99-45C6-9F20-54734D4D55A2}" type="datetimeFigureOut">
               <a:rPr lang="en-US" smtClean="0"/>
-              <a:t>12/17/2025</a:t>
+              <a:t>12/22/2025</a:t>
             </a:fld>
             <a:endParaRPr lang="en-US"/>
           </a:p>
@@ -1388,7 +1508,7 @@
           <a:p>
             <a:fld id="{6EB22DFD-DB99-45C6-9F20-54734D4D55A2}" type="datetimeFigureOut">
               <a:rPr lang="en-US" smtClean="0"/>
-              <a:t>12/17/2025</a:t>
+              <a:t>12/22/2025</a:t>
             </a:fld>
             <a:endParaRPr lang="en-US"/>
           </a:p>
@@ -1653,7 +1773,7 @@
           <a:p>
             <a:fld id="{6EB22DFD-DB99-45C6-9F20-54734D4D55A2}" type="datetimeFigureOut">
               <a:rPr lang="en-US" smtClean="0"/>
-              <a:t>12/17/2025</a:t>
+              <a:t>12/22/2025</a:t>
             </a:fld>
             <a:endParaRPr lang="en-US"/>
           </a:p>
@@ -2065,7 +2185,7 @@
           <a:p>
             <a:fld id="{6EB22DFD-DB99-45C6-9F20-54734D4D55A2}" type="datetimeFigureOut">
               <a:rPr lang="en-US" smtClean="0"/>
-              <a:t>12/17/2025</a:t>
+              <a:t>12/22/2025</a:t>
             </a:fld>
             <a:endParaRPr lang="en-US"/>
           </a:p>
@@ -2206,7 +2326,7 @@
           <a:p>
             <a:fld id="{6EB22DFD-DB99-45C6-9F20-54734D4D55A2}" type="datetimeFigureOut">
               <a:rPr lang="en-US" smtClean="0"/>
-              <a:t>12/17/2025</a:t>
+              <a:t>12/22/2025</a:t>
             </a:fld>
             <a:endParaRPr lang="en-US"/>
           </a:p>
@@ -2319,7 +2439,7 @@
           <a:p>
             <a:fld id="{6EB22DFD-DB99-45C6-9F20-54734D4D55A2}" type="datetimeFigureOut">
               <a:rPr lang="en-US" smtClean="0"/>
-              <a:t>12/17/2025</a:t>
+              <a:t>12/22/2025</a:t>
             </a:fld>
             <a:endParaRPr lang="en-US"/>
           </a:p>
@@ -2630,7 +2750,7 @@
           <a:p>
             <a:fld id="{6EB22DFD-DB99-45C6-9F20-54734D4D55A2}" type="datetimeFigureOut">
               <a:rPr lang="en-US" smtClean="0"/>
-              <a:t>12/17/2025</a:t>
+              <a:t>12/22/2025</a:t>
             </a:fld>
             <a:endParaRPr lang="en-US"/>
           </a:p>
@@ -2918,7 +3038,7 @@
           <a:p>
             <a:fld id="{6EB22DFD-DB99-45C6-9F20-54734D4D55A2}" type="datetimeFigureOut">
               <a:rPr lang="en-US" smtClean="0"/>
-              <a:t>12/17/2025</a:t>
+              <a:t>12/22/2025</a:t>
             </a:fld>
             <a:endParaRPr lang="en-US"/>
           </a:p>
@@ -3159,7 +3279,7 @@
           <a:p>
             <a:fld id="{6EB22DFD-DB99-45C6-9F20-54734D4D55A2}" type="datetimeFigureOut">
               <a:rPr lang="en-US" smtClean="0"/>
-              <a:t>12/17/2025</a:t>
+              <a:t>12/22/2025</a:t>
             </a:fld>
             <a:endParaRPr lang="en-US"/>
           </a:p>
@@ -7353,8 +7473,8 @@
           </a:graphicData>
         </a:graphic>
       </p:graphicFrame>
-      <mc:AlternateContent xmlns:mc="http://schemas.openxmlformats.org/markup-compatibility/2006">
-        <mc:Choice xmlns:a14="http://schemas.microsoft.com/office/drawing/2010/main" Requires="a14">
+      <mc:AlternateContent xmlns:mc="http://schemas.openxmlformats.org/markup-compatibility/2006" xmlns:a14="http://schemas.microsoft.com/office/drawing/2010/main">
+        <mc:Choice Requires="a14">
           <p:sp>
             <p:nvSpPr>
               <p:cNvPr id="5" name="TextBox 4">
@@ -7383,6 +7503,7 @@
               </a:bodyPr>
               <a:lstStyle/>
               <a:p>
+                <a:pPr/>
                 <a14:m>
                   <m:oMathPara xmlns:m="http://schemas.openxmlformats.org/officeDocument/2006/math">
                     <m:oMathParaPr>
@@ -7403,7 +7524,7 @@
             </p:txBody>
           </p:sp>
         </mc:Choice>
-        <mc:Fallback>
+        <mc:Fallback xmlns="">
           <p:sp>
             <p:nvSpPr>
               <p:cNvPr id="5" name="TextBox 4">
@@ -7448,8 +7569,8 @@
           </p:sp>
         </mc:Fallback>
       </mc:AlternateContent>
-      <mc:AlternateContent xmlns:mc="http://schemas.openxmlformats.org/markup-compatibility/2006">
-        <mc:Choice xmlns:a14="http://schemas.microsoft.com/office/drawing/2010/main" Requires="a14">
+      <mc:AlternateContent xmlns:mc="http://schemas.openxmlformats.org/markup-compatibility/2006" xmlns:a14="http://schemas.microsoft.com/office/drawing/2010/main">
+        <mc:Choice Requires="a14">
           <p:sp>
             <p:nvSpPr>
               <p:cNvPr id="6" name="TextBox 5">
@@ -7478,6 +7599,7 @@
               </a:bodyPr>
               <a:lstStyle/>
               <a:p>
+                <a:pPr/>
                 <a14:m>
                   <m:oMathPara xmlns:m="http://schemas.openxmlformats.org/officeDocument/2006/math">
                     <m:oMathParaPr>
@@ -7498,7 +7620,7 @@
             </p:txBody>
           </p:sp>
         </mc:Choice>
-        <mc:Fallback>
+        <mc:Fallback xmlns="">
           <p:sp>
             <p:nvSpPr>
               <p:cNvPr id="6" name="TextBox 5">
@@ -7850,6 +7972,2485 @@
     <p:extLst>
       <p:ext uri="{BB962C8B-B14F-4D97-AF65-F5344CB8AC3E}">
         <p14:creationId xmlns:p14="http://schemas.microsoft.com/office/powerpoint/2010/main" val="3124328060"/>
+      </p:ext>
+    </p:extLst>
+  </p:cSld>
+  <p:clrMapOvr>
+    <a:masterClrMapping/>
+  </p:clrMapOvr>
+</p:sld>
+</file>
+
+<file path=ppt/slides/slide5.xml><?xml version="1.0" encoding="utf-8"?>
+<p:sld xmlns:a="http://schemas.openxmlformats.org/drawingml/2006/main" xmlns:r="http://schemas.openxmlformats.org/officeDocument/2006/relationships" xmlns:p="http://schemas.openxmlformats.org/presentationml/2006/main">
+  <p:cSld>
+    <p:spTree>
+      <p:nvGrpSpPr>
+        <p:cNvPr id="1" name=""/>
+        <p:cNvGrpSpPr/>
+        <p:nvPr/>
+      </p:nvGrpSpPr>
+      <p:grpSpPr>
+        <a:xfrm>
+          <a:off x="0" y="0"/>
+          <a:ext cx="0" cy="0"/>
+          <a:chOff x="0" y="0"/>
+          <a:chExt cx="0" cy="0"/>
+        </a:xfrm>
+      </p:grpSpPr>
+      <p:pic>
+        <p:nvPicPr>
+          <p:cNvPr id="3" name="Picture 2">
+            <a:extLst>
+              <a:ext uri="{FF2B5EF4-FFF2-40B4-BE49-F238E27FC236}">
+                <a16:creationId xmlns:a16="http://schemas.microsoft.com/office/drawing/2014/main" id="{EE9099FA-FA64-5FA3-5CCD-EBF9B6AAD20F}"/>
+              </a:ext>
+            </a:extLst>
+          </p:cNvPr>
+          <p:cNvPicPr>
+            <a:picLocks noChangeAspect="1"/>
+          </p:cNvPicPr>
+          <p:nvPr/>
+        </p:nvPicPr>
+        <p:blipFill>
+          <a:blip r:embed="rId2">
+            <a:extLst>
+              <a:ext uri="{28A0092B-C50C-407E-A947-70E740481C1C}">
+                <a14:useLocalDpi xmlns:a14="http://schemas.microsoft.com/office/drawing/2010/main" val="0"/>
+              </a:ext>
+            </a:extLst>
+          </a:blip>
+          <a:stretch>
+            <a:fillRect/>
+          </a:stretch>
+        </p:blipFill>
+        <p:spPr>
+          <a:xfrm>
+            <a:off x="893256" y="0"/>
+            <a:ext cx="9444789" cy="6858000"/>
+          </a:xfrm>
+          <a:prstGeom prst="rect">
+            <a:avLst/>
+          </a:prstGeom>
+        </p:spPr>
+      </p:pic>
+      <mc:AlternateContent xmlns:mc="http://schemas.openxmlformats.org/markup-compatibility/2006">
+        <mc:Choice xmlns:a14="http://schemas.microsoft.com/office/drawing/2010/main" Requires="a14">
+          <p:sp>
+            <p:nvSpPr>
+              <p:cNvPr id="4" name="TextBox 3">
+                <a:extLst>
+                  <a:ext uri="{FF2B5EF4-FFF2-40B4-BE49-F238E27FC236}">
+                    <a16:creationId xmlns:a16="http://schemas.microsoft.com/office/drawing/2014/main" id="{17CBBC60-B6DF-0658-5798-F732CD007897}"/>
+                  </a:ext>
+                </a:extLst>
+              </p:cNvPr>
+              <p:cNvSpPr txBox="1"/>
+              <p:nvPr/>
+            </p:nvSpPr>
+            <p:spPr>
+              <a:xfrm>
+                <a:off x="464553" y="4564174"/>
+                <a:ext cx="1797993" cy="276999"/>
+              </a:xfrm>
+              <a:prstGeom prst="rect">
+                <a:avLst/>
+              </a:prstGeom>
+              <a:noFill/>
+            </p:spPr>
+            <p:txBody>
+              <a:bodyPr wrap="none" lIns="0" tIns="0" rIns="0" bIns="0" rtlCol="0">
+                <a:spAutoFit/>
+              </a:bodyPr>
+              <a:lstStyle/>
+              <a:p>
+                <a14:m>
+                  <m:oMathPara xmlns:m="http://schemas.openxmlformats.org/officeDocument/2006/math">
+                    <m:oMathParaPr>
+                      <m:jc m:val="centerGroup"/>
+                    </m:oMathParaPr>
+                    <m:oMath xmlns:m="http://schemas.openxmlformats.org/officeDocument/2006/math">
+                      <m:r>
+                        <a:rPr lang="en-US" b="0" i="1" smtClean="0">
+                          <a:latin typeface="Cambria Math" panose="02040503050406030204" pitchFamily="18" charset="0"/>
+                        </a:rPr>
+                        <m:t>𝐶</m:t>
+                      </m:r>
+                      <m:r>
+                        <a:rPr lang="en-US" b="0" i="1" smtClean="0">
+                          <a:latin typeface="Cambria Math" panose="02040503050406030204" pitchFamily="18" charset="0"/>
+                        </a:rPr>
+                        <m:t>={</m:t>
+                      </m:r>
+                      <m:sSub>
+                        <m:sSubPr>
+                          <m:ctrlPr>
+                            <a:rPr lang="en-US" b="0" i="1" smtClean="0">
+                              <a:latin typeface="Cambria Math" panose="02040503050406030204" pitchFamily="18" charset="0"/>
+                            </a:rPr>
+                          </m:ctrlPr>
+                        </m:sSubPr>
+                        <m:e>
+                          <m:r>
+                            <a:rPr lang="en-US" b="0" i="1" smtClean="0">
+                              <a:latin typeface="Cambria Math" panose="02040503050406030204" pitchFamily="18" charset="0"/>
+                            </a:rPr>
+                            <m:t>𝑐</m:t>
+                          </m:r>
+                        </m:e>
+                        <m:sub>
+                          <m:r>
+                            <a:rPr lang="en-US" b="0" i="1" smtClean="0">
+                              <a:latin typeface="Cambria Math" panose="02040503050406030204" pitchFamily="18" charset="0"/>
+                            </a:rPr>
+                            <m:t>1</m:t>
+                          </m:r>
+                        </m:sub>
+                      </m:sSub>
+                      <m:r>
+                        <a:rPr lang="en-US" b="0" i="1" smtClean="0">
+                          <a:latin typeface="Cambria Math" panose="02040503050406030204" pitchFamily="18" charset="0"/>
+                        </a:rPr>
+                        <m:t>, </m:t>
+                      </m:r>
+                      <m:sSub>
+                        <m:sSubPr>
+                          <m:ctrlPr>
+                            <a:rPr lang="en-US" b="0" i="1" smtClean="0">
+                              <a:latin typeface="Cambria Math" panose="02040503050406030204" pitchFamily="18" charset="0"/>
+                            </a:rPr>
+                          </m:ctrlPr>
+                        </m:sSubPr>
+                        <m:e>
+                          <m:r>
+                            <a:rPr lang="en-US" b="0" i="1" smtClean="0">
+                              <a:latin typeface="Cambria Math" panose="02040503050406030204" pitchFamily="18" charset="0"/>
+                            </a:rPr>
+                            <m:t>𝑐</m:t>
+                          </m:r>
+                        </m:e>
+                        <m:sub>
+                          <m:r>
+                            <a:rPr lang="en-US" b="0" i="1" smtClean="0">
+                              <a:latin typeface="Cambria Math" panose="02040503050406030204" pitchFamily="18" charset="0"/>
+                            </a:rPr>
+                            <m:t>2</m:t>
+                          </m:r>
+                        </m:sub>
+                      </m:sSub>
+                      <m:r>
+                        <a:rPr lang="en-US" b="0" i="1" smtClean="0">
+                          <a:latin typeface="Cambria Math" panose="02040503050406030204" pitchFamily="18" charset="0"/>
+                        </a:rPr>
+                        <m:t>,…, </m:t>
+                      </m:r>
+                      <m:sSub>
+                        <m:sSubPr>
+                          <m:ctrlPr>
+                            <a:rPr lang="en-US" b="0" i="1" smtClean="0">
+                              <a:latin typeface="Cambria Math" panose="02040503050406030204" pitchFamily="18" charset="0"/>
+                            </a:rPr>
+                          </m:ctrlPr>
+                        </m:sSubPr>
+                        <m:e>
+                          <m:r>
+                            <a:rPr lang="en-US" b="0" i="1" smtClean="0">
+                              <a:latin typeface="Cambria Math" panose="02040503050406030204" pitchFamily="18" charset="0"/>
+                            </a:rPr>
+                            <m:t>𝑐</m:t>
+                          </m:r>
+                        </m:e>
+                        <m:sub>
+                          <m:r>
+                            <a:rPr lang="en-US" b="0" i="1" smtClean="0">
+                              <a:latin typeface="Cambria Math" panose="02040503050406030204" pitchFamily="18" charset="0"/>
+                            </a:rPr>
+                            <m:t>𝑘</m:t>
+                          </m:r>
+                        </m:sub>
+                      </m:sSub>
+                      <m:r>
+                        <a:rPr lang="en-US" b="0" i="1" smtClean="0">
+                          <a:latin typeface="Cambria Math" panose="02040503050406030204" pitchFamily="18" charset="0"/>
+                        </a:rPr>
+                        <m:t>}</m:t>
+                      </m:r>
+                    </m:oMath>
+                  </m:oMathPara>
+                </a14:m>
+                <a:endParaRPr lang="en-US"/>
+              </a:p>
+            </p:txBody>
+          </p:sp>
+        </mc:Choice>
+        <mc:Fallback>
+          <p:sp>
+            <p:nvSpPr>
+              <p:cNvPr id="4" name="TextBox 3">
+                <a:extLst>
+                  <a:ext uri="{FF2B5EF4-FFF2-40B4-BE49-F238E27FC236}">
+                    <a16:creationId xmlns:a16="http://schemas.microsoft.com/office/drawing/2014/main" id="{17CBBC60-B6DF-0658-5798-F732CD007897}"/>
+                  </a:ext>
+                </a:extLst>
+              </p:cNvPr>
+              <p:cNvSpPr txBox="1">
+                <a:spLocks noRot="1" noChangeAspect="1" noMove="1" noResize="1" noEditPoints="1" noAdjustHandles="1" noChangeArrowheads="1" noChangeShapeType="1" noTextEdit="1"/>
+              </p:cNvSpPr>
+              <p:nvPr/>
+            </p:nvSpPr>
+            <p:spPr>
+              <a:xfrm>
+                <a:off x="464553" y="4564174"/>
+                <a:ext cx="1797993" cy="276999"/>
+              </a:xfrm>
+              <a:prstGeom prst="rect">
+                <a:avLst/>
+              </a:prstGeom>
+              <a:blipFill>
+                <a:blip r:embed="rId3"/>
+                <a:stretch>
+                  <a:fillRect l="-2034" t="-4444" r="-4068" b="-37778"/>
+                </a:stretch>
+              </a:blipFill>
+            </p:spPr>
+            <p:txBody>
+              <a:bodyPr/>
+              <a:lstStyle/>
+              <a:p>
+                <a:r>
+                  <a:rPr lang="en-US">
+                    <a:noFill/>
+                  </a:rPr>
+                  <a:t> </a:t>
+                </a:r>
+              </a:p>
+            </p:txBody>
+          </p:sp>
+        </mc:Fallback>
+      </mc:AlternateContent>
+      <mc:AlternateContent xmlns:mc="http://schemas.openxmlformats.org/markup-compatibility/2006">
+        <mc:Choice xmlns:a14="http://schemas.microsoft.com/office/drawing/2010/main" Requires="a14">
+          <p:sp>
+            <p:nvSpPr>
+              <p:cNvPr id="5" name="TextBox 4">
+                <a:extLst>
+                  <a:ext uri="{FF2B5EF4-FFF2-40B4-BE49-F238E27FC236}">
+                    <a16:creationId xmlns:a16="http://schemas.microsoft.com/office/drawing/2014/main" id="{7047CFA3-EE6F-5366-D92B-92BCB07E1B47}"/>
+                  </a:ext>
+                </a:extLst>
+              </p:cNvPr>
+              <p:cNvSpPr txBox="1"/>
+              <p:nvPr/>
+            </p:nvSpPr>
+            <p:spPr>
+              <a:xfrm>
+                <a:off x="9332104" y="4380501"/>
+                <a:ext cx="2592313" cy="367345"/>
+              </a:xfrm>
+              <a:prstGeom prst="rect">
+                <a:avLst/>
+              </a:prstGeom>
+              <a:noFill/>
+            </p:spPr>
+            <p:txBody>
+              <a:bodyPr wrap="none" lIns="0" tIns="0" rIns="0" bIns="0" rtlCol="0">
+                <a:spAutoFit/>
+              </a:bodyPr>
+              <a:lstStyle/>
+              <a:p>
+                <a14:m>
+                  <m:oMathPara xmlns:m="http://schemas.openxmlformats.org/officeDocument/2006/math">
+                    <m:oMathParaPr>
+                      <m:jc m:val="centerGroup"/>
+                    </m:oMathParaPr>
+                    <m:oMath xmlns:m="http://schemas.openxmlformats.org/officeDocument/2006/math">
+                      <m:r>
+                        <a:rPr lang="en-US" i="1" smtClean="0">
+                          <a:latin typeface="Cambria Math" panose="02040503050406030204" pitchFamily="18" charset="0"/>
+                        </a:rPr>
+                        <m:t>𝑖</m:t>
+                      </m:r>
+                      <m:d>
+                        <m:dPr>
+                          <m:ctrlPr>
+                            <a:rPr lang="en-US" i="1">
+                              <a:latin typeface="Cambria Math" panose="02040503050406030204" pitchFamily="18" charset="0"/>
+                            </a:rPr>
+                          </m:ctrlPr>
+                        </m:dPr>
+                        <m:e>
+                          <m:r>
+                            <a:rPr lang="en-US" i="1">
+                              <a:latin typeface="Cambria Math" panose="02040503050406030204" pitchFamily="18" charset="0"/>
+                            </a:rPr>
+                            <m:t>𝑥</m:t>
+                          </m:r>
+                        </m:e>
+                      </m:d>
+                      <m:r>
+                        <a:rPr lang="en-US" i="1">
+                          <a:latin typeface="Cambria Math" panose="02040503050406030204" pitchFamily="18" charset="0"/>
+                        </a:rPr>
+                        <m:t>=</m:t>
+                      </m:r>
+                      <m:r>
+                        <a:rPr lang="en-US" i="1">
+                          <a:latin typeface="Cambria Math" panose="02040503050406030204" pitchFamily="18" charset="0"/>
+                        </a:rPr>
+                        <m:t>𝑎𝑟𝑔𝑚𝑖</m:t>
+                      </m:r>
+                      <m:sSub>
+                        <m:sSubPr>
+                          <m:ctrlPr>
+                            <a:rPr lang="en-US" i="1">
+                              <a:latin typeface="Cambria Math" panose="02040503050406030204" pitchFamily="18" charset="0"/>
+                            </a:rPr>
+                          </m:ctrlPr>
+                        </m:sSubPr>
+                        <m:e>
+                          <m:r>
+                            <a:rPr lang="en-US" i="1">
+                              <a:latin typeface="Cambria Math" panose="02040503050406030204" pitchFamily="18" charset="0"/>
+                            </a:rPr>
+                            <m:t>𝑛</m:t>
+                          </m:r>
+                        </m:e>
+                        <m:sub>
+                          <m:r>
+                            <a:rPr lang="en-US" i="1">
+                              <a:latin typeface="Cambria Math" panose="02040503050406030204" pitchFamily="18" charset="0"/>
+                            </a:rPr>
+                            <m:t>𝑖</m:t>
+                          </m:r>
+                        </m:sub>
+                      </m:sSub>
+                      <m:sSup>
+                        <m:sSupPr>
+                          <m:ctrlPr>
+                            <a:rPr lang="en-US" i="1">
+                              <a:latin typeface="Cambria Math" panose="02040503050406030204" pitchFamily="18" charset="0"/>
+                            </a:rPr>
+                          </m:ctrlPr>
+                        </m:sSupPr>
+                        <m:e>
+                          <m:d>
+                            <m:dPr>
+                              <m:begChr m:val="|"/>
+                              <m:endChr m:val="|"/>
+                              <m:ctrlPr>
+                                <a:rPr lang="en-US" i="1">
+                                  <a:latin typeface="Cambria Math" panose="02040503050406030204" pitchFamily="18" charset="0"/>
+                                </a:rPr>
+                              </m:ctrlPr>
+                            </m:dPr>
+                            <m:e>
+                              <m:d>
+                                <m:dPr>
+                                  <m:begChr m:val="|"/>
+                                  <m:endChr m:val="|"/>
+                                  <m:ctrlPr>
+                                    <a:rPr lang="en-US" i="1">
+                                      <a:latin typeface="Cambria Math" panose="02040503050406030204" pitchFamily="18" charset="0"/>
+                                    </a:rPr>
+                                  </m:ctrlPr>
+                                </m:dPr>
+                                <m:e>
+                                  <m:r>
+                                    <a:rPr lang="en-US" i="1">
+                                      <a:latin typeface="Cambria Math" panose="02040503050406030204" pitchFamily="18" charset="0"/>
+                                    </a:rPr>
+                                    <m:t>𝑥</m:t>
+                                  </m:r>
+                                  <m:r>
+                                    <a:rPr lang="en-US" i="1">
+                                      <a:latin typeface="Cambria Math" panose="02040503050406030204" pitchFamily="18" charset="0"/>
+                                    </a:rPr>
+                                    <m:t>−</m:t>
+                                  </m:r>
+                                  <m:sSub>
+                                    <m:sSubPr>
+                                      <m:ctrlPr>
+                                        <a:rPr lang="en-US" i="1">
+                                          <a:latin typeface="Cambria Math" panose="02040503050406030204" pitchFamily="18" charset="0"/>
+                                        </a:rPr>
+                                      </m:ctrlPr>
+                                    </m:sSubPr>
+                                    <m:e>
+                                      <m:r>
+                                        <a:rPr lang="en-US" i="1">
+                                          <a:latin typeface="Cambria Math" panose="02040503050406030204" pitchFamily="18" charset="0"/>
+                                        </a:rPr>
+                                        <m:t>𝑐</m:t>
+                                      </m:r>
+                                    </m:e>
+                                    <m:sub>
+                                      <m:r>
+                                        <a:rPr lang="en-US" i="1">
+                                          <a:latin typeface="Cambria Math" panose="02040503050406030204" pitchFamily="18" charset="0"/>
+                                        </a:rPr>
+                                        <m:t>𝑖</m:t>
+                                      </m:r>
+                                    </m:sub>
+                                  </m:sSub>
+                                </m:e>
+                              </m:d>
+                            </m:e>
+                          </m:d>
+                        </m:e>
+                        <m:sup>
+                          <m:r>
+                            <a:rPr lang="en-US" i="1">
+                              <a:latin typeface="Cambria Math" panose="02040503050406030204" pitchFamily="18" charset="0"/>
+                            </a:rPr>
+                            <m:t>2</m:t>
+                          </m:r>
+                        </m:sup>
+                      </m:sSup>
+                    </m:oMath>
+                  </m:oMathPara>
+                </a14:m>
+                <a:endParaRPr lang="en-US"/>
+              </a:p>
+            </p:txBody>
+          </p:sp>
+        </mc:Choice>
+        <mc:Fallback>
+          <p:sp>
+            <p:nvSpPr>
+              <p:cNvPr id="5" name="TextBox 4">
+                <a:extLst>
+                  <a:ext uri="{FF2B5EF4-FFF2-40B4-BE49-F238E27FC236}">
+                    <a16:creationId xmlns:a16="http://schemas.microsoft.com/office/drawing/2014/main" id="{7047CFA3-EE6F-5366-D92B-92BCB07E1B47}"/>
+                  </a:ext>
+                </a:extLst>
+              </p:cNvPr>
+              <p:cNvSpPr txBox="1">
+                <a:spLocks noRot="1" noChangeAspect="1" noMove="1" noResize="1" noEditPoints="1" noAdjustHandles="1" noChangeArrowheads="1" noChangeShapeType="1" noTextEdit="1"/>
+              </p:cNvSpPr>
+              <p:nvPr/>
+            </p:nvSpPr>
+            <p:spPr>
+              <a:xfrm>
+                <a:off x="9332104" y="4380501"/>
+                <a:ext cx="2592313" cy="367345"/>
+              </a:xfrm>
+              <a:prstGeom prst="rect">
+                <a:avLst/>
+              </a:prstGeom>
+              <a:blipFill>
+                <a:blip r:embed="rId4"/>
+                <a:stretch>
+                  <a:fillRect l="-1882" r="-471" b="-23333"/>
+                </a:stretch>
+              </a:blipFill>
+            </p:spPr>
+            <p:txBody>
+              <a:bodyPr/>
+              <a:lstStyle/>
+              <a:p>
+                <a:r>
+                  <a:rPr lang="en-US">
+                    <a:noFill/>
+                  </a:rPr>
+                  <a:t> </a:t>
+                </a:r>
+              </a:p>
+            </p:txBody>
+          </p:sp>
+        </mc:Fallback>
+      </mc:AlternateContent>
+    </p:spTree>
+    <p:extLst>
+      <p:ext uri="{BB962C8B-B14F-4D97-AF65-F5344CB8AC3E}">
+        <p14:creationId xmlns:p14="http://schemas.microsoft.com/office/powerpoint/2010/main" val="2157018924"/>
+      </p:ext>
+    </p:extLst>
+  </p:cSld>
+  <p:clrMapOvr>
+    <a:masterClrMapping/>
+  </p:clrMapOvr>
+</p:sld>
+</file>
+
+<file path=ppt/slides/slide6.xml><?xml version="1.0" encoding="utf-8"?>
+<p:sld xmlns:a="http://schemas.openxmlformats.org/drawingml/2006/main" xmlns:r="http://schemas.openxmlformats.org/officeDocument/2006/relationships" xmlns:p="http://schemas.openxmlformats.org/presentationml/2006/main">
+  <p:cSld>
+    <p:spTree>
+      <p:nvGrpSpPr>
+        <p:cNvPr id="1" name=""/>
+        <p:cNvGrpSpPr/>
+        <p:nvPr/>
+      </p:nvGrpSpPr>
+      <p:grpSpPr>
+        <a:xfrm>
+          <a:off x="0" y="0"/>
+          <a:ext cx="0" cy="0"/>
+          <a:chOff x="0" y="0"/>
+          <a:chExt cx="0" cy="0"/>
+        </a:xfrm>
+      </p:grpSpPr>
+      <p:pic>
+        <p:nvPicPr>
+          <p:cNvPr id="3" name="Picture 2">
+            <a:extLst>
+              <a:ext uri="{FF2B5EF4-FFF2-40B4-BE49-F238E27FC236}">
+                <a16:creationId xmlns:a16="http://schemas.microsoft.com/office/drawing/2014/main" id="{3EA9C69C-C618-5E5C-A1A5-C00B0EA4B2E8}"/>
+              </a:ext>
+            </a:extLst>
+          </p:cNvPr>
+          <p:cNvPicPr>
+            <a:picLocks noChangeAspect="1"/>
+          </p:cNvPicPr>
+          <p:nvPr/>
+        </p:nvPicPr>
+        <p:blipFill>
+          <a:blip r:embed="rId2">
+            <a:extLst>
+              <a:ext uri="{28A0092B-C50C-407E-A947-70E740481C1C}">
+                <a14:useLocalDpi xmlns:a14="http://schemas.microsoft.com/office/drawing/2010/main" val="0"/>
+              </a:ext>
+            </a:extLst>
+          </a:blip>
+          <a:srcRect b="46751"/>
+          <a:stretch>
+            <a:fillRect/>
+          </a:stretch>
+        </p:blipFill>
+        <p:spPr>
+          <a:xfrm>
+            <a:off x="1623442" y="125412"/>
+            <a:ext cx="8945116" cy="3526402"/>
+          </a:xfrm>
+          <a:prstGeom prst="rect">
+            <a:avLst/>
+          </a:prstGeom>
+        </p:spPr>
+      </p:pic>
+      <p:sp>
+        <p:nvSpPr>
+          <p:cNvPr id="16" name="Rectangle 15">
+            <a:extLst>
+              <a:ext uri="{FF2B5EF4-FFF2-40B4-BE49-F238E27FC236}">
+                <a16:creationId xmlns:a16="http://schemas.microsoft.com/office/drawing/2014/main" id="{43DA85D0-0269-8E9A-DAA9-3E053B95CA91}"/>
+              </a:ext>
+            </a:extLst>
+          </p:cNvPr>
+          <p:cNvSpPr/>
+          <p:nvPr/>
+        </p:nvSpPr>
+        <p:spPr>
+          <a:xfrm>
+            <a:off x="9440208" y="1387994"/>
+            <a:ext cx="1127478" cy="264591"/>
+          </a:xfrm>
+          <a:prstGeom prst="rect">
+            <a:avLst/>
+          </a:prstGeom>
+          <a:solidFill>
+            <a:schemeClr val="bg1"/>
+          </a:solidFill>
+          <a:ln>
+            <a:noFill/>
+          </a:ln>
+        </p:spPr>
+        <p:style>
+          <a:lnRef idx="2">
+            <a:schemeClr val="accent1">
+              <a:shade val="15000"/>
+            </a:schemeClr>
+          </a:lnRef>
+          <a:fillRef idx="1">
+            <a:schemeClr val="accent1"/>
+          </a:fillRef>
+          <a:effectRef idx="0">
+            <a:schemeClr val="accent1"/>
+          </a:effectRef>
+          <a:fontRef idx="minor">
+            <a:schemeClr val="lt1"/>
+          </a:fontRef>
+        </p:style>
+        <p:txBody>
+          <a:bodyPr rtlCol="0" anchor="ctr"/>
+          <a:lstStyle/>
+          <a:p>
+            <a:pPr algn="ctr"/>
+            <a:endParaRPr lang="en-US"/>
+          </a:p>
+        </p:txBody>
+      </p:sp>
+      <p:sp>
+        <p:nvSpPr>
+          <p:cNvPr id="15" name="Rectangle 14">
+            <a:extLst>
+              <a:ext uri="{FF2B5EF4-FFF2-40B4-BE49-F238E27FC236}">
+                <a16:creationId xmlns:a16="http://schemas.microsoft.com/office/drawing/2014/main" id="{68F657CB-7E90-9DC3-A742-E0F57E338D52}"/>
+              </a:ext>
+            </a:extLst>
+          </p:cNvPr>
+          <p:cNvSpPr/>
+          <p:nvPr/>
+        </p:nvSpPr>
+        <p:spPr>
+          <a:xfrm>
+            <a:off x="9281149" y="292549"/>
+            <a:ext cx="1127478" cy="289310"/>
+          </a:xfrm>
+          <a:prstGeom prst="rect">
+            <a:avLst/>
+          </a:prstGeom>
+          <a:solidFill>
+            <a:schemeClr val="bg1"/>
+          </a:solidFill>
+          <a:ln>
+            <a:noFill/>
+          </a:ln>
+        </p:spPr>
+        <p:style>
+          <a:lnRef idx="2">
+            <a:schemeClr val="accent1">
+              <a:shade val="15000"/>
+            </a:schemeClr>
+          </a:lnRef>
+          <a:fillRef idx="1">
+            <a:schemeClr val="accent1"/>
+          </a:fillRef>
+          <a:effectRef idx="0">
+            <a:schemeClr val="accent1"/>
+          </a:effectRef>
+          <a:fontRef idx="minor">
+            <a:schemeClr val="lt1"/>
+          </a:fontRef>
+        </p:style>
+        <p:txBody>
+          <a:bodyPr rtlCol="0" anchor="ctr"/>
+          <a:lstStyle/>
+          <a:p>
+            <a:pPr algn="ctr"/>
+            <a:endParaRPr lang="en-US"/>
+          </a:p>
+        </p:txBody>
+      </p:sp>
+      <mc:AlternateContent xmlns:mc="http://schemas.openxmlformats.org/markup-compatibility/2006">
+        <mc:Choice xmlns:a14="http://schemas.microsoft.com/office/drawing/2010/main" Requires="a14">
+          <p:sp>
+            <p:nvSpPr>
+              <p:cNvPr id="4" name="TextBox 3">
+                <a:extLst>
+                  <a:ext uri="{FF2B5EF4-FFF2-40B4-BE49-F238E27FC236}">
+                    <a16:creationId xmlns:a16="http://schemas.microsoft.com/office/drawing/2014/main" id="{0D9BDEA9-FC50-DDF8-97A3-1090599B86D4}"/>
+                  </a:ext>
+                </a:extLst>
+              </p:cNvPr>
+              <p:cNvSpPr txBox="1"/>
+              <p:nvPr/>
+            </p:nvSpPr>
+            <p:spPr>
+              <a:xfrm>
+                <a:off x="9307211" y="253172"/>
+                <a:ext cx="787588" cy="289310"/>
+              </a:xfrm>
+              <a:prstGeom prst="rect">
+                <a:avLst/>
+              </a:prstGeom>
+              <a:noFill/>
+            </p:spPr>
+            <p:txBody>
+              <a:bodyPr wrap="none" lIns="0" tIns="0" rIns="0" bIns="0" rtlCol="0">
+                <a:spAutoFit/>
+              </a:bodyPr>
+              <a:lstStyle/>
+              <a:p>
+                <a14:m>
+                  <m:oMathPara xmlns:m="http://schemas.openxmlformats.org/officeDocument/2006/math">
+                    <m:oMathParaPr>
+                      <m:jc m:val="centerGroup"/>
+                    </m:oMathParaPr>
+                    <m:oMath xmlns:m="http://schemas.openxmlformats.org/officeDocument/2006/math">
+                      <m:r>
+                        <a:rPr lang="en-US" b="0" i="1" smtClean="0">
+                          <a:latin typeface="Cambria Math" panose="02040503050406030204" pitchFamily="18" charset="0"/>
+                        </a:rPr>
+                        <m:t>𝑥</m:t>
+                      </m:r>
+                      <m:r>
+                        <a:rPr lang="en-US" b="0" i="1" smtClean="0">
+                          <a:latin typeface="Cambria Math" panose="02040503050406030204" pitchFamily="18" charset="0"/>
+                        </a:rPr>
+                        <m:t> ∈</m:t>
+                      </m:r>
+                      <m:sSup>
+                        <m:sSupPr>
+                          <m:ctrlPr>
+                            <a:rPr lang="en-US" b="0" i="1" smtClean="0">
+                              <a:latin typeface="Cambria Math" panose="02040503050406030204" pitchFamily="18" charset="0"/>
+                            </a:rPr>
+                          </m:ctrlPr>
+                        </m:sSupPr>
+                        <m:e>
+                          <m:r>
+                            <a:rPr lang="en-US" b="0" i="1" smtClean="0">
+                              <a:latin typeface="Cambria Math" panose="02040503050406030204" pitchFamily="18" charset="0"/>
+                            </a:rPr>
+                            <m:t>ℝ</m:t>
+                          </m:r>
+                        </m:e>
+                        <m:sup>
+                          <m:r>
+                            <m:rPr>
+                              <m:sty m:val="p"/>
+                            </m:rPr>
+                            <a:rPr lang="en-US" b="0" i="1" smtClean="0">
+                              <a:latin typeface="Cambria Math" panose="02040503050406030204" pitchFamily="18" charset="0"/>
+                            </a:rPr>
+                            <m:t>d</m:t>
+                          </m:r>
+                        </m:sup>
+                      </m:sSup>
+                    </m:oMath>
+                  </m:oMathPara>
+                </a14:m>
+                <a:endParaRPr lang="en-US"/>
+              </a:p>
+            </p:txBody>
+          </p:sp>
+        </mc:Choice>
+        <mc:Fallback>
+          <p:sp>
+            <p:nvSpPr>
+              <p:cNvPr id="4" name="TextBox 3">
+                <a:extLst>
+                  <a:ext uri="{FF2B5EF4-FFF2-40B4-BE49-F238E27FC236}">
+                    <a16:creationId xmlns:a16="http://schemas.microsoft.com/office/drawing/2014/main" id="{0D9BDEA9-FC50-DDF8-97A3-1090599B86D4}"/>
+                  </a:ext>
+                </a:extLst>
+              </p:cNvPr>
+              <p:cNvSpPr txBox="1">
+                <a:spLocks noRot="1" noChangeAspect="1" noMove="1" noResize="1" noEditPoints="1" noAdjustHandles="1" noChangeArrowheads="1" noChangeShapeType="1" noTextEdit="1"/>
+              </p:cNvSpPr>
+              <p:nvPr/>
+            </p:nvSpPr>
+            <p:spPr>
+              <a:xfrm>
+                <a:off x="9307211" y="253172"/>
+                <a:ext cx="787588" cy="289310"/>
+              </a:xfrm>
+              <a:prstGeom prst="rect">
+                <a:avLst/>
+              </a:prstGeom>
+              <a:blipFill>
+                <a:blip r:embed="rId3"/>
+                <a:stretch>
+                  <a:fillRect l="-4651" t="-4255" r="-3101" b="-6383"/>
+                </a:stretch>
+              </a:blipFill>
+            </p:spPr>
+            <p:txBody>
+              <a:bodyPr/>
+              <a:lstStyle/>
+              <a:p>
+                <a:r>
+                  <a:rPr lang="en-US">
+                    <a:noFill/>
+                  </a:rPr>
+                  <a:t> </a:t>
+                </a:r>
+              </a:p>
+            </p:txBody>
+          </p:sp>
+        </mc:Fallback>
+      </mc:AlternateContent>
+      <mc:AlternateContent xmlns:mc="http://schemas.openxmlformats.org/markup-compatibility/2006">
+        <mc:Choice xmlns:a14="http://schemas.microsoft.com/office/drawing/2010/main" Requires="a14">
+          <p:sp>
+            <p:nvSpPr>
+              <p:cNvPr id="5" name="TextBox 4">
+                <a:extLst>
+                  <a:ext uri="{FF2B5EF4-FFF2-40B4-BE49-F238E27FC236}">
+                    <a16:creationId xmlns:a16="http://schemas.microsoft.com/office/drawing/2014/main" id="{0584EADF-9E7B-F41E-29AA-9043BD324EE5}"/>
+                  </a:ext>
+                </a:extLst>
+              </p:cNvPr>
+              <p:cNvSpPr txBox="1"/>
+              <p:nvPr/>
+            </p:nvSpPr>
+            <p:spPr>
+              <a:xfrm>
+                <a:off x="3057697" y="1459946"/>
+                <a:ext cx="241028" cy="299313"/>
+              </a:xfrm>
+              <a:prstGeom prst="rect">
+                <a:avLst/>
+              </a:prstGeom>
+              <a:noFill/>
+            </p:spPr>
+            <p:txBody>
+              <a:bodyPr wrap="none" lIns="0" tIns="0" rIns="0" bIns="0" rtlCol="0">
+                <a:spAutoFit/>
+              </a:bodyPr>
+              <a:lstStyle/>
+              <a:p>
+                <a14:m>
+                  <m:oMathPara xmlns:m="http://schemas.openxmlformats.org/officeDocument/2006/math">
+                    <m:oMathParaPr>
+                      <m:jc m:val="centerGroup"/>
+                    </m:oMathParaPr>
+                    <m:oMath xmlns:m="http://schemas.openxmlformats.org/officeDocument/2006/math">
+                      <m:sSub>
+                        <m:sSubPr>
+                          <m:ctrlPr>
+                            <a:rPr lang="en-US" b="0" i="1" smtClean="0">
+                              <a:latin typeface="Cambria Math" panose="02040503050406030204" pitchFamily="18" charset="0"/>
+                            </a:rPr>
+                          </m:ctrlPr>
+                        </m:sSubPr>
+                        <m:e>
+                          <m:r>
+                            <a:rPr lang="en-US" b="0" i="1" smtClean="0">
+                              <a:latin typeface="Cambria Math" panose="02040503050406030204" pitchFamily="18" charset="0"/>
+                            </a:rPr>
+                            <m:t>𝑥</m:t>
+                          </m:r>
+                        </m:e>
+                        <m:sub>
+                          <m:r>
+                            <a:rPr lang="en-US" b="0" i="1" smtClean="0">
+                              <a:latin typeface="Cambria Math" panose="02040503050406030204" pitchFamily="18" charset="0"/>
+                            </a:rPr>
+                            <m:t>𝑗</m:t>
+                          </m:r>
+                        </m:sub>
+                      </m:sSub>
+                    </m:oMath>
+                  </m:oMathPara>
+                </a14:m>
+                <a:endParaRPr lang="en-US"/>
+              </a:p>
+            </p:txBody>
+          </p:sp>
+        </mc:Choice>
+        <mc:Fallback>
+          <p:sp>
+            <p:nvSpPr>
+              <p:cNvPr id="5" name="TextBox 4">
+                <a:extLst>
+                  <a:ext uri="{FF2B5EF4-FFF2-40B4-BE49-F238E27FC236}">
+                    <a16:creationId xmlns:a16="http://schemas.microsoft.com/office/drawing/2014/main" id="{0584EADF-9E7B-F41E-29AA-9043BD324EE5}"/>
+                  </a:ext>
+                </a:extLst>
+              </p:cNvPr>
+              <p:cNvSpPr txBox="1">
+                <a:spLocks noRot="1" noChangeAspect="1" noMove="1" noResize="1" noEditPoints="1" noAdjustHandles="1" noChangeArrowheads="1" noChangeShapeType="1" noTextEdit="1"/>
+              </p:cNvSpPr>
+              <p:nvPr/>
+            </p:nvSpPr>
+            <p:spPr>
+              <a:xfrm>
+                <a:off x="3057697" y="1459946"/>
+                <a:ext cx="241028" cy="299313"/>
+              </a:xfrm>
+              <a:prstGeom prst="rect">
+                <a:avLst/>
+              </a:prstGeom>
+              <a:blipFill>
+                <a:blip r:embed="rId4"/>
+                <a:stretch>
+                  <a:fillRect l="-15385" r="-17949" b="-22000"/>
+                </a:stretch>
+              </a:blipFill>
+            </p:spPr>
+            <p:txBody>
+              <a:bodyPr/>
+              <a:lstStyle/>
+              <a:p>
+                <a:r>
+                  <a:rPr lang="en-US">
+                    <a:noFill/>
+                  </a:rPr>
+                  <a:t> </a:t>
+                </a:r>
+              </a:p>
+            </p:txBody>
+          </p:sp>
+        </mc:Fallback>
+      </mc:AlternateContent>
+      <mc:AlternateContent xmlns:mc="http://schemas.openxmlformats.org/markup-compatibility/2006">
+        <mc:Choice xmlns:a14="http://schemas.microsoft.com/office/drawing/2010/main" Requires="a14">
+          <p:sp>
+            <p:nvSpPr>
+              <p:cNvPr id="6" name="TextBox 5">
+                <a:extLst>
+                  <a:ext uri="{FF2B5EF4-FFF2-40B4-BE49-F238E27FC236}">
+                    <a16:creationId xmlns:a16="http://schemas.microsoft.com/office/drawing/2014/main" id="{8E971AE7-6F5D-9507-1F2B-1A927D5E88D0}"/>
+                  </a:ext>
+                </a:extLst>
+              </p:cNvPr>
+              <p:cNvSpPr txBox="1"/>
+              <p:nvPr/>
+            </p:nvSpPr>
+            <p:spPr>
+              <a:xfrm>
+                <a:off x="4779276" y="1459946"/>
+                <a:ext cx="241028" cy="299313"/>
+              </a:xfrm>
+              <a:prstGeom prst="rect">
+                <a:avLst/>
+              </a:prstGeom>
+              <a:noFill/>
+            </p:spPr>
+            <p:txBody>
+              <a:bodyPr wrap="none" lIns="0" tIns="0" rIns="0" bIns="0" rtlCol="0">
+                <a:spAutoFit/>
+              </a:bodyPr>
+              <a:lstStyle/>
+              <a:p>
+                <a14:m>
+                  <m:oMathPara xmlns:m="http://schemas.openxmlformats.org/officeDocument/2006/math">
+                    <m:oMathParaPr>
+                      <m:jc m:val="centerGroup"/>
+                    </m:oMathParaPr>
+                    <m:oMath xmlns:m="http://schemas.openxmlformats.org/officeDocument/2006/math">
+                      <m:sSub>
+                        <m:sSubPr>
+                          <m:ctrlPr>
+                            <a:rPr lang="en-US" b="0" i="1" smtClean="0">
+                              <a:latin typeface="Cambria Math" panose="02040503050406030204" pitchFamily="18" charset="0"/>
+                            </a:rPr>
+                          </m:ctrlPr>
+                        </m:sSubPr>
+                        <m:e>
+                          <m:r>
+                            <a:rPr lang="en-US" b="0" i="1" smtClean="0">
+                              <a:latin typeface="Cambria Math" panose="02040503050406030204" pitchFamily="18" charset="0"/>
+                            </a:rPr>
+                            <m:t>𝑥</m:t>
+                          </m:r>
+                        </m:e>
+                        <m:sub>
+                          <m:r>
+                            <a:rPr lang="en-US" b="0" i="1" smtClean="0">
+                              <a:latin typeface="Cambria Math" panose="02040503050406030204" pitchFamily="18" charset="0"/>
+                            </a:rPr>
+                            <m:t>𝑗</m:t>
+                          </m:r>
+                        </m:sub>
+                      </m:sSub>
+                    </m:oMath>
+                  </m:oMathPara>
+                </a14:m>
+                <a:endParaRPr lang="en-US"/>
+              </a:p>
+            </p:txBody>
+          </p:sp>
+        </mc:Choice>
+        <mc:Fallback>
+          <p:sp>
+            <p:nvSpPr>
+              <p:cNvPr id="6" name="TextBox 5">
+                <a:extLst>
+                  <a:ext uri="{FF2B5EF4-FFF2-40B4-BE49-F238E27FC236}">
+                    <a16:creationId xmlns:a16="http://schemas.microsoft.com/office/drawing/2014/main" id="{8E971AE7-6F5D-9507-1F2B-1A927D5E88D0}"/>
+                  </a:ext>
+                </a:extLst>
+              </p:cNvPr>
+              <p:cNvSpPr txBox="1">
+                <a:spLocks noRot="1" noChangeAspect="1" noMove="1" noResize="1" noEditPoints="1" noAdjustHandles="1" noChangeArrowheads="1" noChangeShapeType="1" noTextEdit="1"/>
+              </p:cNvSpPr>
+              <p:nvPr/>
+            </p:nvSpPr>
+            <p:spPr>
+              <a:xfrm>
+                <a:off x="4779276" y="1459946"/>
+                <a:ext cx="241028" cy="299313"/>
+              </a:xfrm>
+              <a:prstGeom prst="rect">
+                <a:avLst/>
+              </a:prstGeom>
+              <a:blipFill>
+                <a:blip r:embed="rId5"/>
+                <a:stretch>
+                  <a:fillRect l="-15000" r="-15000" b="-22000"/>
+                </a:stretch>
+              </a:blipFill>
+            </p:spPr>
+            <p:txBody>
+              <a:bodyPr/>
+              <a:lstStyle/>
+              <a:p>
+                <a:r>
+                  <a:rPr lang="en-US">
+                    <a:noFill/>
+                  </a:rPr>
+                  <a:t> </a:t>
+                </a:r>
+              </a:p>
+            </p:txBody>
+          </p:sp>
+        </mc:Fallback>
+      </mc:AlternateContent>
+      <mc:AlternateContent xmlns:mc="http://schemas.openxmlformats.org/markup-compatibility/2006">
+        <mc:Choice xmlns:a14="http://schemas.microsoft.com/office/drawing/2010/main" Requires="a14">
+          <p:sp>
+            <p:nvSpPr>
+              <p:cNvPr id="7" name="TextBox 6">
+                <a:extLst>
+                  <a:ext uri="{FF2B5EF4-FFF2-40B4-BE49-F238E27FC236}">
+                    <a16:creationId xmlns:a16="http://schemas.microsoft.com/office/drawing/2014/main" id="{047FA349-78C2-4032-4412-2C68CFD92713}"/>
+                  </a:ext>
+                </a:extLst>
+              </p:cNvPr>
+              <p:cNvSpPr txBox="1"/>
+              <p:nvPr/>
+            </p:nvSpPr>
+            <p:spPr>
+              <a:xfrm>
+                <a:off x="6421039" y="1465588"/>
+                <a:ext cx="241028" cy="299313"/>
+              </a:xfrm>
+              <a:prstGeom prst="rect">
+                <a:avLst/>
+              </a:prstGeom>
+              <a:noFill/>
+            </p:spPr>
+            <p:txBody>
+              <a:bodyPr wrap="none" lIns="0" tIns="0" rIns="0" bIns="0" rtlCol="0">
+                <a:spAutoFit/>
+              </a:bodyPr>
+              <a:lstStyle/>
+              <a:p>
+                <a14:m>
+                  <m:oMathPara xmlns:m="http://schemas.openxmlformats.org/officeDocument/2006/math">
+                    <m:oMathParaPr>
+                      <m:jc m:val="centerGroup"/>
+                    </m:oMathParaPr>
+                    <m:oMath xmlns:m="http://schemas.openxmlformats.org/officeDocument/2006/math">
+                      <m:sSub>
+                        <m:sSubPr>
+                          <m:ctrlPr>
+                            <a:rPr lang="en-US" b="0" i="1" smtClean="0">
+                              <a:latin typeface="Cambria Math" panose="02040503050406030204" pitchFamily="18" charset="0"/>
+                            </a:rPr>
+                          </m:ctrlPr>
+                        </m:sSubPr>
+                        <m:e>
+                          <m:r>
+                            <a:rPr lang="en-US" b="0" i="1" smtClean="0">
+                              <a:latin typeface="Cambria Math" panose="02040503050406030204" pitchFamily="18" charset="0"/>
+                            </a:rPr>
+                            <m:t>𝑥</m:t>
+                          </m:r>
+                        </m:e>
+                        <m:sub>
+                          <m:r>
+                            <a:rPr lang="en-US" b="0" i="1" smtClean="0">
+                              <a:latin typeface="Cambria Math" panose="02040503050406030204" pitchFamily="18" charset="0"/>
+                            </a:rPr>
+                            <m:t>𝑗</m:t>
+                          </m:r>
+                        </m:sub>
+                      </m:sSub>
+                    </m:oMath>
+                  </m:oMathPara>
+                </a14:m>
+                <a:endParaRPr lang="en-US"/>
+              </a:p>
+            </p:txBody>
+          </p:sp>
+        </mc:Choice>
+        <mc:Fallback>
+          <p:sp>
+            <p:nvSpPr>
+              <p:cNvPr id="7" name="TextBox 6">
+                <a:extLst>
+                  <a:ext uri="{FF2B5EF4-FFF2-40B4-BE49-F238E27FC236}">
+                    <a16:creationId xmlns:a16="http://schemas.microsoft.com/office/drawing/2014/main" id="{047FA349-78C2-4032-4412-2C68CFD92713}"/>
+                  </a:ext>
+                </a:extLst>
+              </p:cNvPr>
+              <p:cNvSpPr txBox="1">
+                <a:spLocks noRot="1" noChangeAspect="1" noMove="1" noResize="1" noEditPoints="1" noAdjustHandles="1" noChangeArrowheads="1" noChangeShapeType="1" noTextEdit="1"/>
+              </p:cNvSpPr>
+              <p:nvPr/>
+            </p:nvSpPr>
+            <p:spPr>
+              <a:xfrm>
+                <a:off x="6421039" y="1465588"/>
+                <a:ext cx="241028" cy="299313"/>
+              </a:xfrm>
+              <a:prstGeom prst="rect">
+                <a:avLst/>
+              </a:prstGeom>
+              <a:blipFill>
+                <a:blip r:embed="rId6"/>
+                <a:stretch>
+                  <a:fillRect l="-15000" r="-15000" b="-22000"/>
+                </a:stretch>
+              </a:blipFill>
+            </p:spPr>
+            <p:txBody>
+              <a:bodyPr/>
+              <a:lstStyle/>
+              <a:p>
+                <a:r>
+                  <a:rPr lang="en-US">
+                    <a:noFill/>
+                  </a:rPr>
+                  <a:t> </a:t>
+                </a:r>
+              </a:p>
+            </p:txBody>
+          </p:sp>
+        </mc:Fallback>
+      </mc:AlternateContent>
+      <mc:AlternateContent xmlns:mc="http://schemas.openxmlformats.org/markup-compatibility/2006">
+        <mc:Choice xmlns:a14="http://schemas.microsoft.com/office/drawing/2010/main" Requires="a14">
+          <p:sp>
+            <p:nvSpPr>
+              <p:cNvPr id="8" name="TextBox 7">
+                <a:extLst>
+                  <a:ext uri="{FF2B5EF4-FFF2-40B4-BE49-F238E27FC236}">
+                    <a16:creationId xmlns:a16="http://schemas.microsoft.com/office/drawing/2014/main" id="{3E59DC15-6224-7DF5-6157-150831AAFABE}"/>
+                  </a:ext>
+                </a:extLst>
+              </p:cNvPr>
+              <p:cNvSpPr txBox="1"/>
+              <p:nvPr/>
+            </p:nvSpPr>
+            <p:spPr>
+              <a:xfrm>
+                <a:off x="8074376" y="1469014"/>
+                <a:ext cx="241028" cy="299313"/>
+              </a:xfrm>
+              <a:prstGeom prst="rect">
+                <a:avLst/>
+              </a:prstGeom>
+              <a:noFill/>
+            </p:spPr>
+            <p:txBody>
+              <a:bodyPr wrap="none" lIns="0" tIns="0" rIns="0" bIns="0" rtlCol="0">
+                <a:spAutoFit/>
+              </a:bodyPr>
+              <a:lstStyle/>
+              <a:p>
+                <a14:m>
+                  <m:oMathPara xmlns:m="http://schemas.openxmlformats.org/officeDocument/2006/math">
+                    <m:oMathParaPr>
+                      <m:jc m:val="centerGroup"/>
+                    </m:oMathParaPr>
+                    <m:oMath xmlns:m="http://schemas.openxmlformats.org/officeDocument/2006/math">
+                      <m:sSub>
+                        <m:sSubPr>
+                          <m:ctrlPr>
+                            <a:rPr lang="en-US" b="0" i="1" smtClean="0">
+                              <a:latin typeface="Cambria Math" panose="02040503050406030204" pitchFamily="18" charset="0"/>
+                            </a:rPr>
+                          </m:ctrlPr>
+                        </m:sSubPr>
+                        <m:e>
+                          <m:r>
+                            <a:rPr lang="en-US" b="0" i="1" smtClean="0">
+                              <a:latin typeface="Cambria Math" panose="02040503050406030204" pitchFamily="18" charset="0"/>
+                            </a:rPr>
+                            <m:t>𝑥</m:t>
+                          </m:r>
+                        </m:e>
+                        <m:sub>
+                          <m:r>
+                            <a:rPr lang="en-US" b="0" i="1" smtClean="0">
+                              <a:latin typeface="Cambria Math" panose="02040503050406030204" pitchFamily="18" charset="0"/>
+                            </a:rPr>
+                            <m:t>𝑗</m:t>
+                          </m:r>
+                        </m:sub>
+                      </m:sSub>
+                    </m:oMath>
+                  </m:oMathPara>
+                </a14:m>
+                <a:endParaRPr lang="en-US"/>
+              </a:p>
+            </p:txBody>
+          </p:sp>
+        </mc:Choice>
+        <mc:Fallback>
+          <p:sp>
+            <p:nvSpPr>
+              <p:cNvPr id="8" name="TextBox 7">
+                <a:extLst>
+                  <a:ext uri="{FF2B5EF4-FFF2-40B4-BE49-F238E27FC236}">
+                    <a16:creationId xmlns:a16="http://schemas.microsoft.com/office/drawing/2014/main" id="{3E59DC15-6224-7DF5-6157-150831AAFABE}"/>
+                  </a:ext>
+                </a:extLst>
+              </p:cNvPr>
+              <p:cNvSpPr txBox="1">
+                <a:spLocks noRot="1" noChangeAspect="1" noMove="1" noResize="1" noEditPoints="1" noAdjustHandles="1" noChangeArrowheads="1" noChangeShapeType="1" noTextEdit="1"/>
+              </p:cNvSpPr>
+              <p:nvPr/>
+            </p:nvSpPr>
+            <p:spPr>
+              <a:xfrm>
+                <a:off x="8074376" y="1469014"/>
+                <a:ext cx="241028" cy="299313"/>
+              </a:xfrm>
+              <a:prstGeom prst="rect">
+                <a:avLst/>
+              </a:prstGeom>
+              <a:blipFill>
+                <a:blip r:embed="rId7"/>
+                <a:stretch>
+                  <a:fillRect l="-15385" r="-17949" b="-24490"/>
+                </a:stretch>
+              </a:blipFill>
+            </p:spPr>
+            <p:txBody>
+              <a:bodyPr/>
+              <a:lstStyle/>
+              <a:p>
+                <a:r>
+                  <a:rPr lang="en-US">
+                    <a:noFill/>
+                  </a:rPr>
+                  <a:t> </a:t>
+                </a:r>
+              </a:p>
+            </p:txBody>
+          </p:sp>
+        </mc:Fallback>
+      </mc:AlternateContent>
+      <mc:AlternateContent xmlns:mc="http://schemas.openxmlformats.org/markup-compatibility/2006">
+        <mc:Choice xmlns:a14="http://schemas.microsoft.com/office/drawing/2010/main" Requires="a14">
+          <p:sp>
+            <p:nvSpPr>
+              <p:cNvPr id="9" name="TextBox 8">
+                <a:extLst>
+                  <a:ext uri="{FF2B5EF4-FFF2-40B4-BE49-F238E27FC236}">
+                    <a16:creationId xmlns:a16="http://schemas.microsoft.com/office/drawing/2014/main" id="{31459236-C13C-F462-7E8C-1EC248865111}"/>
+                  </a:ext>
+                </a:extLst>
+              </p:cNvPr>
+              <p:cNvSpPr txBox="1"/>
+              <p:nvPr/>
+            </p:nvSpPr>
+            <p:spPr>
+              <a:xfrm>
+                <a:off x="9281149" y="1448372"/>
+                <a:ext cx="1939057" cy="310598"/>
+              </a:xfrm>
+              <a:prstGeom prst="rect">
+                <a:avLst/>
+              </a:prstGeom>
+              <a:noFill/>
+            </p:spPr>
+            <p:txBody>
+              <a:bodyPr wrap="none" lIns="0" tIns="0" rIns="0" bIns="0" rtlCol="0">
+                <a:spAutoFit/>
+              </a:bodyPr>
+              <a:lstStyle/>
+              <a:p>
+                <a14:m>
+                  <m:oMathPara xmlns:m="http://schemas.openxmlformats.org/officeDocument/2006/math">
+                    <m:oMathParaPr>
+                      <m:jc m:val="centerGroup"/>
+                    </m:oMathParaPr>
+                    <m:oMath xmlns:m="http://schemas.openxmlformats.org/officeDocument/2006/math">
+                      <m:r>
+                        <m:rPr>
+                          <m:nor/>
+                        </m:rPr>
+                        <a:rPr lang="en-US" i="0" smtClean="0">
+                          <a:latin typeface="Cambria Math" panose="02040503050406030204" pitchFamily="18" charset="0"/>
+                        </a:rPr>
+                        <m:t>subvectors</m:t>
+                      </m:r>
+                      <m:sSub>
+                        <m:sSubPr>
+                          <m:ctrlPr>
+                            <a:rPr lang="en-US" i="1" smtClean="0">
+                              <a:latin typeface="Cambria Math" panose="02040503050406030204" pitchFamily="18" charset="0"/>
+                            </a:rPr>
+                          </m:ctrlPr>
+                        </m:sSubPr>
+                        <m:e>
+                          <m:r>
+                            <a:rPr lang="en-US" b="0" i="1" smtClean="0">
+                              <a:latin typeface="Cambria Math" panose="02040503050406030204" pitchFamily="18" charset="0"/>
+                            </a:rPr>
+                            <m:t> </m:t>
+                          </m:r>
+                          <m:r>
+                            <a:rPr lang="en-US" i="1" smtClean="0">
+                              <a:latin typeface="Cambria Math" panose="02040503050406030204" pitchFamily="18" charset="0"/>
+                            </a:rPr>
+                            <m:t>𝑥</m:t>
+                          </m:r>
+                        </m:e>
+                        <m:sub>
+                          <m:r>
+                            <a:rPr lang="en-US" i="1" smtClean="0">
+                              <a:latin typeface="Cambria Math" panose="02040503050406030204" pitchFamily="18" charset="0"/>
+                            </a:rPr>
+                            <m:t>𝑗</m:t>
+                          </m:r>
+                        </m:sub>
+                      </m:sSub>
+                      <m:r>
+                        <a:rPr lang="en-US" b="0" i="1" smtClean="0">
+                          <a:latin typeface="Cambria Math" panose="02040503050406030204" pitchFamily="18" charset="0"/>
+                        </a:rPr>
+                        <m:t>∈</m:t>
+                      </m:r>
+                      <m:sSup>
+                        <m:sSupPr>
+                          <m:ctrlPr>
+                            <a:rPr lang="en-US" i="1" smtClean="0">
+                              <a:latin typeface="Cambria Math" panose="02040503050406030204" pitchFamily="18" charset="0"/>
+                            </a:rPr>
+                          </m:ctrlPr>
+                        </m:sSupPr>
+                        <m:e>
+                          <m:r>
+                            <a:rPr lang="en-US" b="0" i="1" smtClean="0">
+                              <a:latin typeface="Cambria Math" panose="02040503050406030204" pitchFamily="18" charset="0"/>
+                            </a:rPr>
+                            <m:t>ℝ</m:t>
+                          </m:r>
+                        </m:e>
+                        <m:sup>
+                          <m:r>
+                            <a:rPr lang="en-US" i="1">
+                              <a:latin typeface="Cambria Math" panose="02040503050406030204" pitchFamily="18" charset="0"/>
+                            </a:rPr>
+                            <m:t>𝑑</m:t>
+                          </m:r>
+                        </m:sup>
+                      </m:sSup>
+                    </m:oMath>
+                  </m:oMathPara>
+                </a14:m>
+                <a:endParaRPr lang="en-US"/>
+              </a:p>
+            </p:txBody>
+          </p:sp>
+        </mc:Choice>
+        <mc:Fallback>
+          <p:sp>
+            <p:nvSpPr>
+              <p:cNvPr id="9" name="TextBox 8">
+                <a:extLst>
+                  <a:ext uri="{FF2B5EF4-FFF2-40B4-BE49-F238E27FC236}">
+                    <a16:creationId xmlns:a16="http://schemas.microsoft.com/office/drawing/2014/main" id="{31459236-C13C-F462-7E8C-1EC248865111}"/>
+                  </a:ext>
+                </a:extLst>
+              </p:cNvPr>
+              <p:cNvSpPr txBox="1">
+                <a:spLocks noRot="1" noChangeAspect="1" noMove="1" noResize="1" noEditPoints="1" noAdjustHandles="1" noChangeArrowheads="1" noChangeShapeType="1" noTextEdit="1"/>
+              </p:cNvSpPr>
+              <p:nvPr/>
+            </p:nvSpPr>
+            <p:spPr>
+              <a:xfrm>
+                <a:off x="9281149" y="1448372"/>
+                <a:ext cx="1939057" cy="310598"/>
+              </a:xfrm>
+              <a:prstGeom prst="rect">
+                <a:avLst/>
+              </a:prstGeom>
+              <a:blipFill>
+                <a:blip r:embed="rId8"/>
+                <a:stretch>
+                  <a:fillRect l="-2821" r="-313" b="-21569"/>
+                </a:stretch>
+              </a:blipFill>
+            </p:spPr>
+            <p:txBody>
+              <a:bodyPr/>
+              <a:lstStyle/>
+              <a:p>
+                <a:r>
+                  <a:rPr lang="en-US">
+                    <a:noFill/>
+                  </a:rPr>
+                  <a:t> </a:t>
+                </a:r>
+              </a:p>
+            </p:txBody>
+          </p:sp>
+        </mc:Fallback>
+      </mc:AlternateContent>
+      <mc:AlternateContent xmlns:mc="http://schemas.openxmlformats.org/markup-compatibility/2006">
+        <mc:Choice xmlns:a14="http://schemas.microsoft.com/office/drawing/2010/main" Requires="a14">
+          <p:sp>
+            <p:nvSpPr>
+              <p:cNvPr id="10" name="TextBox 9">
+                <a:extLst>
+                  <a:ext uri="{FF2B5EF4-FFF2-40B4-BE49-F238E27FC236}">
+                    <a16:creationId xmlns:a16="http://schemas.microsoft.com/office/drawing/2014/main" id="{DDB9E504-415D-F6CF-3EEC-C1881488066A}"/>
+                  </a:ext>
+                </a:extLst>
+              </p:cNvPr>
+              <p:cNvSpPr txBox="1"/>
+              <p:nvPr/>
+            </p:nvSpPr>
+            <p:spPr>
+              <a:xfrm>
+                <a:off x="2261066" y="3567954"/>
+                <a:ext cx="1666354" cy="232756"/>
+              </a:xfrm>
+              <a:prstGeom prst="rect">
+                <a:avLst/>
+              </a:prstGeom>
+              <a:noFill/>
+            </p:spPr>
+            <p:txBody>
+              <a:bodyPr wrap="none" lIns="0" tIns="0" rIns="0" bIns="0" rtlCol="0">
+                <a:spAutoFit/>
+              </a:bodyPr>
+              <a:lstStyle/>
+              <a:p>
+                <a14:m>
+                  <m:oMathPara xmlns:m="http://schemas.openxmlformats.org/officeDocument/2006/math">
+                    <m:oMathParaPr>
+                      <m:jc m:val="centerGroup"/>
+                    </m:oMathParaPr>
+                    <m:oMath xmlns:m="http://schemas.openxmlformats.org/officeDocument/2006/math">
+                      <m:sSub>
+                        <m:sSubPr>
+                          <m:ctrlPr>
+                            <a:rPr lang="en-US" sz="1400" i="1" smtClean="0">
+                              <a:latin typeface="Cambria Math" panose="02040503050406030204" pitchFamily="18" charset="0"/>
+                            </a:rPr>
+                          </m:ctrlPr>
+                        </m:sSubPr>
+                        <m:e>
+                          <m:r>
+                            <a:rPr lang="en-US" sz="1400" i="1" smtClean="0">
+                              <a:latin typeface="Cambria Math" panose="02040503050406030204" pitchFamily="18" charset="0"/>
+                            </a:rPr>
+                            <m:t>𝐶</m:t>
+                          </m:r>
+                        </m:e>
+                        <m:sub>
+                          <m:r>
+                            <a:rPr lang="en-US" sz="1400" i="1" smtClean="0">
+                              <a:latin typeface="Cambria Math" panose="02040503050406030204" pitchFamily="18" charset="0"/>
+                            </a:rPr>
+                            <m:t>𝑗</m:t>
+                          </m:r>
+                        </m:sub>
+                      </m:sSub>
+                      <m:r>
+                        <a:rPr lang="en-US" sz="1400" i="1" smtClean="0">
+                          <a:latin typeface="Cambria Math" panose="02040503050406030204" pitchFamily="18" charset="0"/>
+                        </a:rPr>
+                        <m:t>=</m:t>
+                      </m:r>
+                      <m:sSub>
+                        <m:sSubPr>
+                          <m:ctrlPr>
+                            <a:rPr lang="en-US" sz="1400" i="1" smtClean="0">
+                              <a:latin typeface="Cambria Math" panose="02040503050406030204" pitchFamily="18" charset="0"/>
+                            </a:rPr>
+                          </m:ctrlPr>
+                        </m:sSubPr>
+                        <m:e>
+                          <m:r>
+                            <a:rPr lang="en-US" sz="1400" b="0" i="1" smtClean="0">
+                              <a:latin typeface="Cambria Math" panose="02040503050406030204" pitchFamily="18" charset="0"/>
+                            </a:rPr>
+                            <m:t>{</m:t>
+                          </m:r>
+                          <m:r>
+                            <a:rPr lang="en-US" sz="1400" i="1" smtClean="0">
+                              <a:latin typeface="Cambria Math" panose="02040503050406030204" pitchFamily="18" charset="0"/>
+                            </a:rPr>
+                            <m:t>𝑐</m:t>
+                          </m:r>
+                        </m:e>
+                        <m:sub>
+                          <m:r>
+                            <a:rPr lang="en-US" sz="1400" i="1" smtClean="0">
+                              <a:latin typeface="Cambria Math" panose="02040503050406030204" pitchFamily="18" charset="0"/>
+                            </a:rPr>
+                            <m:t>𝑗</m:t>
+                          </m:r>
+                          <m:r>
+                            <a:rPr lang="en-US" sz="1400" i="1" smtClean="0">
+                              <a:latin typeface="Cambria Math" panose="02040503050406030204" pitchFamily="18" charset="0"/>
+                            </a:rPr>
+                            <m:t>,1</m:t>
+                          </m:r>
+                        </m:sub>
+                      </m:sSub>
+                      <m:r>
+                        <a:rPr lang="en-US" sz="1400" i="1" smtClean="0">
+                          <a:latin typeface="Cambria Math" panose="02040503050406030204" pitchFamily="18" charset="0"/>
+                        </a:rPr>
+                        <m:t>,</m:t>
+                      </m:r>
+                      <m:sSub>
+                        <m:sSubPr>
+                          <m:ctrlPr>
+                            <a:rPr lang="en-US" sz="1400" i="1" smtClean="0">
+                              <a:latin typeface="Cambria Math" panose="02040503050406030204" pitchFamily="18" charset="0"/>
+                            </a:rPr>
+                          </m:ctrlPr>
+                        </m:sSubPr>
+                        <m:e>
+                          <m:r>
+                            <a:rPr lang="en-US" sz="1400" i="1" smtClean="0">
+                              <a:latin typeface="Cambria Math" panose="02040503050406030204" pitchFamily="18" charset="0"/>
+                            </a:rPr>
+                            <m:t>𝑐</m:t>
+                          </m:r>
+                        </m:e>
+                        <m:sub>
+                          <m:r>
+                            <a:rPr lang="en-US" sz="1400" i="1" smtClean="0">
+                              <a:latin typeface="Cambria Math" panose="02040503050406030204" pitchFamily="18" charset="0"/>
+                            </a:rPr>
+                            <m:t>𝑗</m:t>
+                          </m:r>
+                          <m:r>
+                            <a:rPr lang="en-US" sz="1400" i="1" smtClean="0">
+                              <a:latin typeface="Cambria Math" panose="02040503050406030204" pitchFamily="18" charset="0"/>
+                            </a:rPr>
+                            <m:t>,2</m:t>
+                          </m:r>
+                        </m:sub>
+                      </m:sSub>
+                      <m:r>
+                        <a:rPr lang="en-US" sz="1400" i="1" smtClean="0">
+                          <a:latin typeface="Cambria Math" panose="02040503050406030204" pitchFamily="18" charset="0"/>
+                        </a:rPr>
+                        <m:t>,</m:t>
+                      </m:r>
+                      <m:r>
+                        <a:rPr lang="en-US" sz="1400" b="0" i="1" smtClean="0">
+                          <a:latin typeface="Cambria Math" panose="02040503050406030204" pitchFamily="18" charset="0"/>
+                        </a:rPr>
+                        <m:t>…</m:t>
+                      </m:r>
+                      <m:r>
+                        <a:rPr lang="en-US" sz="1400" i="1" smtClean="0">
+                          <a:latin typeface="Cambria Math" panose="02040503050406030204" pitchFamily="18" charset="0"/>
+                        </a:rPr>
+                        <m:t>,</m:t>
+                      </m:r>
+                      <m:sSub>
+                        <m:sSubPr>
+                          <m:ctrlPr>
+                            <a:rPr lang="en-US" sz="1400" i="1" smtClean="0">
+                              <a:latin typeface="Cambria Math" panose="02040503050406030204" pitchFamily="18" charset="0"/>
+                            </a:rPr>
+                          </m:ctrlPr>
+                        </m:sSubPr>
+                        <m:e>
+                          <m:r>
+                            <a:rPr lang="en-US" sz="1400" i="1" smtClean="0">
+                              <a:latin typeface="Cambria Math" panose="02040503050406030204" pitchFamily="18" charset="0"/>
+                            </a:rPr>
+                            <m:t>𝑐</m:t>
+                          </m:r>
+                        </m:e>
+                        <m:sub>
+                          <m:r>
+                            <a:rPr lang="en-US" sz="1400" i="1" smtClean="0">
+                              <a:latin typeface="Cambria Math" panose="02040503050406030204" pitchFamily="18" charset="0"/>
+                            </a:rPr>
+                            <m:t>𝑗</m:t>
+                          </m:r>
+                          <m:r>
+                            <a:rPr lang="en-US" sz="1400" i="1" smtClean="0">
+                              <a:latin typeface="Cambria Math" panose="02040503050406030204" pitchFamily="18" charset="0"/>
+                            </a:rPr>
+                            <m:t>,</m:t>
+                          </m:r>
+                          <m:r>
+                            <a:rPr lang="en-US" sz="1400" i="1" smtClean="0">
+                              <a:latin typeface="Cambria Math" panose="02040503050406030204" pitchFamily="18" charset="0"/>
+                            </a:rPr>
+                            <m:t>𝑘</m:t>
+                          </m:r>
+                        </m:sub>
+                      </m:sSub>
+                      <m:r>
+                        <a:rPr lang="en-US" sz="1400" b="0" i="1" smtClean="0">
+                          <a:latin typeface="Cambria Math" panose="02040503050406030204" pitchFamily="18" charset="0"/>
+                        </a:rPr>
+                        <m:t>}</m:t>
+                      </m:r>
+                    </m:oMath>
+                  </m:oMathPara>
+                </a14:m>
+                <a:endParaRPr lang="en-US" sz="1400"/>
+              </a:p>
+            </p:txBody>
+          </p:sp>
+        </mc:Choice>
+        <mc:Fallback>
+          <p:sp>
+            <p:nvSpPr>
+              <p:cNvPr id="10" name="TextBox 9">
+                <a:extLst>
+                  <a:ext uri="{FF2B5EF4-FFF2-40B4-BE49-F238E27FC236}">
+                    <a16:creationId xmlns:a16="http://schemas.microsoft.com/office/drawing/2014/main" id="{DDB9E504-415D-F6CF-3EEC-C1881488066A}"/>
+                  </a:ext>
+                </a:extLst>
+              </p:cNvPr>
+              <p:cNvSpPr txBox="1">
+                <a:spLocks noRot="1" noChangeAspect="1" noMove="1" noResize="1" noEditPoints="1" noAdjustHandles="1" noChangeArrowheads="1" noChangeShapeType="1" noTextEdit="1"/>
+              </p:cNvSpPr>
+              <p:nvPr/>
+            </p:nvSpPr>
+            <p:spPr>
+              <a:xfrm>
+                <a:off x="2261066" y="3567954"/>
+                <a:ext cx="1666354" cy="232756"/>
+              </a:xfrm>
+              <a:prstGeom prst="rect">
+                <a:avLst/>
+              </a:prstGeom>
+              <a:blipFill>
+                <a:blip r:embed="rId9"/>
+                <a:stretch>
+                  <a:fillRect l="-2198" r="-3663" b="-26316"/>
+                </a:stretch>
+              </a:blipFill>
+            </p:spPr>
+            <p:txBody>
+              <a:bodyPr/>
+              <a:lstStyle/>
+              <a:p>
+                <a:r>
+                  <a:rPr lang="en-US">
+                    <a:noFill/>
+                  </a:rPr>
+                  <a:t> </a:t>
+                </a:r>
+              </a:p>
+            </p:txBody>
+          </p:sp>
+        </mc:Fallback>
+      </mc:AlternateContent>
+      <p:pic>
+        <p:nvPicPr>
+          <p:cNvPr id="18" name="Picture 17">
+            <a:extLst>
+              <a:ext uri="{FF2B5EF4-FFF2-40B4-BE49-F238E27FC236}">
+                <a16:creationId xmlns:a16="http://schemas.microsoft.com/office/drawing/2014/main" id="{3F7D8D6B-91A0-3AEA-31F4-CE8487FC695B}"/>
+              </a:ext>
+            </a:extLst>
+          </p:cNvPr>
+          <p:cNvPicPr>
+            <a:picLocks noChangeAspect="1"/>
+          </p:cNvPicPr>
+          <p:nvPr/>
+        </p:nvPicPr>
+        <p:blipFill>
+          <a:blip r:embed="rId2">
+            <a:extLst>
+              <a:ext uri="{28A0092B-C50C-407E-A947-70E740481C1C}">
+                <a14:useLocalDpi xmlns:a14="http://schemas.microsoft.com/office/drawing/2010/main" val="0"/>
+              </a:ext>
+            </a:extLst>
+          </a:blip>
+          <a:srcRect t="54829"/>
+          <a:stretch>
+            <a:fillRect/>
+          </a:stretch>
+        </p:blipFill>
+        <p:spPr>
+          <a:xfrm>
+            <a:off x="1623442" y="3866586"/>
+            <a:ext cx="8945116" cy="2991414"/>
+          </a:xfrm>
+          <a:prstGeom prst="rect">
+            <a:avLst/>
+          </a:prstGeom>
+        </p:spPr>
+      </p:pic>
+      <mc:AlternateContent xmlns:mc="http://schemas.openxmlformats.org/markup-compatibility/2006">
+        <mc:Choice xmlns:a14="http://schemas.microsoft.com/office/drawing/2010/main" Requires="a14">
+          <p:sp>
+            <p:nvSpPr>
+              <p:cNvPr id="11" name="TextBox 10">
+                <a:extLst>
+                  <a:ext uri="{FF2B5EF4-FFF2-40B4-BE49-F238E27FC236}">
+                    <a16:creationId xmlns:a16="http://schemas.microsoft.com/office/drawing/2014/main" id="{5AD849E9-AA77-21A0-BBDB-E31E39CDB1DB}"/>
+                  </a:ext>
+                </a:extLst>
+              </p:cNvPr>
+              <p:cNvSpPr txBox="1"/>
+              <p:nvPr/>
+            </p:nvSpPr>
+            <p:spPr>
+              <a:xfrm>
+                <a:off x="2556086" y="4669323"/>
+                <a:ext cx="1290546" cy="246221"/>
+              </a:xfrm>
+              <a:prstGeom prst="rect">
+                <a:avLst/>
+              </a:prstGeom>
+              <a:noFill/>
+            </p:spPr>
+            <p:txBody>
+              <a:bodyPr wrap="none" lIns="0" tIns="0" rIns="0" bIns="0" rtlCol="0">
+                <a:spAutoFit/>
+              </a:bodyPr>
+              <a:lstStyle/>
+              <a:p>
+                <a14:m>
+                  <m:oMathPara xmlns:m="http://schemas.openxmlformats.org/officeDocument/2006/math">
+                    <m:oMathParaPr>
+                      <m:jc m:val="centerGroup"/>
+                    </m:oMathParaPr>
+                    <m:oMath xmlns:m="http://schemas.openxmlformats.org/officeDocument/2006/math">
+                      <m:sSub>
+                        <m:sSubPr>
+                          <m:ctrlPr>
+                            <a:rPr lang="fr-FR" sz="1600" i="1" smtClean="0">
+                              <a:latin typeface="Cambria Math" panose="02040503050406030204" pitchFamily="18" charset="0"/>
+                            </a:rPr>
+                          </m:ctrlPr>
+                        </m:sSubPr>
+                        <m:e>
+                          <m:r>
+                            <a:rPr lang="fr-FR" sz="1600" i="1">
+                              <a:latin typeface="Cambria Math" panose="02040503050406030204" pitchFamily="18" charset="0"/>
+                            </a:rPr>
+                            <m:t>𝑞</m:t>
+                          </m:r>
+                        </m:e>
+                        <m:sub>
+                          <m:r>
+                            <a:rPr lang="fr-FR" sz="1600" i="1">
+                              <a:latin typeface="Cambria Math" panose="02040503050406030204" pitchFamily="18" charset="0"/>
+                            </a:rPr>
+                            <m:t>1</m:t>
+                          </m:r>
+                        </m:sub>
+                      </m:sSub>
+                      <m:sSub>
+                        <m:sSubPr>
+                          <m:ctrlPr>
+                            <a:rPr lang="fr-FR" sz="1600" i="1">
+                              <a:latin typeface="Cambria Math" panose="02040503050406030204" pitchFamily="18" charset="0"/>
+                            </a:rPr>
+                          </m:ctrlPr>
+                        </m:sSubPr>
+                        <m:e>
+                          <m:r>
+                            <a:rPr lang="fr-FR" sz="1600" i="1">
+                              <a:latin typeface="Cambria Math" panose="02040503050406030204" pitchFamily="18" charset="0"/>
+                            </a:rPr>
+                            <m:t>𝑥</m:t>
+                          </m:r>
+                        </m:e>
+                        <m:sub>
+                          <m:r>
+                            <a:rPr lang="fr-FR" sz="1600" i="1">
+                              <a:latin typeface="Cambria Math" panose="02040503050406030204" pitchFamily="18" charset="0"/>
+                            </a:rPr>
+                            <m:t>1</m:t>
+                          </m:r>
+                        </m:sub>
+                      </m:sSub>
+                      <m:r>
+                        <a:rPr lang="fr-FR" sz="1600" i="1">
+                          <a:latin typeface="Cambria Math" panose="02040503050406030204" pitchFamily="18" charset="0"/>
+                        </a:rPr>
+                        <m:t>,…,</m:t>
+                      </m:r>
+                      <m:sSub>
+                        <m:sSubPr>
+                          <m:ctrlPr>
+                            <a:rPr lang="fr-FR" sz="1600" i="1">
+                              <a:latin typeface="Cambria Math" panose="02040503050406030204" pitchFamily="18" charset="0"/>
+                            </a:rPr>
+                          </m:ctrlPr>
+                        </m:sSubPr>
+                        <m:e>
+                          <m:r>
+                            <a:rPr lang="fr-FR" sz="1600" i="1">
+                              <a:latin typeface="Cambria Math" panose="02040503050406030204" pitchFamily="18" charset="0"/>
+                            </a:rPr>
+                            <m:t>𝑞</m:t>
+                          </m:r>
+                        </m:e>
+                        <m:sub>
+                          <m:r>
+                            <a:rPr lang="fr-FR" sz="1600" i="1">
+                              <a:latin typeface="Cambria Math" panose="02040503050406030204" pitchFamily="18" charset="0"/>
+                            </a:rPr>
+                            <m:t>𝑚</m:t>
+                          </m:r>
+                        </m:sub>
+                      </m:sSub>
+                      <m:sSub>
+                        <m:sSubPr>
+                          <m:ctrlPr>
+                            <a:rPr lang="fr-FR" sz="1600" i="1">
+                              <a:latin typeface="Cambria Math" panose="02040503050406030204" pitchFamily="18" charset="0"/>
+                            </a:rPr>
+                          </m:ctrlPr>
+                        </m:sSubPr>
+                        <m:e>
+                          <m:r>
+                            <a:rPr lang="fr-FR" sz="1600" i="1">
+                              <a:latin typeface="Cambria Math" panose="02040503050406030204" pitchFamily="18" charset="0"/>
+                            </a:rPr>
+                            <m:t>𝑥</m:t>
+                          </m:r>
+                        </m:e>
+                        <m:sub>
+                          <m:r>
+                            <a:rPr lang="fr-FR" sz="1600" i="1">
+                              <a:latin typeface="Cambria Math" panose="02040503050406030204" pitchFamily="18" charset="0"/>
+                            </a:rPr>
+                            <m:t>𝑚</m:t>
+                          </m:r>
+                        </m:sub>
+                      </m:sSub>
+                    </m:oMath>
+                  </m:oMathPara>
+                </a14:m>
+                <a:endParaRPr lang="en-US" sz="1600"/>
+              </a:p>
+            </p:txBody>
+          </p:sp>
+        </mc:Choice>
+        <mc:Fallback>
+          <p:sp>
+            <p:nvSpPr>
+              <p:cNvPr id="11" name="TextBox 10">
+                <a:extLst>
+                  <a:ext uri="{FF2B5EF4-FFF2-40B4-BE49-F238E27FC236}">
+                    <a16:creationId xmlns:a16="http://schemas.microsoft.com/office/drawing/2014/main" id="{5AD849E9-AA77-21A0-BBDB-E31E39CDB1DB}"/>
+                  </a:ext>
+                </a:extLst>
+              </p:cNvPr>
+              <p:cNvSpPr txBox="1">
+                <a:spLocks noRot="1" noChangeAspect="1" noMove="1" noResize="1" noEditPoints="1" noAdjustHandles="1" noChangeArrowheads="1" noChangeShapeType="1" noTextEdit="1"/>
+              </p:cNvSpPr>
+              <p:nvPr/>
+            </p:nvSpPr>
+            <p:spPr>
+              <a:xfrm>
+                <a:off x="2556086" y="4669323"/>
+                <a:ext cx="1290546" cy="246221"/>
+              </a:xfrm>
+              <a:prstGeom prst="rect">
+                <a:avLst/>
+              </a:prstGeom>
+              <a:blipFill>
+                <a:blip r:embed="rId10"/>
+                <a:stretch>
+                  <a:fillRect l="-3774" b="-25000"/>
+                </a:stretch>
+              </a:blipFill>
+            </p:spPr>
+            <p:txBody>
+              <a:bodyPr/>
+              <a:lstStyle/>
+              <a:p>
+                <a:r>
+                  <a:rPr lang="en-US">
+                    <a:noFill/>
+                  </a:rPr>
+                  <a:t> </a:t>
+                </a:r>
+              </a:p>
+            </p:txBody>
+          </p:sp>
+        </mc:Fallback>
+      </mc:AlternateContent>
+      <mc:AlternateContent xmlns:mc="http://schemas.openxmlformats.org/markup-compatibility/2006">
+        <mc:Choice xmlns:a14="http://schemas.microsoft.com/office/drawing/2010/main" Requires="a14">
+          <p:sp>
+            <p:nvSpPr>
+              <p:cNvPr id="12" name="TextBox 11">
+                <a:extLst>
+                  <a:ext uri="{FF2B5EF4-FFF2-40B4-BE49-F238E27FC236}">
+                    <a16:creationId xmlns:a16="http://schemas.microsoft.com/office/drawing/2014/main" id="{F6FDC299-5ED1-0534-4EC4-AD44F7F18F82}"/>
+                  </a:ext>
+                </a:extLst>
+              </p:cNvPr>
+              <p:cNvSpPr txBox="1"/>
+              <p:nvPr/>
+            </p:nvSpPr>
+            <p:spPr>
+              <a:xfrm>
+                <a:off x="4214116" y="4655914"/>
+                <a:ext cx="1290546" cy="246221"/>
+              </a:xfrm>
+              <a:prstGeom prst="rect">
+                <a:avLst/>
+              </a:prstGeom>
+              <a:noFill/>
+            </p:spPr>
+            <p:txBody>
+              <a:bodyPr wrap="none" lIns="0" tIns="0" rIns="0" bIns="0" rtlCol="0">
+                <a:spAutoFit/>
+              </a:bodyPr>
+              <a:lstStyle/>
+              <a:p>
+                <a14:m>
+                  <m:oMathPara xmlns:m="http://schemas.openxmlformats.org/officeDocument/2006/math">
+                    <m:oMathParaPr>
+                      <m:jc m:val="centerGroup"/>
+                    </m:oMathParaPr>
+                    <m:oMath xmlns:m="http://schemas.openxmlformats.org/officeDocument/2006/math">
+                      <m:sSub>
+                        <m:sSubPr>
+                          <m:ctrlPr>
+                            <a:rPr lang="fr-FR" sz="1600" i="1" smtClean="0">
+                              <a:latin typeface="Cambria Math" panose="02040503050406030204" pitchFamily="18" charset="0"/>
+                            </a:rPr>
+                          </m:ctrlPr>
+                        </m:sSubPr>
+                        <m:e>
+                          <m:r>
+                            <a:rPr lang="fr-FR" sz="1600" i="1">
+                              <a:latin typeface="Cambria Math" panose="02040503050406030204" pitchFamily="18" charset="0"/>
+                            </a:rPr>
+                            <m:t>𝑞</m:t>
+                          </m:r>
+                        </m:e>
+                        <m:sub>
+                          <m:r>
+                            <a:rPr lang="fr-FR" sz="1600" i="1">
+                              <a:latin typeface="Cambria Math" panose="02040503050406030204" pitchFamily="18" charset="0"/>
+                            </a:rPr>
+                            <m:t>1</m:t>
+                          </m:r>
+                        </m:sub>
+                      </m:sSub>
+                      <m:sSub>
+                        <m:sSubPr>
+                          <m:ctrlPr>
+                            <a:rPr lang="fr-FR" sz="1600" i="1">
+                              <a:latin typeface="Cambria Math" panose="02040503050406030204" pitchFamily="18" charset="0"/>
+                            </a:rPr>
+                          </m:ctrlPr>
+                        </m:sSubPr>
+                        <m:e>
+                          <m:r>
+                            <a:rPr lang="fr-FR" sz="1600" i="1">
+                              <a:latin typeface="Cambria Math" panose="02040503050406030204" pitchFamily="18" charset="0"/>
+                            </a:rPr>
+                            <m:t>𝑥</m:t>
+                          </m:r>
+                        </m:e>
+                        <m:sub>
+                          <m:r>
+                            <a:rPr lang="fr-FR" sz="1600" i="1">
+                              <a:latin typeface="Cambria Math" panose="02040503050406030204" pitchFamily="18" charset="0"/>
+                            </a:rPr>
+                            <m:t>1</m:t>
+                          </m:r>
+                        </m:sub>
+                      </m:sSub>
+                      <m:r>
+                        <a:rPr lang="fr-FR" sz="1600" i="1">
+                          <a:latin typeface="Cambria Math" panose="02040503050406030204" pitchFamily="18" charset="0"/>
+                        </a:rPr>
+                        <m:t>,…,</m:t>
+                      </m:r>
+                      <m:sSub>
+                        <m:sSubPr>
+                          <m:ctrlPr>
+                            <a:rPr lang="fr-FR" sz="1600" i="1">
+                              <a:latin typeface="Cambria Math" panose="02040503050406030204" pitchFamily="18" charset="0"/>
+                            </a:rPr>
+                          </m:ctrlPr>
+                        </m:sSubPr>
+                        <m:e>
+                          <m:r>
+                            <a:rPr lang="fr-FR" sz="1600" i="1">
+                              <a:latin typeface="Cambria Math" panose="02040503050406030204" pitchFamily="18" charset="0"/>
+                            </a:rPr>
+                            <m:t>𝑞</m:t>
+                          </m:r>
+                        </m:e>
+                        <m:sub>
+                          <m:r>
+                            <a:rPr lang="fr-FR" sz="1600" i="1">
+                              <a:latin typeface="Cambria Math" panose="02040503050406030204" pitchFamily="18" charset="0"/>
+                            </a:rPr>
+                            <m:t>𝑚</m:t>
+                          </m:r>
+                        </m:sub>
+                      </m:sSub>
+                      <m:sSub>
+                        <m:sSubPr>
+                          <m:ctrlPr>
+                            <a:rPr lang="fr-FR" sz="1600" i="1">
+                              <a:latin typeface="Cambria Math" panose="02040503050406030204" pitchFamily="18" charset="0"/>
+                            </a:rPr>
+                          </m:ctrlPr>
+                        </m:sSubPr>
+                        <m:e>
+                          <m:r>
+                            <a:rPr lang="fr-FR" sz="1600" i="1">
+                              <a:latin typeface="Cambria Math" panose="02040503050406030204" pitchFamily="18" charset="0"/>
+                            </a:rPr>
+                            <m:t>𝑥</m:t>
+                          </m:r>
+                        </m:e>
+                        <m:sub>
+                          <m:r>
+                            <a:rPr lang="fr-FR" sz="1600" i="1">
+                              <a:latin typeface="Cambria Math" panose="02040503050406030204" pitchFamily="18" charset="0"/>
+                            </a:rPr>
+                            <m:t>𝑚</m:t>
+                          </m:r>
+                        </m:sub>
+                      </m:sSub>
+                    </m:oMath>
+                  </m:oMathPara>
+                </a14:m>
+                <a:endParaRPr lang="en-US" sz="1600"/>
+              </a:p>
+            </p:txBody>
+          </p:sp>
+        </mc:Choice>
+        <mc:Fallback>
+          <p:sp>
+            <p:nvSpPr>
+              <p:cNvPr id="12" name="TextBox 11">
+                <a:extLst>
+                  <a:ext uri="{FF2B5EF4-FFF2-40B4-BE49-F238E27FC236}">
+                    <a16:creationId xmlns:a16="http://schemas.microsoft.com/office/drawing/2014/main" id="{F6FDC299-5ED1-0534-4EC4-AD44F7F18F82}"/>
+                  </a:ext>
+                </a:extLst>
+              </p:cNvPr>
+              <p:cNvSpPr txBox="1">
+                <a:spLocks noRot="1" noChangeAspect="1" noMove="1" noResize="1" noEditPoints="1" noAdjustHandles="1" noChangeArrowheads="1" noChangeShapeType="1" noTextEdit="1"/>
+              </p:cNvSpPr>
+              <p:nvPr/>
+            </p:nvSpPr>
+            <p:spPr>
+              <a:xfrm>
+                <a:off x="4214116" y="4655914"/>
+                <a:ext cx="1290546" cy="246221"/>
+              </a:xfrm>
+              <a:prstGeom prst="rect">
+                <a:avLst/>
+              </a:prstGeom>
+              <a:blipFill>
+                <a:blip r:embed="rId11"/>
+                <a:stretch>
+                  <a:fillRect l="-3774" b="-25000"/>
+                </a:stretch>
+              </a:blipFill>
+            </p:spPr>
+            <p:txBody>
+              <a:bodyPr/>
+              <a:lstStyle/>
+              <a:p>
+                <a:r>
+                  <a:rPr lang="en-US">
+                    <a:noFill/>
+                  </a:rPr>
+                  <a:t> </a:t>
+                </a:r>
+              </a:p>
+            </p:txBody>
+          </p:sp>
+        </mc:Fallback>
+      </mc:AlternateContent>
+      <mc:AlternateContent xmlns:mc="http://schemas.openxmlformats.org/markup-compatibility/2006">
+        <mc:Choice xmlns:a14="http://schemas.microsoft.com/office/drawing/2010/main" Requires="a14">
+          <p:sp>
+            <p:nvSpPr>
+              <p:cNvPr id="13" name="TextBox 12">
+                <a:extLst>
+                  <a:ext uri="{FF2B5EF4-FFF2-40B4-BE49-F238E27FC236}">
+                    <a16:creationId xmlns:a16="http://schemas.microsoft.com/office/drawing/2014/main" id="{9CA381FA-6D84-A699-F542-5E46EAF1804E}"/>
+                  </a:ext>
+                </a:extLst>
+              </p:cNvPr>
+              <p:cNvSpPr txBox="1"/>
+              <p:nvPr/>
+            </p:nvSpPr>
+            <p:spPr>
+              <a:xfrm>
+                <a:off x="5849972" y="4667490"/>
+                <a:ext cx="1290546" cy="246221"/>
+              </a:xfrm>
+              <a:prstGeom prst="rect">
+                <a:avLst/>
+              </a:prstGeom>
+              <a:noFill/>
+            </p:spPr>
+            <p:txBody>
+              <a:bodyPr wrap="none" lIns="0" tIns="0" rIns="0" bIns="0" rtlCol="0">
+                <a:spAutoFit/>
+              </a:bodyPr>
+              <a:lstStyle/>
+              <a:p>
+                <a14:m>
+                  <m:oMathPara xmlns:m="http://schemas.openxmlformats.org/officeDocument/2006/math">
+                    <m:oMathParaPr>
+                      <m:jc m:val="centerGroup"/>
+                    </m:oMathParaPr>
+                    <m:oMath xmlns:m="http://schemas.openxmlformats.org/officeDocument/2006/math">
+                      <m:sSub>
+                        <m:sSubPr>
+                          <m:ctrlPr>
+                            <a:rPr lang="fr-FR" sz="1600" i="1" smtClean="0">
+                              <a:latin typeface="Cambria Math" panose="02040503050406030204" pitchFamily="18" charset="0"/>
+                            </a:rPr>
+                          </m:ctrlPr>
+                        </m:sSubPr>
+                        <m:e>
+                          <m:r>
+                            <a:rPr lang="fr-FR" sz="1600" i="1">
+                              <a:latin typeface="Cambria Math" panose="02040503050406030204" pitchFamily="18" charset="0"/>
+                            </a:rPr>
+                            <m:t>𝑞</m:t>
+                          </m:r>
+                        </m:e>
+                        <m:sub>
+                          <m:r>
+                            <a:rPr lang="fr-FR" sz="1600" i="1">
+                              <a:latin typeface="Cambria Math" panose="02040503050406030204" pitchFamily="18" charset="0"/>
+                            </a:rPr>
+                            <m:t>1</m:t>
+                          </m:r>
+                        </m:sub>
+                      </m:sSub>
+                      <m:sSub>
+                        <m:sSubPr>
+                          <m:ctrlPr>
+                            <a:rPr lang="fr-FR" sz="1600" i="1">
+                              <a:latin typeface="Cambria Math" panose="02040503050406030204" pitchFamily="18" charset="0"/>
+                            </a:rPr>
+                          </m:ctrlPr>
+                        </m:sSubPr>
+                        <m:e>
+                          <m:r>
+                            <a:rPr lang="fr-FR" sz="1600" i="1">
+                              <a:latin typeface="Cambria Math" panose="02040503050406030204" pitchFamily="18" charset="0"/>
+                            </a:rPr>
+                            <m:t>𝑥</m:t>
+                          </m:r>
+                        </m:e>
+                        <m:sub>
+                          <m:r>
+                            <a:rPr lang="fr-FR" sz="1600" i="1">
+                              <a:latin typeface="Cambria Math" panose="02040503050406030204" pitchFamily="18" charset="0"/>
+                            </a:rPr>
+                            <m:t>1</m:t>
+                          </m:r>
+                        </m:sub>
+                      </m:sSub>
+                      <m:r>
+                        <a:rPr lang="fr-FR" sz="1600" i="1">
+                          <a:latin typeface="Cambria Math" panose="02040503050406030204" pitchFamily="18" charset="0"/>
+                        </a:rPr>
+                        <m:t>,…,</m:t>
+                      </m:r>
+                      <m:sSub>
+                        <m:sSubPr>
+                          <m:ctrlPr>
+                            <a:rPr lang="fr-FR" sz="1600" i="1">
+                              <a:latin typeface="Cambria Math" panose="02040503050406030204" pitchFamily="18" charset="0"/>
+                            </a:rPr>
+                          </m:ctrlPr>
+                        </m:sSubPr>
+                        <m:e>
+                          <m:r>
+                            <a:rPr lang="fr-FR" sz="1600" i="1">
+                              <a:latin typeface="Cambria Math" panose="02040503050406030204" pitchFamily="18" charset="0"/>
+                            </a:rPr>
+                            <m:t>𝑞</m:t>
+                          </m:r>
+                        </m:e>
+                        <m:sub>
+                          <m:r>
+                            <a:rPr lang="fr-FR" sz="1600" i="1">
+                              <a:latin typeface="Cambria Math" panose="02040503050406030204" pitchFamily="18" charset="0"/>
+                            </a:rPr>
+                            <m:t>𝑚</m:t>
+                          </m:r>
+                        </m:sub>
+                      </m:sSub>
+                      <m:sSub>
+                        <m:sSubPr>
+                          <m:ctrlPr>
+                            <a:rPr lang="fr-FR" sz="1600" i="1">
+                              <a:latin typeface="Cambria Math" panose="02040503050406030204" pitchFamily="18" charset="0"/>
+                            </a:rPr>
+                          </m:ctrlPr>
+                        </m:sSubPr>
+                        <m:e>
+                          <m:r>
+                            <a:rPr lang="fr-FR" sz="1600" i="1">
+                              <a:latin typeface="Cambria Math" panose="02040503050406030204" pitchFamily="18" charset="0"/>
+                            </a:rPr>
+                            <m:t>𝑥</m:t>
+                          </m:r>
+                        </m:e>
+                        <m:sub>
+                          <m:r>
+                            <a:rPr lang="fr-FR" sz="1600" i="1">
+                              <a:latin typeface="Cambria Math" panose="02040503050406030204" pitchFamily="18" charset="0"/>
+                            </a:rPr>
+                            <m:t>𝑚</m:t>
+                          </m:r>
+                        </m:sub>
+                      </m:sSub>
+                    </m:oMath>
+                  </m:oMathPara>
+                </a14:m>
+                <a:endParaRPr lang="en-US" sz="1600"/>
+              </a:p>
+            </p:txBody>
+          </p:sp>
+        </mc:Choice>
+        <mc:Fallback>
+          <p:sp>
+            <p:nvSpPr>
+              <p:cNvPr id="13" name="TextBox 12">
+                <a:extLst>
+                  <a:ext uri="{FF2B5EF4-FFF2-40B4-BE49-F238E27FC236}">
+                    <a16:creationId xmlns:a16="http://schemas.microsoft.com/office/drawing/2014/main" id="{9CA381FA-6D84-A699-F542-5E46EAF1804E}"/>
+                  </a:ext>
+                </a:extLst>
+              </p:cNvPr>
+              <p:cNvSpPr txBox="1">
+                <a:spLocks noRot="1" noChangeAspect="1" noMove="1" noResize="1" noEditPoints="1" noAdjustHandles="1" noChangeArrowheads="1" noChangeShapeType="1" noTextEdit="1"/>
+              </p:cNvSpPr>
+              <p:nvPr/>
+            </p:nvSpPr>
+            <p:spPr>
+              <a:xfrm>
+                <a:off x="5849972" y="4667490"/>
+                <a:ext cx="1290546" cy="246221"/>
+              </a:xfrm>
+              <a:prstGeom prst="rect">
+                <a:avLst/>
+              </a:prstGeom>
+              <a:blipFill>
+                <a:blip r:embed="rId12"/>
+                <a:stretch>
+                  <a:fillRect l="-3791" b="-25000"/>
+                </a:stretch>
+              </a:blipFill>
+            </p:spPr>
+            <p:txBody>
+              <a:bodyPr/>
+              <a:lstStyle/>
+              <a:p>
+                <a:r>
+                  <a:rPr lang="en-US">
+                    <a:noFill/>
+                  </a:rPr>
+                  <a:t> </a:t>
+                </a:r>
+              </a:p>
+            </p:txBody>
+          </p:sp>
+        </mc:Fallback>
+      </mc:AlternateContent>
+      <mc:AlternateContent xmlns:mc="http://schemas.openxmlformats.org/markup-compatibility/2006">
+        <mc:Choice xmlns:a14="http://schemas.microsoft.com/office/drawing/2010/main" Requires="a14">
+          <p:sp>
+            <p:nvSpPr>
+              <p:cNvPr id="14" name="TextBox 13">
+                <a:extLst>
+                  <a:ext uri="{FF2B5EF4-FFF2-40B4-BE49-F238E27FC236}">
+                    <a16:creationId xmlns:a16="http://schemas.microsoft.com/office/drawing/2014/main" id="{950381AC-2A7F-3C72-5F68-7CFA62EFA367}"/>
+                  </a:ext>
+                </a:extLst>
+              </p:cNvPr>
+              <p:cNvSpPr txBox="1"/>
+              <p:nvPr/>
+            </p:nvSpPr>
+            <p:spPr>
+              <a:xfrm>
+                <a:off x="7514765" y="4661700"/>
+                <a:ext cx="1290546" cy="246221"/>
+              </a:xfrm>
+              <a:prstGeom prst="rect">
+                <a:avLst/>
+              </a:prstGeom>
+              <a:noFill/>
+            </p:spPr>
+            <p:txBody>
+              <a:bodyPr wrap="none" lIns="0" tIns="0" rIns="0" bIns="0" rtlCol="0">
+                <a:spAutoFit/>
+              </a:bodyPr>
+              <a:lstStyle/>
+              <a:p>
+                <a14:m>
+                  <m:oMathPara xmlns:m="http://schemas.openxmlformats.org/officeDocument/2006/math">
+                    <m:oMathParaPr>
+                      <m:jc m:val="centerGroup"/>
+                    </m:oMathParaPr>
+                    <m:oMath xmlns:m="http://schemas.openxmlformats.org/officeDocument/2006/math">
+                      <m:sSub>
+                        <m:sSubPr>
+                          <m:ctrlPr>
+                            <a:rPr lang="fr-FR" sz="1600" i="1" smtClean="0">
+                              <a:latin typeface="Cambria Math" panose="02040503050406030204" pitchFamily="18" charset="0"/>
+                            </a:rPr>
+                          </m:ctrlPr>
+                        </m:sSubPr>
+                        <m:e>
+                          <m:r>
+                            <a:rPr lang="fr-FR" sz="1600" i="1">
+                              <a:latin typeface="Cambria Math" panose="02040503050406030204" pitchFamily="18" charset="0"/>
+                            </a:rPr>
+                            <m:t>𝑞</m:t>
+                          </m:r>
+                        </m:e>
+                        <m:sub>
+                          <m:r>
+                            <a:rPr lang="fr-FR" sz="1600" i="1">
+                              <a:latin typeface="Cambria Math" panose="02040503050406030204" pitchFamily="18" charset="0"/>
+                            </a:rPr>
+                            <m:t>1</m:t>
+                          </m:r>
+                        </m:sub>
+                      </m:sSub>
+                      <m:sSub>
+                        <m:sSubPr>
+                          <m:ctrlPr>
+                            <a:rPr lang="fr-FR" sz="1600" i="1">
+                              <a:latin typeface="Cambria Math" panose="02040503050406030204" pitchFamily="18" charset="0"/>
+                            </a:rPr>
+                          </m:ctrlPr>
+                        </m:sSubPr>
+                        <m:e>
+                          <m:r>
+                            <a:rPr lang="fr-FR" sz="1600" i="1">
+                              <a:latin typeface="Cambria Math" panose="02040503050406030204" pitchFamily="18" charset="0"/>
+                            </a:rPr>
+                            <m:t>𝑥</m:t>
+                          </m:r>
+                        </m:e>
+                        <m:sub>
+                          <m:r>
+                            <a:rPr lang="fr-FR" sz="1600" i="1">
+                              <a:latin typeface="Cambria Math" panose="02040503050406030204" pitchFamily="18" charset="0"/>
+                            </a:rPr>
+                            <m:t>1</m:t>
+                          </m:r>
+                        </m:sub>
+                      </m:sSub>
+                      <m:r>
+                        <a:rPr lang="fr-FR" sz="1600" i="1">
+                          <a:latin typeface="Cambria Math" panose="02040503050406030204" pitchFamily="18" charset="0"/>
+                        </a:rPr>
+                        <m:t>,…,</m:t>
+                      </m:r>
+                      <m:sSub>
+                        <m:sSubPr>
+                          <m:ctrlPr>
+                            <a:rPr lang="fr-FR" sz="1600" i="1">
+                              <a:latin typeface="Cambria Math" panose="02040503050406030204" pitchFamily="18" charset="0"/>
+                            </a:rPr>
+                          </m:ctrlPr>
+                        </m:sSubPr>
+                        <m:e>
+                          <m:r>
+                            <a:rPr lang="fr-FR" sz="1600" i="1">
+                              <a:latin typeface="Cambria Math" panose="02040503050406030204" pitchFamily="18" charset="0"/>
+                            </a:rPr>
+                            <m:t>𝑞</m:t>
+                          </m:r>
+                        </m:e>
+                        <m:sub>
+                          <m:r>
+                            <a:rPr lang="fr-FR" sz="1600" i="1">
+                              <a:latin typeface="Cambria Math" panose="02040503050406030204" pitchFamily="18" charset="0"/>
+                            </a:rPr>
+                            <m:t>𝑚</m:t>
+                          </m:r>
+                        </m:sub>
+                      </m:sSub>
+                      <m:sSub>
+                        <m:sSubPr>
+                          <m:ctrlPr>
+                            <a:rPr lang="fr-FR" sz="1600" i="1">
+                              <a:latin typeface="Cambria Math" panose="02040503050406030204" pitchFamily="18" charset="0"/>
+                            </a:rPr>
+                          </m:ctrlPr>
+                        </m:sSubPr>
+                        <m:e>
+                          <m:r>
+                            <a:rPr lang="fr-FR" sz="1600" i="1">
+                              <a:latin typeface="Cambria Math" panose="02040503050406030204" pitchFamily="18" charset="0"/>
+                            </a:rPr>
+                            <m:t>𝑥</m:t>
+                          </m:r>
+                        </m:e>
+                        <m:sub>
+                          <m:r>
+                            <a:rPr lang="fr-FR" sz="1600" i="1">
+                              <a:latin typeface="Cambria Math" panose="02040503050406030204" pitchFamily="18" charset="0"/>
+                            </a:rPr>
+                            <m:t>𝑚</m:t>
+                          </m:r>
+                        </m:sub>
+                      </m:sSub>
+                    </m:oMath>
+                  </m:oMathPara>
+                </a14:m>
+                <a:endParaRPr lang="en-US" sz="1600"/>
+              </a:p>
+            </p:txBody>
+          </p:sp>
+        </mc:Choice>
+        <mc:Fallback>
+          <p:sp>
+            <p:nvSpPr>
+              <p:cNvPr id="14" name="TextBox 13">
+                <a:extLst>
+                  <a:ext uri="{FF2B5EF4-FFF2-40B4-BE49-F238E27FC236}">
+                    <a16:creationId xmlns:a16="http://schemas.microsoft.com/office/drawing/2014/main" id="{950381AC-2A7F-3C72-5F68-7CFA62EFA367}"/>
+                  </a:ext>
+                </a:extLst>
+              </p:cNvPr>
+              <p:cNvSpPr txBox="1">
+                <a:spLocks noRot="1" noChangeAspect="1" noMove="1" noResize="1" noEditPoints="1" noAdjustHandles="1" noChangeArrowheads="1" noChangeShapeType="1" noTextEdit="1"/>
+              </p:cNvSpPr>
+              <p:nvPr/>
+            </p:nvSpPr>
+            <p:spPr>
+              <a:xfrm>
+                <a:off x="7514765" y="4661700"/>
+                <a:ext cx="1290546" cy="246221"/>
+              </a:xfrm>
+              <a:prstGeom prst="rect">
+                <a:avLst/>
+              </a:prstGeom>
+              <a:blipFill>
+                <a:blip r:embed="rId13"/>
+                <a:stretch>
+                  <a:fillRect l="-3791" b="-25000"/>
+                </a:stretch>
+              </a:blipFill>
+            </p:spPr>
+            <p:txBody>
+              <a:bodyPr/>
+              <a:lstStyle/>
+              <a:p>
+                <a:r>
+                  <a:rPr lang="en-US">
+                    <a:noFill/>
+                  </a:rPr>
+                  <a:t> </a:t>
+                </a:r>
+              </a:p>
+            </p:txBody>
+          </p:sp>
+        </mc:Fallback>
+      </mc:AlternateContent>
+    </p:spTree>
+    <p:extLst>
+      <p:ext uri="{BB962C8B-B14F-4D97-AF65-F5344CB8AC3E}">
+        <p14:creationId xmlns:p14="http://schemas.microsoft.com/office/powerpoint/2010/main" val="1254439374"/>
       </p:ext>
     </p:extLst>
   </p:cSld>

</xml_diff>

<commit_message>
update prod-quant.svg, update ball tree
</commit_message>
<xml_diff>
--- a/images/kd-draw.pptx
+++ b/images/kd-draw.pptx
@@ -131,7 +131,7 @@
 <file path=ppt/revisionInfo.xml><?xml version="1.0" encoding="utf-8"?>
 <p1510:revInfo xmlns:a="http://schemas.openxmlformats.org/drawingml/2006/main" xmlns:r="http://schemas.openxmlformats.org/officeDocument/2006/relationships" xmlns:p1510="http://schemas.microsoft.com/office/powerpoint/2015/10/main">
   <p1510:revLst>
-    <p1510:client id="{9403B015-2769-46C7-9465-E136DCA63CCF}" v="226" dt="2025-12-22T04:16:29.133"/>
+    <p1510:client id="{9403B015-2769-46C7-9465-E136DCA63CCF}" v="299" dt="2025-12-23T10:09:26.241"/>
   </p1510:revLst>
 </p1510:revInfo>
 </file>
@@ -141,7 +141,7 @@
   <pc:docChgLst>
     <pc:chgData name="Phạm Thông" userId="cb1de41f-d0a9-4c8b-9095-fa88b5d4678f" providerId="ADAL" clId="{E2A0B859-04CE-4714-8C81-52AA70A7C49E}"/>
     <pc:docChg chg="undo custSel addSld modSld">
-      <pc:chgData name="Phạm Thông" userId="cb1de41f-d0a9-4c8b-9095-fa88b5d4678f" providerId="ADAL" clId="{E2A0B859-04CE-4714-8C81-52AA70A7C49E}" dt="2025-12-22T04:16:51.599" v="915" actId="1036"/>
+      <pc:chgData name="Phạm Thông" userId="cb1de41f-d0a9-4c8b-9095-fa88b5d4678f" providerId="ADAL" clId="{E2A0B859-04CE-4714-8C81-52AA70A7C49E}" dt="2025-12-23T10:09:26.241" v="1001" actId="114"/>
       <pc:docMkLst>
         <pc:docMk/>
       </pc:docMkLst>
@@ -351,13 +351,13 @@
         </pc:picChg>
       </pc:sldChg>
       <pc:sldChg chg="addSp modSp new mod">
-        <pc:chgData name="Phạm Thông" userId="cb1de41f-d0a9-4c8b-9095-fa88b5d4678f" providerId="ADAL" clId="{E2A0B859-04CE-4714-8C81-52AA70A7C49E}" dt="2025-12-22T04:16:51.599" v="915" actId="1036"/>
+        <pc:chgData name="Phạm Thông" userId="cb1de41f-d0a9-4c8b-9095-fa88b5d4678f" providerId="ADAL" clId="{E2A0B859-04CE-4714-8C81-52AA70A7C49E}" dt="2025-12-23T10:09:26.241" v="1001" actId="114"/>
         <pc:sldMkLst>
           <pc:docMk/>
           <pc:sldMk cId="1254439374" sldId="262"/>
         </pc:sldMkLst>
         <pc:spChg chg="add mod">
-          <ac:chgData name="Phạm Thông" userId="cb1de41f-d0a9-4c8b-9095-fa88b5d4678f" providerId="ADAL" clId="{E2A0B859-04CE-4714-8C81-52AA70A7C49E}" dt="2025-12-22T04:15:45.363" v="799" actId="1035"/>
+          <ac:chgData name="Phạm Thông" userId="cb1de41f-d0a9-4c8b-9095-fa88b5d4678f" providerId="ADAL" clId="{E2A0B859-04CE-4714-8C81-52AA70A7C49E}" dt="2025-12-23T10:06:54.121" v="916" actId="20577"/>
           <ac:spMkLst>
             <pc:docMk/>
             <pc:sldMk cId="1254439374" sldId="262"/>
@@ -365,7 +365,7 @@
           </ac:spMkLst>
         </pc:spChg>
         <pc:spChg chg="add mod">
-          <ac:chgData name="Phạm Thông" userId="cb1de41f-d0a9-4c8b-9095-fa88b5d4678f" providerId="ADAL" clId="{E2A0B859-04CE-4714-8C81-52AA70A7C49E}" dt="2025-12-22T04:16:13.614" v="843" actId="1037"/>
+          <ac:chgData name="Phạm Thông" userId="cb1de41f-d0a9-4c8b-9095-fa88b5d4678f" providerId="ADAL" clId="{E2A0B859-04CE-4714-8C81-52AA70A7C49E}" dt="2025-12-23T10:07:11.885" v="921" actId="20577"/>
           <ac:spMkLst>
             <pc:docMk/>
             <pc:sldMk cId="1254439374" sldId="262"/>
@@ -373,7 +373,7 @@
           </ac:spMkLst>
         </pc:spChg>
         <pc:spChg chg="add mod">
-          <ac:chgData name="Phạm Thông" userId="cb1de41f-d0a9-4c8b-9095-fa88b5d4678f" providerId="ADAL" clId="{E2A0B859-04CE-4714-8C81-52AA70A7C49E}" dt="2025-12-22T04:16:07.413" v="835" actId="1036"/>
+          <ac:chgData name="Phạm Thông" userId="cb1de41f-d0a9-4c8b-9095-fa88b5d4678f" providerId="ADAL" clId="{E2A0B859-04CE-4714-8C81-52AA70A7C49E}" dt="2025-12-23T10:07:19.354" v="925" actId="20577"/>
           <ac:spMkLst>
             <pc:docMk/>
             <pc:sldMk cId="1254439374" sldId="262"/>
@@ -381,7 +381,7 @@
           </ac:spMkLst>
         </pc:spChg>
         <pc:spChg chg="add mod">
-          <ac:chgData name="Phạm Thông" userId="cb1de41f-d0a9-4c8b-9095-fa88b5d4678f" providerId="ADAL" clId="{E2A0B859-04CE-4714-8C81-52AA70A7C49E}" dt="2025-12-22T04:16:02.289" v="830" actId="1036"/>
+          <ac:chgData name="Phạm Thông" userId="cb1de41f-d0a9-4c8b-9095-fa88b5d4678f" providerId="ADAL" clId="{E2A0B859-04CE-4714-8C81-52AA70A7C49E}" dt="2025-12-23T10:07:26.173" v="943" actId="20577"/>
           <ac:spMkLst>
             <pc:docMk/>
             <pc:sldMk cId="1254439374" sldId="262"/>
@@ -389,7 +389,7 @@
           </ac:spMkLst>
         </pc:spChg>
         <pc:spChg chg="add mod">
-          <ac:chgData name="Phạm Thông" userId="cb1de41f-d0a9-4c8b-9095-fa88b5d4678f" providerId="ADAL" clId="{E2A0B859-04CE-4714-8C81-52AA70A7C49E}" dt="2025-12-22T04:15:56.639" v="826" actId="1036"/>
+          <ac:chgData name="Phạm Thông" userId="cb1de41f-d0a9-4c8b-9095-fa88b5d4678f" providerId="ADAL" clId="{E2A0B859-04CE-4714-8C81-52AA70A7C49E}" dt="2025-12-23T10:09:26.241" v="1001" actId="114"/>
           <ac:spMkLst>
             <pc:docMk/>
             <pc:sldMk cId="1254439374" sldId="262"/>
@@ -413,7 +413,7 @@
           </ac:spMkLst>
         </pc:spChg>
         <pc:spChg chg="add mod">
-          <ac:chgData name="Phạm Thông" userId="cb1de41f-d0a9-4c8b-9095-fa88b5d4678f" providerId="ADAL" clId="{E2A0B859-04CE-4714-8C81-52AA70A7C49E}" dt="2025-12-22T04:16:33.850" v="860" actId="1035"/>
+          <ac:chgData name="Phạm Thông" userId="cb1de41f-d0a9-4c8b-9095-fa88b5d4678f" providerId="ADAL" clId="{E2A0B859-04CE-4714-8C81-52AA70A7C49E}" dt="2025-12-23T10:08:15.060" v="957" actId="1076"/>
           <ac:spMkLst>
             <pc:docMk/>
             <pc:sldMk cId="1254439374" sldId="262"/>
@@ -421,7 +421,7 @@
           </ac:spMkLst>
         </pc:spChg>
         <pc:spChg chg="add mod">
-          <ac:chgData name="Phạm Thông" userId="cb1de41f-d0a9-4c8b-9095-fa88b5d4678f" providerId="ADAL" clId="{E2A0B859-04CE-4714-8C81-52AA70A7C49E}" dt="2025-12-22T04:16:41.678" v="884" actId="1036"/>
+          <ac:chgData name="Phạm Thông" userId="cb1de41f-d0a9-4c8b-9095-fa88b5d4678f" providerId="ADAL" clId="{E2A0B859-04CE-4714-8C81-52AA70A7C49E}" dt="2025-12-23T10:08:46.090" v="979" actId="1076"/>
           <ac:spMkLst>
             <pc:docMk/>
             <pc:sldMk cId="1254439374" sldId="262"/>
@@ -429,7 +429,7 @@
           </ac:spMkLst>
         </pc:spChg>
         <pc:spChg chg="add mod">
-          <ac:chgData name="Phạm Thông" userId="cb1de41f-d0a9-4c8b-9095-fa88b5d4678f" providerId="ADAL" clId="{E2A0B859-04CE-4714-8C81-52AA70A7C49E}" dt="2025-12-22T04:16:46.040" v="903" actId="1038"/>
+          <ac:chgData name="Phạm Thông" userId="cb1de41f-d0a9-4c8b-9095-fa88b5d4678f" providerId="ADAL" clId="{E2A0B859-04CE-4714-8C81-52AA70A7C49E}" dt="2025-12-23T10:08:54.981" v="994" actId="1076"/>
           <ac:spMkLst>
             <pc:docMk/>
             <pc:sldMk cId="1254439374" sldId="262"/>
@@ -437,7 +437,7 @@
           </ac:spMkLst>
         </pc:spChg>
         <pc:spChg chg="add mod">
-          <ac:chgData name="Phạm Thông" userId="cb1de41f-d0a9-4c8b-9095-fa88b5d4678f" providerId="ADAL" clId="{E2A0B859-04CE-4714-8C81-52AA70A7C49E}" dt="2025-12-22T04:16:51.599" v="915" actId="1036"/>
+          <ac:chgData name="Phạm Thông" userId="cb1de41f-d0a9-4c8b-9095-fa88b5d4678f" providerId="ADAL" clId="{E2A0B859-04CE-4714-8C81-52AA70A7C49E}" dt="2025-12-23T10:09:07.850" v="999" actId="1038"/>
           <ac:spMkLst>
             <pc:docMk/>
             <pc:sldMk cId="1254439374" sldId="262"/>
@@ -469,7 +469,7 @@
           </ac:picMkLst>
         </pc:picChg>
         <pc:picChg chg="add mod ord modCrop">
-          <ac:chgData name="Phạm Thông" userId="cb1de41f-d0a9-4c8b-9095-fa88b5d4678f" providerId="ADAL" clId="{E2A0B859-04CE-4714-8C81-52AA70A7C49E}" dt="2025-12-22T04:15:20.528" v="784" actId="171"/>
+          <ac:chgData name="Phạm Thông" userId="cb1de41f-d0a9-4c8b-9095-fa88b5d4678f" providerId="ADAL" clId="{E2A0B859-04CE-4714-8C81-52AA70A7C49E}" dt="2025-12-23T10:08:10.369" v="956" actId="1076"/>
           <ac:picMkLst>
             <pc:docMk/>
             <pc:sldMk cId="1254439374" sldId="262"/>
@@ -629,7 +629,7 @@
           <a:p>
             <a:fld id="{6EB22DFD-DB99-45C6-9F20-54734D4D55A2}" type="datetimeFigureOut">
               <a:rPr lang="en-US" smtClean="0"/>
-              <a:t>12/22/2025</a:t>
+              <a:t>12/23/2025</a:t>
             </a:fld>
             <a:endParaRPr lang="en-US"/>
           </a:p>
@@ -827,7 +827,7 @@
           <a:p>
             <a:fld id="{6EB22DFD-DB99-45C6-9F20-54734D4D55A2}" type="datetimeFigureOut">
               <a:rPr lang="en-US" smtClean="0"/>
-              <a:t>12/22/2025</a:t>
+              <a:t>12/23/2025</a:t>
             </a:fld>
             <a:endParaRPr lang="en-US"/>
           </a:p>
@@ -1035,7 +1035,7 @@
           <a:p>
             <a:fld id="{6EB22DFD-DB99-45C6-9F20-54734D4D55A2}" type="datetimeFigureOut">
               <a:rPr lang="en-US" smtClean="0"/>
-              <a:t>12/22/2025</a:t>
+              <a:t>12/23/2025</a:t>
             </a:fld>
             <a:endParaRPr lang="en-US"/>
           </a:p>
@@ -1233,7 +1233,7 @@
           <a:p>
             <a:fld id="{6EB22DFD-DB99-45C6-9F20-54734D4D55A2}" type="datetimeFigureOut">
               <a:rPr lang="en-US" smtClean="0"/>
-              <a:t>12/22/2025</a:t>
+              <a:t>12/23/2025</a:t>
             </a:fld>
             <a:endParaRPr lang="en-US"/>
           </a:p>
@@ -1508,7 +1508,7 @@
           <a:p>
             <a:fld id="{6EB22DFD-DB99-45C6-9F20-54734D4D55A2}" type="datetimeFigureOut">
               <a:rPr lang="en-US" smtClean="0"/>
-              <a:t>12/22/2025</a:t>
+              <a:t>12/23/2025</a:t>
             </a:fld>
             <a:endParaRPr lang="en-US"/>
           </a:p>
@@ -1773,7 +1773,7 @@
           <a:p>
             <a:fld id="{6EB22DFD-DB99-45C6-9F20-54734D4D55A2}" type="datetimeFigureOut">
               <a:rPr lang="en-US" smtClean="0"/>
-              <a:t>12/22/2025</a:t>
+              <a:t>12/23/2025</a:t>
             </a:fld>
             <a:endParaRPr lang="en-US"/>
           </a:p>
@@ -2185,7 +2185,7 @@
           <a:p>
             <a:fld id="{6EB22DFD-DB99-45C6-9F20-54734D4D55A2}" type="datetimeFigureOut">
               <a:rPr lang="en-US" smtClean="0"/>
-              <a:t>12/22/2025</a:t>
+              <a:t>12/23/2025</a:t>
             </a:fld>
             <a:endParaRPr lang="en-US"/>
           </a:p>
@@ -2326,7 +2326,7 @@
           <a:p>
             <a:fld id="{6EB22DFD-DB99-45C6-9F20-54734D4D55A2}" type="datetimeFigureOut">
               <a:rPr lang="en-US" smtClean="0"/>
-              <a:t>12/22/2025</a:t>
+              <a:t>12/23/2025</a:t>
             </a:fld>
             <a:endParaRPr lang="en-US"/>
           </a:p>
@@ -2439,7 +2439,7 @@
           <a:p>
             <a:fld id="{6EB22DFD-DB99-45C6-9F20-54734D4D55A2}" type="datetimeFigureOut">
               <a:rPr lang="en-US" smtClean="0"/>
-              <a:t>12/22/2025</a:t>
+              <a:t>12/23/2025</a:t>
             </a:fld>
             <a:endParaRPr lang="en-US"/>
           </a:p>
@@ -2750,7 +2750,7 @@
           <a:p>
             <a:fld id="{6EB22DFD-DB99-45C6-9F20-54734D4D55A2}" type="datetimeFigureOut">
               <a:rPr lang="en-US" smtClean="0"/>
-              <a:t>12/22/2025</a:t>
+              <a:t>12/23/2025</a:t>
             </a:fld>
             <a:endParaRPr lang="en-US"/>
           </a:p>
@@ -3038,7 +3038,7 @@
           <a:p>
             <a:fld id="{6EB22DFD-DB99-45C6-9F20-54734D4D55A2}" type="datetimeFigureOut">
               <a:rPr lang="en-US" smtClean="0"/>
-              <a:t>12/22/2025</a:t>
+              <a:t>12/23/2025</a:t>
             </a:fld>
             <a:endParaRPr lang="en-US"/>
           </a:p>
@@ -3279,7 +3279,7 @@
           <a:p>
             <a:fld id="{6EB22DFD-DB99-45C6-9F20-54734D4D55A2}" type="datetimeFigureOut">
               <a:rPr lang="en-US" smtClean="0"/>
-              <a:t>12/22/2025</a:t>
+              <a:t>12/23/2025</a:t>
             </a:fld>
             <a:endParaRPr lang="en-US"/>
           </a:p>
@@ -8034,8 +8034,8 @@
           </a:prstGeom>
         </p:spPr>
       </p:pic>
-      <mc:AlternateContent xmlns:mc="http://schemas.openxmlformats.org/markup-compatibility/2006">
-        <mc:Choice xmlns:a14="http://schemas.microsoft.com/office/drawing/2010/main" Requires="a14">
+      <mc:AlternateContent xmlns:mc="http://schemas.openxmlformats.org/markup-compatibility/2006" xmlns:a14="http://schemas.microsoft.com/office/drawing/2010/main">
+        <mc:Choice Requires="a14">
           <p:sp>
             <p:nvSpPr>
               <p:cNvPr id="4" name="TextBox 3">
@@ -8064,6 +8064,7 @@
               </a:bodyPr>
               <a:lstStyle/>
               <a:p>
+                <a:pPr/>
                 <a14:m>
                   <m:oMathPara xmlns:m="http://schemas.openxmlformats.org/officeDocument/2006/math">
                     <m:oMathParaPr>
@@ -8183,7 +8184,7 @@
             </p:txBody>
           </p:sp>
         </mc:Choice>
-        <mc:Fallback>
+        <mc:Fallback xmlns="">
           <p:sp>
             <p:nvSpPr>
               <p:cNvPr id="4" name="TextBox 3">
@@ -8228,8 +8229,8 @@
           </p:sp>
         </mc:Fallback>
       </mc:AlternateContent>
-      <mc:AlternateContent xmlns:mc="http://schemas.openxmlformats.org/markup-compatibility/2006">
-        <mc:Choice xmlns:a14="http://schemas.microsoft.com/office/drawing/2010/main" Requires="a14">
+      <mc:AlternateContent xmlns:mc="http://schemas.openxmlformats.org/markup-compatibility/2006" xmlns:a14="http://schemas.microsoft.com/office/drawing/2010/main">
+        <mc:Choice Requires="a14">
           <p:sp>
             <p:nvSpPr>
               <p:cNvPr id="5" name="TextBox 4">
@@ -8258,6 +8259,7 @@
               </a:bodyPr>
               <a:lstStyle/>
               <a:p>
+                <a:pPr/>
                 <a14:m>
                   <m:oMathPara xmlns:m="http://schemas.openxmlformats.org/officeDocument/2006/math">
                     <m:oMathParaPr>
@@ -8414,7 +8416,7 @@
             </p:txBody>
           </p:sp>
         </mc:Choice>
-        <mc:Fallback>
+        <mc:Fallback xmlns="">
           <p:sp>
             <p:nvSpPr>
               <p:cNvPr id="5" name="TextBox 4">
@@ -8647,7 +8649,7 @@
             <p:spPr>
               <a:xfrm>
                 <a:off x="9307211" y="253172"/>
-                <a:ext cx="787588" cy="289310"/>
+                <a:ext cx="805220" cy="281937"/>
               </a:xfrm>
               <a:prstGeom prst="rect">
                 <a:avLst/>
@@ -8660,6 +8662,7 @@
               </a:bodyPr>
               <a:lstStyle/>
               <a:p>
+                <a:pPr/>
                 <a14:m>
                   <m:oMathPara xmlns:m="http://schemas.openxmlformats.org/officeDocument/2006/math">
                     <m:oMathParaPr>
@@ -8702,7 +8705,7 @@
                             <a:rPr lang="en-US" b="0" i="1" smtClean="0">
                               <a:latin typeface="Cambria Math" panose="02040503050406030204" pitchFamily="18" charset="0"/>
                             </a:rPr>
-                            <m:t>d</m:t>
+                            <m:t>D</m:t>
                           </m:r>
                         </m:sup>
                       </m:sSup>
@@ -8732,7 +8735,7 @@
             <p:spPr>
               <a:xfrm>
                 <a:off x="9307211" y="253172"/>
-                <a:ext cx="787588" cy="289310"/>
+                <a:ext cx="805220" cy="281937"/>
               </a:xfrm>
               <a:prstGeom prst="rect">
                 <a:avLst/>
@@ -8740,7 +8743,7 @@
               <a:blipFill>
                 <a:blip r:embed="rId3"/>
                 <a:stretch>
-                  <a:fillRect l="-4651" t="-4255" r="-3101" b="-6383"/>
+                  <a:fillRect l="-4545" t="-2174" r="-2273" b="-6522"/>
                 </a:stretch>
               </a:blipFill>
             </p:spPr>
@@ -8776,7 +8779,7 @@
             <p:spPr>
               <a:xfrm>
                 <a:off x="3057697" y="1459946"/>
-                <a:ext cx="241028" cy="299313"/>
+                <a:ext cx="269689" cy="276999"/>
               </a:xfrm>
               <a:prstGeom prst="rect">
                 <a:avLst/>
@@ -8789,6 +8792,7 @@
               </a:bodyPr>
               <a:lstStyle/>
               <a:p>
+                <a:pPr/>
                 <a14:m>
                   <m:oMathPara xmlns:m="http://schemas.openxmlformats.org/officeDocument/2006/math">
                     <m:oMathParaPr>
@@ -8816,7 +8820,7 @@
                             <a:rPr lang="en-US" b="0" i="1" smtClean="0">
                               <a:latin typeface="Cambria Math" panose="02040503050406030204" pitchFamily="18" charset="0"/>
                             </a:rPr>
-                            <m:t>𝑗</m:t>
+                            <m:t>1</m:t>
                           </m:r>
                         </m:sub>
                       </m:sSub>
@@ -8846,7 +8850,7 @@
             <p:spPr>
               <a:xfrm>
                 <a:off x="3057697" y="1459946"/>
-                <a:ext cx="241028" cy="299313"/>
+                <a:ext cx="269689" cy="276999"/>
               </a:xfrm>
               <a:prstGeom prst="rect">
                 <a:avLst/>
@@ -8854,7 +8858,7 @@
               <a:blipFill>
                 <a:blip r:embed="rId4"/>
                 <a:stretch>
-                  <a:fillRect l="-15385" r="-17949" b="-22000"/>
+                  <a:fillRect l="-13636" r="-9091" b="-13043"/>
                 </a:stretch>
               </a:blipFill>
             </p:spPr>
@@ -8890,7 +8894,7 @@
             <p:spPr>
               <a:xfrm>
                 <a:off x="4779276" y="1459946"/>
-                <a:ext cx="241028" cy="299313"/>
+                <a:ext cx="275011" cy="276999"/>
               </a:xfrm>
               <a:prstGeom prst="rect">
                 <a:avLst/>
@@ -8903,6 +8907,7 @@
               </a:bodyPr>
               <a:lstStyle/>
               <a:p>
+                <a:pPr/>
                 <a14:m>
                   <m:oMathPara xmlns:m="http://schemas.openxmlformats.org/officeDocument/2006/math">
                     <m:oMathParaPr>
@@ -8930,7 +8935,7 @@
                             <a:rPr lang="en-US" b="0" i="1" smtClean="0">
                               <a:latin typeface="Cambria Math" panose="02040503050406030204" pitchFamily="18" charset="0"/>
                             </a:rPr>
-                            <m:t>𝑗</m:t>
+                            <m:t>2</m:t>
                           </m:r>
                         </m:sub>
                       </m:sSub>
@@ -8960,7 +8965,7 @@
             <p:spPr>
               <a:xfrm>
                 <a:off x="4779276" y="1459946"/>
-                <a:ext cx="241028" cy="299313"/>
+                <a:ext cx="275011" cy="276999"/>
               </a:xfrm>
               <a:prstGeom prst="rect">
                 <a:avLst/>
@@ -8968,7 +8973,7 @@
               <a:blipFill>
                 <a:blip r:embed="rId5"/>
                 <a:stretch>
-                  <a:fillRect l="-15000" r="-15000" b="-22000"/>
+                  <a:fillRect l="-13333" r="-8889" b="-13043"/>
                 </a:stretch>
               </a:blipFill>
             </p:spPr>
@@ -9004,7 +9009,7 @@
             <p:spPr>
               <a:xfrm>
                 <a:off x="6421039" y="1465588"/>
-                <a:ext cx="241028" cy="299313"/>
+                <a:ext cx="219611" cy="276999"/>
               </a:xfrm>
               <a:prstGeom prst="rect">
                 <a:avLst/>
@@ -9017,37 +9022,19 @@
               </a:bodyPr>
               <a:lstStyle/>
               <a:p>
+                <a:pPr/>
                 <a14:m>
                   <m:oMathPara xmlns:m="http://schemas.openxmlformats.org/officeDocument/2006/math">
                     <m:oMathParaPr>
                       <m:jc m:val="centerGroup"/>
                     </m:oMathParaPr>
                     <m:oMath xmlns:m="http://schemas.openxmlformats.org/officeDocument/2006/math">
-                      <m:sSub>
-                        <m:sSubPr>
-                          <m:ctrlPr>
-                            <a:rPr lang="en-US" b="0" i="1" smtClean="0">
-                              <a:latin typeface="Cambria Math" panose="02040503050406030204" pitchFamily="18" charset="0"/>
-                            </a:rPr>
-                          </m:ctrlPr>
-                        </m:sSubPr>
-                        <m:e>
-                          <m:r>
-                            <a:rPr lang="en-US" b="0" i="1" smtClean="0">
-                              <a:latin typeface="Cambria Math" panose="02040503050406030204" pitchFamily="18" charset="0"/>
-                            </a:rPr>
-                            <m:t>𝑥</m:t>
-                          </m:r>
-                        </m:e>
-                        <m:sub>
-                          <m:r>
-                            <a:rPr lang="en-US" b="0" i="1" smtClean="0">
-                              <a:latin typeface="Cambria Math" panose="02040503050406030204" pitchFamily="18" charset="0"/>
-                            </a:rPr>
-                            <m:t>𝑗</m:t>
-                          </m:r>
-                        </m:sub>
-                      </m:sSub>
+                      <m:r>
+                        <a:rPr lang="en-US" b="0" i="1" smtClean="0">
+                          <a:latin typeface="Cambria Math" panose="02040503050406030204" pitchFamily="18" charset="0"/>
+                        </a:rPr>
+                        <m:t>…</m:t>
+                      </m:r>
                     </m:oMath>
                   </m:oMathPara>
                 </a14:m>
@@ -9074,7 +9061,7 @@
             <p:spPr>
               <a:xfrm>
                 <a:off x="6421039" y="1465588"/>
-                <a:ext cx="241028" cy="299313"/>
+                <a:ext cx="219611" cy="276999"/>
               </a:xfrm>
               <a:prstGeom prst="rect">
                 <a:avLst/>
@@ -9082,7 +9069,7 @@
               <a:blipFill>
                 <a:blip r:embed="rId6"/>
                 <a:stretch>
-                  <a:fillRect l="-15000" r="-15000" b="-22000"/>
+                  <a:fillRect/>
                 </a:stretch>
               </a:blipFill>
             </p:spPr>
@@ -9118,7 +9105,7 @@
             <p:spPr>
               <a:xfrm>
                 <a:off x="8074376" y="1469014"/>
-                <a:ext cx="241028" cy="299313"/>
+                <a:ext cx="337207" cy="276999"/>
               </a:xfrm>
               <a:prstGeom prst="rect">
                 <a:avLst/>
@@ -9131,6 +9118,7 @@
               </a:bodyPr>
               <a:lstStyle/>
               <a:p>
+                <a:pPr/>
                 <a14:m>
                   <m:oMathPara xmlns:m="http://schemas.openxmlformats.org/officeDocument/2006/math">
                     <m:oMathParaPr>
@@ -9158,7 +9146,7 @@
                             <a:rPr lang="en-US" b="0" i="1" smtClean="0">
                               <a:latin typeface="Cambria Math" panose="02040503050406030204" pitchFamily="18" charset="0"/>
                             </a:rPr>
-                            <m:t>𝑗</m:t>
+                            <m:t>𝑚</m:t>
                           </m:r>
                         </m:sub>
                       </m:sSub>
@@ -9188,7 +9176,7 @@
             <p:spPr>
               <a:xfrm>
                 <a:off x="8074376" y="1469014"/>
-                <a:ext cx="241028" cy="299313"/>
+                <a:ext cx="337207" cy="276999"/>
               </a:xfrm>
               <a:prstGeom prst="rect">
                 <a:avLst/>
@@ -9196,7 +9184,7 @@
               <a:blipFill>
                 <a:blip r:embed="rId7"/>
                 <a:stretch>
-                  <a:fillRect l="-15385" r="-17949" b="-24490"/>
+                  <a:fillRect l="-10909" r="-1818" b="-11111"/>
                 </a:stretch>
               </a:blipFill>
             </p:spPr>
@@ -9215,8 +9203,8 @@
           </p:sp>
         </mc:Fallback>
       </mc:AlternateContent>
-      <mc:AlternateContent xmlns:mc="http://schemas.openxmlformats.org/markup-compatibility/2006">
-        <mc:Choice xmlns:a14="http://schemas.microsoft.com/office/drawing/2010/main" Requires="a14">
+      <mc:AlternateContent xmlns:mc="http://schemas.openxmlformats.org/markup-compatibility/2006" xmlns:a14="http://schemas.microsoft.com/office/drawing/2010/main">
+        <mc:Choice Requires="a14">
           <p:sp>
             <p:nvSpPr>
               <p:cNvPr id="9" name="TextBox 8">
@@ -9245,6 +9233,7 @@
               </a:bodyPr>
               <a:lstStyle/>
               <a:p>
+                <a:pPr/>
                 <a14:m>
                   <m:oMathPara xmlns:m="http://schemas.openxmlformats.org/officeDocument/2006/math">
                     <m:oMathParaPr>
@@ -9330,7 +9319,7 @@
             </p:txBody>
           </p:sp>
         </mc:Choice>
-        <mc:Fallback>
+        <mc:Fallback xmlns="">
           <p:sp>
             <p:nvSpPr>
               <p:cNvPr id="9" name="TextBox 8">
@@ -9375,8 +9364,8 @@
           </p:sp>
         </mc:Fallback>
       </mc:AlternateContent>
-      <mc:AlternateContent xmlns:mc="http://schemas.openxmlformats.org/markup-compatibility/2006">
-        <mc:Choice xmlns:a14="http://schemas.microsoft.com/office/drawing/2010/main" Requires="a14">
+      <mc:AlternateContent xmlns:mc="http://schemas.openxmlformats.org/markup-compatibility/2006" xmlns:a14="http://schemas.microsoft.com/office/drawing/2010/main">
+        <mc:Choice Requires="a14">
           <p:sp>
             <p:nvSpPr>
               <p:cNvPr id="10" name="TextBox 9">
@@ -9405,6 +9394,7 @@
               </a:bodyPr>
               <a:lstStyle/>
               <a:p>
+                <a:pPr/>
                 <a14:m>
                   <m:oMathPara xmlns:m="http://schemas.openxmlformats.org/officeDocument/2006/math">
                     <m:oMathParaPr>
@@ -9585,7 +9575,7 @@
             </p:txBody>
           </p:sp>
         </mc:Choice>
-        <mc:Fallback>
+        <mc:Fallback xmlns="">
           <p:sp>
             <p:nvSpPr>
               <p:cNvPr id="10" name="TextBox 9">
@@ -9683,8 +9673,8 @@
             </p:nvSpPr>
             <p:spPr>
               <a:xfrm>
-                <a:off x="2556086" y="4669323"/>
-                <a:ext cx="1290546" cy="246221"/>
+                <a:off x="2974532" y="4669323"/>
+                <a:ext cx="436017" cy="246221"/>
               </a:xfrm>
               <a:prstGeom prst="rect">
                 <a:avLst/>
@@ -9697,6 +9687,7 @@
               </a:bodyPr>
               <a:lstStyle/>
               <a:p>
+                <a:pPr/>
                 <a14:m>
                   <m:oMathPara xmlns:m="http://schemas.openxmlformats.org/officeDocument/2006/math">
                     <m:oMathParaPr>
@@ -9753,62 +9744,6 @@
                           </m:r>
                         </m:sub>
                       </m:sSub>
-                      <m:r>
-                        <a:rPr lang="fr-FR" sz="1600" i="1">
-                          <a:latin typeface="Cambria Math" panose="02040503050406030204" pitchFamily="18" charset="0"/>
-                        </a:rPr>
-                        <m:t>,…,</m:t>
-                      </m:r>
-                      <m:sSub>
-                        <m:sSubPr>
-                          <m:ctrlPr>
-                            <a:rPr lang="fr-FR" sz="1600" i="1">
-                              <a:latin typeface="Cambria Math" panose="02040503050406030204" pitchFamily="18" charset="0"/>
-                            </a:rPr>
-                          </m:ctrlPr>
-                        </m:sSubPr>
-                        <m:e>
-                          <m:r>
-                            <a:rPr lang="fr-FR" sz="1600" i="1">
-                              <a:latin typeface="Cambria Math" panose="02040503050406030204" pitchFamily="18" charset="0"/>
-                            </a:rPr>
-                            <m:t>𝑞</m:t>
-                          </m:r>
-                        </m:e>
-                        <m:sub>
-                          <m:r>
-                            <a:rPr lang="fr-FR" sz="1600" i="1">
-                              <a:latin typeface="Cambria Math" panose="02040503050406030204" pitchFamily="18" charset="0"/>
-                            </a:rPr>
-                            <m:t>𝑚</m:t>
-                          </m:r>
-                        </m:sub>
-                      </m:sSub>
-                      <m:sSub>
-                        <m:sSubPr>
-                          <m:ctrlPr>
-                            <a:rPr lang="fr-FR" sz="1600" i="1">
-                              <a:latin typeface="Cambria Math" panose="02040503050406030204" pitchFamily="18" charset="0"/>
-                            </a:rPr>
-                          </m:ctrlPr>
-                        </m:sSubPr>
-                        <m:e>
-                          <m:r>
-                            <a:rPr lang="fr-FR" sz="1600" i="1">
-                              <a:latin typeface="Cambria Math" panose="02040503050406030204" pitchFamily="18" charset="0"/>
-                            </a:rPr>
-                            <m:t>𝑥</m:t>
-                          </m:r>
-                        </m:e>
-                        <m:sub>
-                          <m:r>
-                            <a:rPr lang="fr-FR" sz="1600" i="1">
-                              <a:latin typeface="Cambria Math" panose="02040503050406030204" pitchFamily="18" charset="0"/>
-                            </a:rPr>
-                            <m:t>𝑚</m:t>
-                          </m:r>
-                        </m:sub>
-                      </m:sSub>
                     </m:oMath>
                   </m:oMathPara>
                 </a14:m>
@@ -9834,8 +9769,8 @@
             </p:nvSpPr>
             <p:spPr>
               <a:xfrm>
-                <a:off x="2556086" y="4669323"/>
-                <a:ext cx="1290546" cy="246221"/>
+                <a:off x="2974532" y="4669323"/>
+                <a:ext cx="436017" cy="246221"/>
               </a:xfrm>
               <a:prstGeom prst="rect">
                 <a:avLst/>
@@ -9843,7 +9778,7 @@
               <a:blipFill>
                 <a:blip r:embed="rId10"/>
                 <a:stretch>
-                  <a:fillRect l="-3774" b="-25000"/>
+                  <a:fillRect l="-11268" r="-5634" b="-25000"/>
                 </a:stretch>
               </a:blipFill>
             </p:spPr>
@@ -9878,8 +9813,8 @@
             </p:nvSpPr>
             <p:spPr>
               <a:xfrm>
-                <a:off x="4214116" y="4655914"/>
-                <a:ext cx="1290546" cy="246221"/>
+                <a:off x="4608780" y="4655914"/>
+                <a:ext cx="445507" cy="246221"/>
               </a:xfrm>
               <a:prstGeom prst="rect">
                 <a:avLst/>
@@ -9892,6 +9827,7 @@
               </a:bodyPr>
               <a:lstStyle/>
               <a:p>
+                <a:pPr/>
                 <a14:m>
                   <m:oMathPara xmlns:m="http://schemas.openxmlformats.org/officeDocument/2006/math">
                     <m:oMathParaPr>
@@ -9916,10 +9852,10 @@
                         </m:e>
                         <m:sub>
                           <m:r>
-                            <a:rPr lang="fr-FR" sz="1600" i="1">
+                            <a:rPr lang="en-US" sz="1600" b="0" i="1" smtClean="0">
                               <a:latin typeface="Cambria Math" panose="02040503050406030204" pitchFamily="18" charset="0"/>
                             </a:rPr>
-                            <m:t>1</m:t>
+                            <m:t>2</m:t>
                           </m:r>
                         </m:sub>
                       </m:sSub>
@@ -9941,66 +9877,10 @@
                         </m:e>
                         <m:sub>
                           <m:r>
-                            <a:rPr lang="fr-FR" sz="1600" i="1">
+                            <a:rPr lang="en-US" sz="1600" b="0" i="1" smtClean="0">
                               <a:latin typeface="Cambria Math" panose="02040503050406030204" pitchFamily="18" charset="0"/>
                             </a:rPr>
-                            <m:t>1</m:t>
-                          </m:r>
-                        </m:sub>
-                      </m:sSub>
-                      <m:r>
-                        <a:rPr lang="fr-FR" sz="1600" i="1">
-                          <a:latin typeface="Cambria Math" panose="02040503050406030204" pitchFamily="18" charset="0"/>
-                        </a:rPr>
-                        <m:t>,…,</m:t>
-                      </m:r>
-                      <m:sSub>
-                        <m:sSubPr>
-                          <m:ctrlPr>
-                            <a:rPr lang="fr-FR" sz="1600" i="1">
-                              <a:latin typeface="Cambria Math" panose="02040503050406030204" pitchFamily="18" charset="0"/>
-                            </a:rPr>
-                          </m:ctrlPr>
-                        </m:sSubPr>
-                        <m:e>
-                          <m:r>
-                            <a:rPr lang="fr-FR" sz="1600" i="1">
-                              <a:latin typeface="Cambria Math" panose="02040503050406030204" pitchFamily="18" charset="0"/>
-                            </a:rPr>
-                            <m:t>𝑞</m:t>
-                          </m:r>
-                        </m:e>
-                        <m:sub>
-                          <m:r>
-                            <a:rPr lang="fr-FR" sz="1600" i="1">
-                              <a:latin typeface="Cambria Math" panose="02040503050406030204" pitchFamily="18" charset="0"/>
-                            </a:rPr>
-                            <m:t>𝑚</m:t>
-                          </m:r>
-                        </m:sub>
-                      </m:sSub>
-                      <m:sSub>
-                        <m:sSubPr>
-                          <m:ctrlPr>
-                            <a:rPr lang="fr-FR" sz="1600" i="1">
-                              <a:latin typeface="Cambria Math" panose="02040503050406030204" pitchFamily="18" charset="0"/>
-                            </a:rPr>
-                          </m:ctrlPr>
-                        </m:sSubPr>
-                        <m:e>
-                          <m:r>
-                            <a:rPr lang="fr-FR" sz="1600" i="1">
-                              <a:latin typeface="Cambria Math" panose="02040503050406030204" pitchFamily="18" charset="0"/>
-                            </a:rPr>
-                            <m:t>𝑥</m:t>
-                          </m:r>
-                        </m:e>
-                        <m:sub>
-                          <m:r>
-                            <a:rPr lang="fr-FR" sz="1600" i="1">
-                              <a:latin typeface="Cambria Math" panose="02040503050406030204" pitchFamily="18" charset="0"/>
-                            </a:rPr>
-                            <m:t>𝑚</m:t>
+                            <m:t>2</m:t>
                           </m:r>
                         </m:sub>
                       </m:sSub>
@@ -10029,8 +9909,8 @@
             </p:nvSpPr>
             <p:spPr>
               <a:xfrm>
-                <a:off x="4214116" y="4655914"/>
-                <a:ext cx="1290546" cy="246221"/>
+                <a:off x="4608780" y="4655914"/>
+                <a:ext cx="445507" cy="246221"/>
               </a:xfrm>
               <a:prstGeom prst="rect">
                 <a:avLst/>
@@ -10038,7 +9918,7 @@
               <a:blipFill>
                 <a:blip r:embed="rId11"/>
                 <a:stretch>
-                  <a:fillRect l="-3774" b="-25000"/>
+                  <a:fillRect l="-10959" r="-4110" b="-25000"/>
                 </a:stretch>
               </a:blipFill>
             </p:spPr>
@@ -10073,8 +9953,8 @@
             </p:nvSpPr>
             <p:spPr>
               <a:xfrm>
-                <a:off x="5849972" y="4667490"/>
-                <a:ext cx="1290546" cy="246221"/>
+                <a:off x="6445084" y="4667490"/>
+                <a:ext cx="195566" cy="246221"/>
               </a:xfrm>
               <a:prstGeom prst="rect">
                 <a:avLst/>
@@ -10087,118 +9967,19 @@
               </a:bodyPr>
               <a:lstStyle/>
               <a:p>
+                <a:pPr/>
                 <a14:m>
                   <m:oMathPara xmlns:m="http://schemas.openxmlformats.org/officeDocument/2006/math">
                     <m:oMathParaPr>
                       <m:jc m:val="centerGroup"/>
                     </m:oMathParaPr>
                     <m:oMath xmlns:m="http://schemas.openxmlformats.org/officeDocument/2006/math">
-                      <m:sSub>
-                        <m:sSubPr>
-                          <m:ctrlPr>
-                            <a:rPr lang="fr-FR" sz="1600" i="1" smtClean="0">
-                              <a:latin typeface="Cambria Math" panose="02040503050406030204" pitchFamily="18" charset="0"/>
-                            </a:rPr>
-                          </m:ctrlPr>
-                        </m:sSubPr>
-                        <m:e>
-                          <m:r>
-                            <a:rPr lang="fr-FR" sz="1600" i="1">
-                              <a:latin typeface="Cambria Math" panose="02040503050406030204" pitchFamily="18" charset="0"/>
-                            </a:rPr>
-                            <m:t>𝑞</m:t>
-                          </m:r>
-                        </m:e>
-                        <m:sub>
-                          <m:r>
-                            <a:rPr lang="fr-FR" sz="1600" i="1">
-                              <a:latin typeface="Cambria Math" panose="02040503050406030204" pitchFamily="18" charset="0"/>
-                            </a:rPr>
-                            <m:t>1</m:t>
-                          </m:r>
-                        </m:sub>
-                      </m:sSub>
-                      <m:sSub>
-                        <m:sSubPr>
-                          <m:ctrlPr>
-                            <a:rPr lang="fr-FR" sz="1600" i="1">
-                              <a:latin typeface="Cambria Math" panose="02040503050406030204" pitchFamily="18" charset="0"/>
-                            </a:rPr>
-                          </m:ctrlPr>
-                        </m:sSubPr>
-                        <m:e>
-                          <m:r>
-                            <a:rPr lang="fr-FR" sz="1600" i="1">
-                              <a:latin typeface="Cambria Math" panose="02040503050406030204" pitchFamily="18" charset="0"/>
-                            </a:rPr>
-                            <m:t>𝑥</m:t>
-                          </m:r>
-                        </m:e>
-                        <m:sub>
-                          <m:r>
-                            <a:rPr lang="fr-FR" sz="1600" i="1">
-                              <a:latin typeface="Cambria Math" panose="02040503050406030204" pitchFamily="18" charset="0"/>
-                            </a:rPr>
-                            <m:t>1</m:t>
-                          </m:r>
-                        </m:sub>
-                      </m:sSub>
                       <m:r>
-                        <a:rPr lang="fr-FR" sz="1600" i="1">
+                        <a:rPr lang="en-US" sz="1600" b="0" i="1" smtClean="0">
                           <a:latin typeface="Cambria Math" panose="02040503050406030204" pitchFamily="18" charset="0"/>
                         </a:rPr>
-                        <m:t>,…,</m:t>
+                        <m:t>…</m:t>
                       </m:r>
-                      <m:sSub>
-                        <m:sSubPr>
-                          <m:ctrlPr>
-                            <a:rPr lang="fr-FR" sz="1600" i="1">
-                              <a:latin typeface="Cambria Math" panose="02040503050406030204" pitchFamily="18" charset="0"/>
-                            </a:rPr>
-                          </m:ctrlPr>
-                        </m:sSubPr>
-                        <m:e>
-                          <m:r>
-                            <a:rPr lang="fr-FR" sz="1600" i="1">
-                              <a:latin typeface="Cambria Math" panose="02040503050406030204" pitchFamily="18" charset="0"/>
-                            </a:rPr>
-                            <m:t>𝑞</m:t>
-                          </m:r>
-                        </m:e>
-                        <m:sub>
-                          <m:r>
-                            <a:rPr lang="fr-FR" sz="1600" i="1">
-                              <a:latin typeface="Cambria Math" panose="02040503050406030204" pitchFamily="18" charset="0"/>
-                            </a:rPr>
-                            <m:t>𝑚</m:t>
-                          </m:r>
-                        </m:sub>
-                      </m:sSub>
-                      <m:sSub>
-                        <m:sSubPr>
-                          <m:ctrlPr>
-                            <a:rPr lang="fr-FR" sz="1600" i="1">
-                              <a:latin typeface="Cambria Math" panose="02040503050406030204" pitchFamily="18" charset="0"/>
-                            </a:rPr>
-                          </m:ctrlPr>
-                        </m:sSubPr>
-                        <m:e>
-                          <m:r>
-                            <a:rPr lang="fr-FR" sz="1600" i="1">
-                              <a:latin typeface="Cambria Math" panose="02040503050406030204" pitchFamily="18" charset="0"/>
-                            </a:rPr>
-                            <m:t>𝑥</m:t>
-                          </m:r>
-                        </m:e>
-                        <m:sub>
-                          <m:r>
-                            <a:rPr lang="fr-FR" sz="1600" i="1">
-                              <a:latin typeface="Cambria Math" panose="02040503050406030204" pitchFamily="18" charset="0"/>
-                            </a:rPr>
-                            <m:t>𝑚</m:t>
-                          </m:r>
-                        </m:sub>
-                      </m:sSub>
                     </m:oMath>
                   </m:oMathPara>
                 </a14:m>
@@ -10224,8 +10005,8 @@
             </p:nvSpPr>
             <p:spPr>
               <a:xfrm>
-                <a:off x="5849972" y="4667490"/>
-                <a:ext cx="1290546" cy="246221"/>
+                <a:off x="6445084" y="4667490"/>
+                <a:ext cx="195566" cy="246221"/>
               </a:xfrm>
               <a:prstGeom prst="rect">
                 <a:avLst/>
@@ -10233,7 +10014,7 @@
               <a:blipFill>
                 <a:blip r:embed="rId12"/>
                 <a:stretch>
-                  <a:fillRect l="-3791" b="-25000"/>
+                  <a:fillRect/>
                 </a:stretch>
               </a:blipFill>
             </p:spPr>
@@ -10268,8 +10049,8 @@
             </p:nvSpPr>
             <p:spPr>
               <a:xfrm>
-                <a:off x="7514765" y="4661700"/>
-                <a:ext cx="1290546" cy="246221"/>
+                <a:off x="7865022" y="4661700"/>
+                <a:ext cx="556434" cy="246221"/>
               </a:xfrm>
               <a:prstGeom prst="rect">
                 <a:avLst/>
@@ -10282,68 +10063,13 @@
               </a:bodyPr>
               <a:lstStyle/>
               <a:p>
+                <a:pPr/>
                 <a14:m>
                   <m:oMathPara xmlns:m="http://schemas.openxmlformats.org/officeDocument/2006/math">
                     <m:oMathParaPr>
                       <m:jc m:val="centerGroup"/>
                     </m:oMathParaPr>
                     <m:oMath xmlns:m="http://schemas.openxmlformats.org/officeDocument/2006/math">
-                      <m:sSub>
-                        <m:sSubPr>
-                          <m:ctrlPr>
-                            <a:rPr lang="fr-FR" sz="1600" i="1" smtClean="0">
-                              <a:latin typeface="Cambria Math" panose="02040503050406030204" pitchFamily="18" charset="0"/>
-                            </a:rPr>
-                          </m:ctrlPr>
-                        </m:sSubPr>
-                        <m:e>
-                          <m:r>
-                            <a:rPr lang="fr-FR" sz="1600" i="1">
-                              <a:latin typeface="Cambria Math" panose="02040503050406030204" pitchFamily="18" charset="0"/>
-                            </a:rPr>
-                            <m:t>𝑞</m:t>
-                          </m:r>
-                        </m:e>
-                        <m:sub>
-                          <m:r>
-                            <a:rPr lang="fr-FR" sz="1600" i="1">
-                              <a:latin typeface="Cambria Math" panose="02040503050406030204" pitchFamily="18" charset="0"/>
-                            </a:rPr>
-                            <m:t>1</m:t>
-                          </m:r>
-                        </m:sub>
-                      </m:sSub>
-                      <m:sSub>
-                        <m:sSubPr>
-                          <m:ctrlPr>
-                            <a:rPr lang="fr-FR" sz="1600" i="1">
-                              <a:latin typeface="Cambria Math" panose="02040503050406030204" pitchFamily="18" charset="0"/>
-                            </a:rPr>
-                          </m:ctrlPr>
-                        </m:sSubPr>
-                        <m:e>
-                          <m:r>
-                            <a:rPr lang="fr-FR" sz="1600" i="1">
-                              <a:latin typeface="Cambria Math" panose="02040503050406030204" pitchFamily="18" charset="0"/>
-                            </a:rPr>
-                            <m:t>𝑥</m:t>
-                          </m:r>
-                        </m:e>
-                        <m:sub>
-                          <m:r>
-                            <a:rPr lang="fr-FR" sz="1600" i="1">
-                              <a:latin typeface="Cambria Math" panose="02040503050406030204" pitchFamily="18" charset="0"/>
-                            </a:rPr>
-                            <m:t>1</m:t>
-                          </m:r>
-                        </m:sub>
-                      </m:sSub>
-                      <m:r>
-                        <a:rPr lang="fr-FR" sz="1600" i="1">
-                          <a:latin typeface="Cambria Math" panose="02040503050406030204" pitchFamily="18" charset="0"/>
-                        </a:rPr>
-                        <m:t>,…,</m:t>
-                      </m:r>
                       <m:sSub>
                         <m:sSubPr>
                           <m:ctrlPr>
@@ -10419,8 +10145,8 @@
             </p:nvSpPr>
             <p:spPr>
               <a:xfrm>
-                <a:off x="7514765" y="4661700"/>
-                <a:ext cx="1290546" cy="246221"/>
+                <a:off x="7865022" y="4661700"/>
+                <a:ext cx="556434" cy="246221"/>
               </a:xfrm>
               <a:prstGeom prst="rect">
                 <a:avLst/>
@@ -10428,7 +10154,7 @@
               <a:blipFill>
                 <a:blip r:embed="rId13"/>
                 <a:stretch>
-                  <a:fillRect l="-3791" b="-25000"/>
+                  <a:fillRect l="-8791" r="-2198" b="-25000"/>
                 </a:stretch>
               </a:blipFill>
             </p:spPr>

</xml_diff>